<commit_message>
Added HAC results to presentation
</commit_message>
<xml_diff>
--- a/presentation/interim/Presentation.pptx
+++ b/presentation/interim/Presentation.pptx
@@ -154,7 +154,7 @@
   </p:defaultTextStyle>
   <p:extLst>
     <p:ext uri="{EFAFB233-063F-42B5-8137-9DF3F51BA10A}">
-      <p15:sldGuideLst xmlns:p15="http://schemas.microsoft.com/office/powerpoint/2012/main" xmlns="">
+      <p15:sldGuideLst xmlns="" xmlns:p15="http://schemas.microsoft.com/office/powerpoint/2012/main">
         <p15:guide id="1" orient="horz" pos="3498">
           <p15:clr>
             <a:srgbClr val="A4A3A4"/>
@@ -168,7 +168,7 @@
       </p15:sldGuideLst>
     </p:ext>
     <p:ext uri="{2D200454-40CA-4A62-9FC3-DE9A4176ACB9}">
-      <p15:notesGuideLst xmlns:p15="http://schemas.microsoft.com/office/powerpoint/2012/main" xmlns="">
+      <p15:notesGuideLst xmlns="" xmlns:p15="http://schemas.microsoft.com/office/powerpoint/2012/main">
         <p15:guide id="1" orient="horz" pos="3224">
           <p15:clr>
             <a:srgbClr val="A4A3A4"/>
@@ -4510,7 +4510,7 @@
           <p:nvPr>
             <p:extLst>
               <p:ext uri="{D42A27DB-BD31-4B8C-83A1-F6EECF244321}">
-                <p14:modId xmlns:p14="http://schemas.microsoft.com/office/powerpoint/2010/main" val="3202598732"/>
+                <p14:modId xmlns:p14="http://schemas.microsoft.com/office/powerpoint/2010/main" val="2676765233"/>
               </p:ext>
             </p:extLst>
           </p:nvPr>
@@ -4712,7 +4712,7 @@
                       <a:pPr algn="ctr"/>
                       <a:r>
                         <a:rPr lang="de-DE" dirty="0" smtClean="0"/>
-                        <a:t>0.4</a:t>
+                        <a:t>0.281</a:t>
                       </a:r>
                       <a:endParaRPr lang="de-DE" dirty="0"/>
                     </a:p>
@@ -4727,7 +4727,7 @@
                       <a:pPr algn="ctr"/>
                       <a:r>
                         <a:rPr lang="de-DE" dirty="0" smtClean="0"/>
-                        <a:t>0.4</a:t>
+                        <a:t>0.255</a:t>
                       </a:r>
                       <a:endParaRPr lang="de-DE" dirty="0"/>
                     </a:p>
@@ -4812,11 +4812,7 @@
             </a:r>
             <a:r>
               <a:rPr lang="de-DE" sz="1400" dirty="0" smtClean="0"/>
-              <a:t> </a:t>
-            </a:r>
-            <a:r>
-              <a:rPr lang="de-DE" sz="1400" dirty="0" smtClean="0"/>
-              <a:t>(</a:t>
+              <a:t> (</a:t>
             </a:r>
             <a:r>
               <a:rPr lang="de-DE" sz="1400" dirty="0" err="1" smtClean="0"/>
@@ -5720,15 +5716,7 @@
             </a:r>
             <a:r>
               <a:rPr lang="de-DE" sz="1600" dirty="0" smtClean="0"/>
-              <a:t> </a:t>
-            </a:r>
-            <a:r>
-              <a:rPr lang="de-DE" sz="1600" dirty="0" smtClean="0"/>
-              <a:t>#</a:t>
-            </a:r>
-            <a:r>
-              <a:rPr lang="de-DE" sz="1600" dirty="0" smtClean="0"/>
-              <a:t>tags </a:t>
+              <a:t> #tags </a:t>
             </a:r>
             <a:r>
               <a:rPr lang="de-DE" sz="1600" dirty="0" err="1" smtClean="0"/>
@@ -6202,11 +6190,7 @@
             </a:pPr>
             <a:r>
               <a:rPr lang="en-US" sz="1600" dirty="0" smtClean="0"/>
-              <a:t>Recall </a:t>
-            </a:r>
-            <a:r>
-              <a:rPr lang="en-US" sz="1600" dirty="0" smtClean="0"/>
-              <a:t>increases by the number of suggested tags</a:t>
+              <a:t>Recall increases by the number of suggested tags</a:t>
             </a:r>
           </a:p>
           <a:p>
@@ -6240,11 +6224,7 @@
             </a:pPr>
             <a:r>
               <a:rPr lang="en-US" sz="1600" dirty="0" smtClean="0"/>
-              <a:t>Improve </a:t>
-            </a:r>
-            <a:r>
-              <a:rPr lang="en-US" sz="1600" dirty="0" smtClean="0"/>
-              <a:t>preprocessing</a:t>
+              <a:t>Improve preprocessing</a:t>
             </a:r>
           </a:p>
           <a:p>
@@ -6257,11 +6237,7 @@
             </a:pPr>
             <a:r>
               <a:rPr lang="en-US" sz="1600" dirty="0" smtClean="0"/>
-              <a:t>Use </a:t>
-            </a:r>
-            <a:r>
-              <a:rPr lang="en-US" sz="1600" dirty="0" smtClean="0"/>
-              <a:t>different (more independent) features for Na</a:t>
+              <a:t>Use different (more independent) features for Na</a:t>
             </a:r>
             <a:r>
               <a:rPr lang="de-DE" sz="1600" dirty="0" err="1" smtClean="0"/>
@@ -6273,11 +6249,7 @@
             </a:r>
             <a:r>
               <a:rPr lang="en-US" sz="1600" dirty="0" smtClean="0"/>
-              <a:t> </a:t>
-            </a:r>
-            <a:r>
-              <a:rPr lang="en-US" sz="1600" dirty="0" smtClean="0"/>
-              <a:t>Bayes</a:t>
+              <a:t> Bayes</a:t>
             </a:r>
           </a:p>
           <a:p>
@@ -6292,7 +6264,6 @@
               <a:rPr lang="en-US" sz="1600" dirty="0" smtClean="0"/>
               <a:t>Evaluation</a:t>
             </a:r>
-            <a:endParaRPr lang="en-US" sz="1600" dirty="0" smtClean="0"/>
           </a:p>
         </p:txBody>
       </p:sp>
@@ -10121,7 +10092,7 @@
                   <a:t> </a:t>
                 </a:r>
                 <a14:m>
-                  <m:oMath xmlns:m="http://schemas.openxmlformats.org/officeDocument/2006/math" xmlns="">
+                  <m:oMath xmlns="" xmlns:m="http://schemas.openxmlformats.org/officeDocument/2006/math">
                     <m:r>
                       <a:rPr lang="de-DE" sz="1600" i="1" dirty="0">
                         <a:latin typeface="Cambria Math" charset="0"/>
@@ -10137,7 +10108,7 @@
                   <a:t> Tags: </a:t>
                 </a:r>
                 <a14:m>
-                  <m:oMath xmlns:m="http://schemas.openxmlformats.org/officeDocument/2006/math" xmlns="">
+                  <m:oMath xmlns="" xmlns:m="http://schemas.openxmlformats.org/officeDocument/2006/math">
                     <m:r>
                       <a:rPr lang="de-DE" sz="1600" i="1" dirty="0">
                         <a:latin typeface="Cambria Math" charset="0"/>
@@ -11675,11 +11646,7 @@
             </a:r>
             <a:r>
               <a:rPr lang="de-DE" sz="1800" dirty="0" smtClean="0"/>
-              <a:t>: #</a:t>
-            </a:r>
-            <a:r>
-              <a:rPr lang="de-DE" sz="1800" dirty="0" smtClean="0"/>
-              <a:t>tags</a:t>
+              <a:t>: #tags</a:t>
             </a:r>
           </a:p>
           <a:p>
@@ -12283,11 +12250,7 @@
             </a:r>
             <a:r>
               <a:rPr lang="de-DE" sz="1800" b="1" dirty="0" smtClean="0"/>
-              <a:t> </a:t>
-            </a:r>
-            <a:r>
-              <a:rPr lang="de-DE" sz="1800" b="1" dirty="0" smtClean="0"/>
-              <a:t>Parameters</a:t>
+              <a:t> Parameters</a:t>
             </a:r>
             <a:r>
               <a:rPr lang="de-DE" sz="1800" dirty="0" smtClean="0"/>
@@ -12309,11 +12272,7 @@
             </a:r>
             <a:r>
               <a:rPr lang="de-DE" sz="1800" dirty="0" smtClean="0"/>
-              <a:t> </a:t>
-            </a:r>
-            <a:r>
-              <a:rPr lang="de-DE" sz="1800" dirty="0" smtClean="0"/>
-              <a:t>(</a:t>
+              <a:t> (</a:t>
             </a:r>
             <a:r>
               <a:rPr lang="de-DE" sz="1800" dirty="0" err="1" smtClean="0"/>
@@ -12960,7 +12919,7 @@
           <a:graphicData uri="http://schemas.openxmlformats.org/presentationml/2006/ole">
             <mc:AlternateContent xmlns:mc="http://schemas.openxmlformats.org/markup-compatibility/2006">
               <mc:Choice xmlns:v="urn:schemas-microsoft-com:vml" Requires="v">
-                <p:oleObj spid="_x0000_s1339" name="Formel" r:id="rId4" imgW="2806700" imgH="609600" progId="Equation.3">
+                <p:oleObj spid="_x0000_s1342" name="Formel" r:id="rId4" imgW="2806700" imgH="609600" progId="Equation.3">
                   <p:embed/>
                 </p:oleObj>
               </mc:Choice>
@@ -13017,7 +12976,7 @@
           <a:graphicData uri="http://schemas.openxmlformats.org/presentationml/2006/ole">
             <mc:AlternateContent xmlns:mc="http://schemas.openxmlformats.org/markup-compatibility/2006">
               <mc:Choice xmlns:v="urn:schemas-microsoft-com:vml" Requires="v">
-                <p:oleObj spid="_x0000_s1340" name="Formel" r:id="rId6" imgW="2667000" imgH="609600" progId="Equation.3">
+                <p:oleObj spid="_x0000_s1343" name="Formel" r:id="rId6" imgW="2667000" imgH="609600" progId="Equation.3">
                   <p:embed/>
                 </p:oleObj>
               </mc:Choice>

</xml_diff>

<commit_message>
Presentation changes Ralph and minor changes for Michael
</commit_message>
<xml_diff>
--- a/presentation/interim/Presentation.pptx
+++ b/presentation/interim/Presentation.pptx
@@ -5,10 +5,10 @@
     <p:sldMasterId id="2147483648" r:id="rId1"/>
   </p:sldMasterIdLst>
   <p:notesMasterIdLst>
-    <p:notesMasterId r:id="rId15"/>
+    <p:notesMasterId r:id="rId14"/>
   </p:notesMasterIdLst>
   <p:handoutMasterIdLst>
-    <p:handoutMasterId r:id="rId16"/>
+    <p:handoutMasterId r:id="rId15"/>
   </p:handoutMasterIdLst>
   <p:sldIdLst>
     <p:sldId id="398" r:id="rId2"/>
@@ -18,12 +18,11 @@
     <p:sldId id="416" r:id="rId6"/>
     <p:sldId id="417" r:id="rId7"/>
     <p:sldId id="409" r:id="rId8"/>
-    <p:sldId id="410" r:id="rId9"/>
-    <p:sldId id="411" r:id="rId10"/>
-    <p:sldId id="399" r:id="rId11"/>
-    <p:sldId id="400" r:id="rId12"/>
-    <p:sldId id="412" r:id="rId13"/>
-    <p:sldId id="407" r:id="rId14"/>
+    <p:sldId id="411" r:id="rId9"/>
+    <p:sldId id="399" r:id="rId10"/>
+    <p:sldId id="400" r:id="rId11"/>
+    <p:sldId id="412" r:id="rId12"/>
+    <p:sldId id="407" r:id="rId13"/>
   </p:sldIdLst>
   <p:sldSz cx="9144000" cy="6858000" type="screen4x3"/>
   <p:notesSz cx="7099300" cy="10234613"/>
@@ -154,7 +153,7 @@
   </p:defaultTextStyle>
   <p:extLst>
     <p:ext uri="{EFAFB233-063F-42B5-8137-9DF3F51BA10A}">
-      <p15:sldGuideLst xmlns="" xmlns:p15="http://schemas.microsoft.com/office/powerpoint/2012/main">
+      <p15:sldGuideLst xmlns:p15="http://schemas.microsoft.com/office/powerpoint/2012/main" xmlns="">
         <p15:guide id="1" orient="horz" pos="3498">
           <p15:clr>
             <a:srgbClr val="A4A3A4"/>
@@ -168,7 +167,7 @@
       </p15:sldGuideLst>
     </p:ext>
     <p:ext uri="{2D200454-40CA-4A62-9FC3-DE9A4176ACB9}">
-      <p15:notesGuideLst xmlns="" xmlns:p15="http://schemas.microsoft.com/office/powerpoint/2012/main">
+      <p15:notesGuideLst xmlns:p15="http://schemas.microsoft.com/office/powerpoint/2012/main" xmlns="">
         <p15:guide id="1" orient="horz" pos="3224">
           <p15:clr>
             <a:srgbClr val="A4A3A4"/>
@@ -2573,223 +2572,6 @@
               <a:rPr lang="de-DE"/>
               <a:pPr algn="r" eaLnBrk="1" hangingPunct="1"/>
               <a:t>8</a:t>
-            </a:fld>
-            <a:endParaRPr lang="de-DE"/>
-          </a:p>
-        </p:txBody>
-      </p:sp>
-      <p:sp>
-        <p:nvSpPr>
-          <p:cNvPr id="8195" name="Rectangle 2"/>
-          <p:cNvSpPr>
-            <a:spLocks noGrp="1" noRot="1" noChangeAspect="1" noChangeArrowheads="1" noTextEdit="1"/>
-          </p:cNvSpPr>
-          <p:nvPr>
-            <p:ph type="sldImg"/>
-          </p:nvPr>
-        </p:nvSpPr>
-        <p:spPr>
-          <a:ln/>
-        </p:spPr>
-      </p:sp>
-      <p:sp>
-        <p:nvSpPr>
-          <p:cNvPr id="8196" name="Rectangle 3"/>
-          <p:cNvSpPr>
-            <a:spLocks noGrp="1" noChangeArrowheads="1"/>
-          </p:cNvSpPr>
-          <p:nvPr>
-            <p:ph type="body" idx="1"/>
-          </p:nvPr>
-        </p:nvSpPr>
-        <p:spPr>
-          <a:noFill/>
-        </p:spPr>
-        <p:txBody>
-          <a:bodyPr lIns="94904" tIns="47452" rIns="94904" bIns="47452"/>
-          <a:lstStyle/>
-          <a:p>
-            <a:pPr eaLnBrk="1" hangingPunct="1"/>
-            <a:endParaRPr lang="de-DE" smtClean="0"/>
-          </a:p>
-        </p:txBody>
-      </p:sp>
-    </p:spTree>
-    <p:extLst>
-      <p:ext uri="{BB962C8B-B14F-4D97-AF65-F5344CB8AC3E}">
-        <p14:creationId xmlns:p14="http://schemas.microsoft.com/office/powerpoint/2010/main" val="745752036"/>
-      </p:ext>
-    </p:extLst>
-  </p:cSld>
-  <p:clrMapOvr>
-    <a:masterClrMapping/>
-  </p:clrMapOvr>
-</p:notes>
-</file>
-
-<file path=ppt/notesSlides/notesSlide8.xml><?xml version="1.0" encoding="utf-8"?>
-<p:notes xmlns:a="http://schemas.openxmlformats.org/drawingml/2006/main" xmlns:r="http://schemas.openxmlformats.org/officeDocument/2006/relationships" xmlns:p="http://schemas.openxmlformats.org/presentationml/2006/main">
-  <p:cSld>
-    <p:spTree>
-      <p:nvGrpSpPr>
-        <p:cNvPr id="1" name=""/>
-        <p:cNvGrpSpPr/>
-        <p:nvPr/>
-      </p:nvGrpSpPr>
-      <p:grpSpPr>
-        <a:xfrm>
-          <a:off x="0" y="0"/>
-          <a:ext cx="0" cy="0"/>
-          <a:chOff x="0" y="0"/>
-          <a:chExt cx="0" cy="0"/>
-        </a:xfrm>
-      </p:grpSpPr>
-      <p:sp>
-        <p:nvSpPr>
-          <p:cNvPr id="8194" name="Rectangle 7"/>
-          <p:cNvSpPr txBox="1">
-            <a:spLocks noGrp="1" noChangeArrowheads="1"/>
-          </p:cNvSpPr>
-          <p:nvPr/>
-        </p:nvSpPr>
-        <p:spPr bwMode="auto">
-          <a:xfrm>
-            <a:off x="4021138" y="9721850"/>
-            <a:ext cx="3076575" cy="511175"/>
-          </a:xfrm>
-          <a:prstGeom prst="rect">
-            <a:avLst/>
-          </a:prstGeom>
-          <a:noFill/>
-          <a:ln>
-            <a:noFill/>
-          </a:ln>
-          <a:extLst>
-            <a:ext uri="{909E8E84-426E-40dd-AFC4-6F175D3DCCD1}">
-              <a14:hiddenFill xmlns:a14="http://schemas.microsoft.com/office/drawing/2010/main">
-                <a:solidFill>
-                  <a:srgbClr val="FFFFFF"/>
-                </a:solidFill>
-              </a14:hiddenFill>
-            </a:ext>
-            <a:ext uri="{91240B29-F687-4f45-9708-019B960494DF}">
-              <a14:hiddenLine xmlns:a14="http://schemas.microsoft.com/office/drawing/2010/main" w="9525">
-                <a:solidFill>
-                  <a:srgbClr val="000000"/>
-                </a:solidFill>
-                <a:miter lim="800000"/>
-                <a:headEnd/>
-                <a:tailEnd/>
-              </a14:hiddenLine>
-            </a:ext>
-          </a:extLst>
-        </p:spPr>
-        <p:txBody>
-          <a:bodyPr lIns="94904" tIns="47452" rIns="94904" bIns="47452" anchor="b"/>
-          <a:lstStyle>
-            <a:lvl1pPr defTabSz="949325" eaLnBrk="0" hangingPunct="0">
-              <a:defRPr sz="1200">
-                <a:solidFill>
-                  <a:schemeClr val="tx1"/>
-                </a:solidFill>
-                <a:latin typeface="Arial" charset="0"/>
-              </a:defRPr>
-            </a:lvl1pPr>
-            <a:lvl2pPr marL="742950" indent="-285750" defTabSz="949325" eaLnBrk="0" hangingPunct="0">
-              <a:defRPr sz="1200">
-                <a:solidFill>
-                  <a:schemeClr val="tx1"/>
-                </a:solidFill>
-                <a:latin typeface="Arial" charset="0"/>
-              </a:defRPr>
-            </a:lvl2pPr>
-            <a:lvl3pPr marL="1143000" indent="-228600" defTabSz="949325" eaLnBrk="0" hangingPunct="0">
-              <a:defRPr sz="1200">
-                <a:solidFill>
-                  <a:schemeClr val="tx1"/>
-                </a:solidFill>
-                <a:latin typeface="Arial" charset="0"/>
-              </a:defRPr>
-            </a:lvl3pPr>
-            <a:lvl4pPr marL="1600200" indent="-228600" defTabSz="949325" eaLnBrk="0" hangingPunct="0">
-              <a:defRPr sz="1200">
-                <a:solidFill>
-                  <a:schemeClr val="tx1"/>
-                </a:solidFill>
-                <a:latin typeface="Arial" charset="0"/>
-              </a:defRPr>
-            </a:lvl4pPr>
-            <a:lvl5pPr marL="2057400" indent="-228600" defTabSz="949325" eaLnBrk="0" hangingPunct="0">
-              <a:defRPr sz="1200">
-                <a:solidFill>
-                  <a:schemeClr val="tx1"/>
-                </a:solidFill>
-                <a:latin typeface="Arial" charset="0"/>
-              </a:defRPr>
-            </a:lvl5pPr>
-            <a:lvl6pPr marL="2514600" indent="-228600" defTabSz="949325" eaLnBrk="0" fontAlgn="base" hangingPunct="0">
-              <a:spcBef>
-                <a:spcPct val="0"/>
-              </a:spcBef>
-              <a:spcAft>
-                <a:spcPct val="0"/>
-              </a:spcAft>
-              <a:defRPr sz="1200">
-                <a:solidFill>
-                  <a:schemeClr val="tx1"/>
-                </a:solidFill>
-                <a:latin typeface="Arial" charset="0"/>
-              </a:defRPr>
-            </a:lvl6pPr>
-            <a:lvl7pPr marL="2971800" indent="-228600" defTabSz="949325" eaLnBrk="0" fontAlgn="base" hangingPunct="0">
-              <a:spcBef>
-                <a:spcPct val="0"/>
-              </a:spcBef>
-              <a:spcAft>
-                <a:spcPct val="0"/>
-              </a:spcAft>
-              <a:defRPr sz="1200">
-                <a:solidFill>
-                  <a:schemeClr val="tx1"/>
-                </a:solidFill>
-                <a:latin typeface="Arial" charset="0"/>
-              </a:defRPr>
-            </a:lvl7pPr>
-            <a:lvl8pPr marL="3429000" indent="-228600" defTabSz="949325" eaLnBrk="0" fontAlgn="base" hangingPunct="0">
-              <a:spcBef>
-                <a:spcPct val="0"/>
-              </a:spcBef>
-              <a:spcAft>
-                <a:spcPct val="0"/>
-              </a:spcAft>
-              <a:defRPr sz="1200">
-                <a:solidFill>
-                  <a:schemeClr val="tx1"/>
-                </a:solidFill>
-                <a:latin typeface="Arial" charset="0"/>
-              </a:defRPr>
-            </a:lvl8pPr>
-            <a:lvl9pPr marL="3886200" indent="-228600" defTabSz="949325" eaLnBrk="0" fontAlgn="base" hangingPunct="0">
-              <a:spcBef>
-                <a:spcPct val="0"/>
-              </a:spcBef>
-              <a:spcAft>
-                <a:spcPct val="0"/>
-              </a:spcAft>
-              <a:defRPr sz="1200">
-                <a:solidFill>
-                  <a:schemeClr val="tx1"/>
-                </a:solidFill>
-                <a:latin typeface="Arial" charset="0"/>
-              </a:defRPr>
-            </a:lvl9pPr>
-          </a:lstStyle>
-          <a:p>
-            <a:pPr algn="r" eaLnBrk="1" hangingPunct="1"/>
-            <a:fld id="{4DF64DC3-509B-4839-BFB3-219CFD43D10D}" type="slidenum">
-              <a:rPr lang="de-DE"/>
-              <a:pPr algn="r" eaLnBrk="1" hangingPunct="1"/>
-              <a:t>9</a:t>
             </a:fld>
             <a:endParaRPr lang="de-DE"/>
           </a:p>
@@ -4501,422 +4283,9 @@
           <a:chExt cx="0" cy="0"/>
         </a:xfrm>
       </p:grpSpPr>
-      <p:graphicFrame>
-        <p:nvGraphicFramePr>
-          <p:cNvPr id="2" name="Tabelle 1"/>
-          <p:cNvGraphicFramePr>
-            <a:graphicFrameLocks noGrp="1"/>
-          </p:cNvGraphicFramePr>
-          <p:nvPr>
-            <p:extLst>
-              <p:ext uri="{D42A27DB-BD31-4B8C-83A1-F6EECF244321}">
-                <p14:modId xmlns:p14="http://schemas.microsoft.com/office/powerpoint/2010/main" val="2676765233"/>
-              </p:ext>
-            </p:extLst>
-          </p:nvPr>
-        </p:nvGraphicFramePr>
-        <p:xfrm>
-          <a:off x="812405" y="1933414"/>
-          <a:ext cx="7759581" cy="2115358"/>
-        </p:xfrm>
-        <a:graphic>
-          <a:graphicData uri="http://schemas.openxmlformats.org/drawingml/2006/table">
-            <a:tbl>
-              <a:tblPr firstRow="1" bandRow="1">
-                <a:tableStyleId>{5C22544A-7EE6-4342-B048-85BDC9FD1C3A}</a:tableStyleId>
-              </a:tblPr>
-              <a:tblGrid>
-                <a:gridCol w="2586527"/>
-                <a:gridCol w="2586527"/>
-                <a:gridCol w="2586527"/>
-              </a:tblGrid>
-              <a:tr h="523387">
-                <a:tc>
-                  <a:txBody>
-                    <a:bodyPr/>
-                    <a:lstStyle/>
-                    <a:p>
-                      <a:r>
-                        <a:rPr lang="de-DE" dirty="0" smtClean="0"/>
-                        <a:t>Model</a:t>
-                      </a:r>
-                      <a:endParaRPr lang="de-DE" dirty="0"/>
-                    </a:p>
-                  </a:txBody>
-                  <a:tcPr>
-                    <a:solidFill>
-                      <a:schemeClr val="accent5">
-                        <a:lumMod val="90000"/>
-                      </a:schemeClr>
-                    </a:solidFill>
-                  </a:tcPr>
-                </a:tc>
-                <a:tc>
-                  <a:txBody>
-                    <a:bodyPr/>
-                    <a:lstStyle/>
-                    <a:p>
-                      <a:pPr algn="ctr"/>
-                      <a:r>
-                        <a:rPr lang="de-DE" dirty="0" smtClean="0"/>
-                        <a:t>Precision</a:t>
-                      </a:r>
-                      <a:endParaRPr lang="de-DE" dirty="0"/>
-                    </a:p>
-                  </a:txBody>
-                  <a:tcPr/>
-                </a:tc>
-                <a:tc>
-                  <a:txBody>
-                    <a:bodyPr/>
-                    <a:lstStyle/>
-                    <a:p>
-                      <a:pPr algn="ctr"/>
-                      <a:r>
-                        <a:rPr lang="de-DE" dirty="0" smtClean="0"/>
-                        <a:t>Recall</a:t>
-                      </a:r>
-                      <a:endParaRPr lang="de-DE" dirty="0"/>
-                    </a:p>
-                  </a:txBody>
-                  <a:tcPr/>
-                </a:tc>
-              </a:tr>
-              <a:tr h="530657">
-                <a:tc>
-                  <a:txBody>
-                    <a:bodyPr/>
-                    <a:lstStyle/>
-                    <a:p>
-                      <a:pPr algn="l"/>
-                      <a:r>
-                        <a:rPr lang="de-DE" dirty="0" err="1" smtClean="0"/>
-                        <a:t>MultinomialNB</a:t>
-                      </a:r>
-                      <a:endParaRPr lang="de-DE" dirty="0"/>
-                    </a:p>
-                  </a:txBody>
-                  <a:tcPr anchor="ctr"/>
-                </a:tc>
-                <a:tc>
-                  <a:txBody>
-                    <a:bodyPr/>
-                    <a:lstStyle/>
-                    <a:p>
-                      <a:pPr algn="ctr"/>
-                      <a:r>
-                        <a:rPr lang="is-IS" dirty="0" smtClean="0"/>
-                        <a:t>0.332</a:t>
-                      </a:r>
-                      <a:endParaRPr lang="de-DE" dirty="0"/>
-                    </a:p>
-                  </a:txBody>
-                  <a:tcPr anchor="ctr"/>
-                </a:tc>
-                <a:tc>
-                  <a:txBody>
-                    <a:bodyPr/>
-                    <a:lstStyle/>
-                    <a:p>
-                      <a:pPr algn="ctr"/>
-                      <a:r>
-                        <a:rPr lang="nb-NO" dirty="0" smtClean="0"/>
-                        <a:t>0.285</a:t>
-                      </a:r>
-                      <a:endParaRPr lang="de-DE" dirty="0"/>
-                    </a:p>
-                  </a:txBody>
-                  <a:tcPr anchor="ctr"/>
-                </a:tc>
-              </a:tr>
-              <a:tr h="530657">
-                <a:tc>
-                  <a:txBody>
-                    <a:bodyPr/>
-                    <a:lstStyle/>
-                    <a:p>
-                      <a:pPr algn="l"/>
-                      <a:r>
-                        <a:rPr lang="de-DE" dirty="0" err="1" smtClean="0"/>
-                        <a:t>k-Means</a:t>
-                      </a:r>
-                      <a:r>
-                        <a:rPr lang="de-DE" dirty="0" smtClean="0"/>
-                        <a:t> </a:t>
-                      </a:r>
-                      <a:r>
-                        <a:rPr lang="de-DE" baseline="30000" dirty="0" smtClean="0"/>
-                        <a:t>1)</a:t>
-                      </a:r>
-                      <a:endParaRPr lang="de-DE" baseline="30000" dirty="0"/>
-                    </a:p>
-                  </a:txBody>
-                  <a:tcPr anchor="ctr"/>
-                </a:tc>
-                <a:tc>
-                  <a:txBody>
-                    <a:bodyPr/>
-                    <a:lstStyle/>
-                    <a:p>
-                      <a:pPr algn="ctr"/>
-                      <a:r>
-                        <a:rPr lang="de-DE" dirty="0" smtClean="0"/>
-                        <a:t>0.298</a:t>
-                      </a:r>
-                      <a:endParaRPr lang="de-DE" dirty="0"/>
-                    </a:p>
-                  </a:txBody>
-                  <a:tcPr anchor="ctr"/>
-                </a:tc>
-                <a:tc>
-                  <a:txBody>
-                    <a:bodyPr/>
-                    <a:lstStyle/>
-                    <a:p>
-                      <a:pPr algn="ctr"/>
-                      <a:r>
-                        <a:rPr lang="de-DE" dirty="0" smtClean="0"/>
-                        <a:t>0.262</a:t>
-                      </a:r>
-                      <a:endParaRPr lang="de-DE" dirty="0"/>
-                    </a:p>
-                  </a:txBody>
-                  <a:tcPr anchor="ctr"/>
-                </a:tc>
-              </a:tr>
-              <a:tr h="530657">
-                <a:tc>
-                  <a:txBody>
-                    <a:bodyPr/>
-                    <a:lstStyle/>
-                    <a:p>
-                      <a:pPr algn="l"/>
-                      <a:r>
-                        <a:rPr lang="de-DE" dirty="0" smtClean="0"/>
-                        <a:t>HAC </a:t>
-                      </a:r>
-                      <a:r>
-                        <a:rPr lang="de-DE" baseline="30000" dirty="0" smtClean="0"/>
-                        <a:t>2)</a:t>
-                      </a:r>
-                      <a:endParaRPr lang="de-DE" baseline="30000" dirty="0"/>
-                    </a:p>
-                  </a:txBody>
-                  <a:tcPr anchor="ctr"/>
-                </a:tc>
-                <a:tc>
-                  <a:txBody>
-                    <a:bodyPr/>
-                    <a:lstStyle/>
-                    <a:p>
-                      <a:pPr algn="ctr"/>
-                      <a:r>
-                        <a:rPr lang="de-DE" dirty="0" smtClean="0"/>
-                        <a:t>0.281</a:t>
-                      </a:r>
-                      <a:endParaRPr lang="de-DE" dirty="0"/>
-                    </a:p>
-                  </a:txBody>
-                  <a:tcPr anchor="ctr"/>
-                </a:tc>
-                <a:tc>
-                  <a:txBody>
-                    <a:bodyPr/>
-                    <a:lstStyle/>
-                    <a:p>
-                      <a:pPr algn="ctr"/>
-                      <a:r>
-                        <a:rPr lang="de-DE" dirty="0" smtClean="0"/>
-                        <a:t>0.255</a:t>
-                      </a:r>
-                      <a:endParaRPr lang="de-DE" dirty="0"/>
-                    </a:p>
-                  </a:txBody>
-                  <a:tcPr anchor="ctr"/>
-                </a:tc>
-              </a:tr>
-            </a:tbl>
-          </a:graphicData>
-        </a:graphic>
-      </p:graphicFrame>
       <p:sp>
         <p:nvSpPr>
-          <p:cNvPr id="5" name="Textfeld 4"/>
-          <p:cNvSpPr txBox="1"/>
-          <p:nvPr/>
-        </p:nvSpPr>
-        <p:spPr>
-          <a:xfrm>
-            <a:off x="812405" y="4675100"/>
-            <a:ext cx="7759581" cy="860748"/>
-          </a:xfrm>
-          <a:prstGeom prst="rect">
-            <a:avLst/>
-          </a:prstGeom>
-          <a:noFill/>
-        </p:spPr>
-        <p:txBody>
-          <a:bodyPr wrap="square" rtlCol="0">
-            <a:spAutoFit/>
-          </a:bodyPr>
-          <a:lstStyle/>
-          <a:p>
-            <a:pPr>
-              <a:lnSpc>
-                <a:spcPct val="120000"/>
-              </a:lnSpc>
-            </a:pPr>
-            <a:r>
-              <a:rPr lang="de-DE" sz="1400" dirty="0" smtClean="0"/>
-              <a:t>All </a:t>
-            </a:r>
-            <a:r>
-              <a:rPr lang="de-DE" sz="1400" dirty="0" err="1" smtClean="0"/>
-              <a:t>results</a:t>
-            </a:r>
-            <a:r>
-              <a:rPr lang="de-DE" sz="1400" dirty="0" smtClean="0"/>
-              <a:t> </a:t>
-            </a:r>
-            <a:r>
-              <a:rPr lang="de-DE" sz="1400" dirty="0" err="1" smtClean="0"/>
-              <a:t>are</a:t>
-            </a:r>
-            <a:r>
-              <a:rPr lang="de-DE" sz="1400" dirty="0" smtClean="0"/>
-              <a:t> </a:t>
-            </a:r>
-            <a:r>
-              <a:rPr lang="de-DE" sz="1400" dirty="0" err="1" smtClean="0"/>
-              <a:t>based</a:t>
-            </a:r>
-            <a:r>
-              <a:rPr lang="de-DE" sz="1400" dirty="0" smtClean="0"/>
-              <a:t> on </a:t>
-            </a:r>
-            <a:r>
-              <a:rPr lang="de-DE" sz="1400" u="sng" dirty="0" err="1" smtClean="0"/>
-              <a:t>two</a:t>
-            </a:r>
-            <a:r>
-              <a:rPr lang="de-DE" sz="1400" u="sng" dirty="0" smtClean="0"/>
-              <a:t> </a:t>
-            </a:r>
-            <a:r>
-              <a:rPr lang="de-DE" sz="1400" u="sng" dirty="0" err="1" smtClean="0"/>
-              <a:t>predicted</a:t>
-            </a:r>
-            <a:r>
-              <a:rPr lang="de-DE" sz="1400" u="sng" dirty="0" smtClean="0"/>
-              <a:t> tags</a:t>
-            </a:r>
-            <a:r>
-              <a:rPr lang="de-DE" sz="1400" dirty="0" smtClean="0"/>
-              <a:t> (</a:t>
-            </a:r>
-            <a:r>
-              <a:rPr lang="de-DE" sz="1400" dirty="0" err="1" smtClean="0"/>
-              <a:t>average</a:t>
-            </a:r>
-            <a:r>
-              <a:rPr lang="de-DE" sz="1400" dirty="0" smtClean="0"/>
-              <a:t> tag </a:t>
-            </a:r>
-            <a:r>
-              <a:rPr lang="de-DE" sz="1400" dirty="0" err="1" smtClean="0"/>
-              <a:t>assignment</a:t>
-            </a:r>
-            <a:r>
-              <a:rPr lang="de-DE" sz="1400" dirty="0" smtClean="0"/>
-              <a:t> = 2.68)</a:t>
-            </a:r>
-          </a:p>
-          <a:p>
-            <a:pPr>
-              <a:lnSpc>
-                <a:spcPct val="120000"/>
-              </a:lnSpc>
-            </a:pPr>
-            <a:r>
-              <a:rPr lang="de-DE" sz="1400" baseline="30000" dirty="0" smtClean="0"/>
-              <a:t>1) </a:t>
-            </a:r>
-            <a:r>
-              <a:rPr lang="de-DE" sz="1400" dirty="0" err="1" smtClean="0"/>
-              <a:t>Number</a:t>
-            </a:r>
-            <a:r>
-              <a:rPr lang="de-DE" sz="1400" dirty="0" smtClean="0"/>
-              <a:t> </a:t>
-            </a:r>
-            <a:r>
-              <a:rPr lang="de-DE" sz="1400" dirty="0" err="1" smtClean="0"/>
-              <a:t>of</a:t>
-            </a:r>
-            <a:r>
-              <a:rPr lang="de-DE" sz="1400" dirty="0" smtClean="0"/>
-              <a:t> </a:t>
-            </a:r>
-            <a:r>
-              <a:rPr lang="de-DE" sz="1400" dirty="0" err="1" smtClean="0"/>
-              <a:t>clusters</a:t>
-            </a:r>
-            <a:r>
-              <a:rPr lang="de-DE" sz="1400" dirty="0" smtClean="0"/>
-              <a:t> = #tags  </a:t>
-            </a:r>
-          </a:p>
-          <a:p>
-            <a:pPr>
-              <a:lnSpc>
-                <a:spcPct val="120000"/>
-              </a:lnSpc>
-            </a:pPr>
-            <a:r>
-              <a:rPr lang="de-DE" sz="1400" baseline="30000" dirty="0" smtClean="0"/>
-              <a:t>2) </a:t>
-            </a:r>
-            <a:r>
-              <a:rPr lang="de-DE" sz="1400" dirty="0" err="1" smtClean="0"/>
-              <a:t>Stop</a:t>
-            </a:r>
-            <a:r>
-              <a:rPr lang="de-DE" sz="1400" dirty="0" smtClean="0"/>
-              <a:t> </a:t>
-            </a:r>
-            <a:r>
-              <a:rPr lang="de-DE" sz="1400" dirty="0" err="1" smtClean="0"/>
-              <a:t>criterion</a:t>
-            </a:r>
-            <a:r>
-              <a:rPr lang="de-DE" sz="1400" dirty="0" smtClean="0"/>
-              <a:t> = #</a:t>
-            </a:r>
-            <a:r>
-              <a:rPr lang="de-DE" sz="1400" dirty="0" err="1" smtClean="0"/>
-              <a:t>clusters</a:t>
-            </a:r>
-            <a:r>
-              <a:rPr lang="de-DE" sz="1400" dirty="0" smtClean="0"/>
-              <a:t> </a:t>
-            </a:r>
-            <a:r>
-              <a:rPr lang="de-DE" sz="1400" dirty="0" smtClean="0">
-                <a:sym typeface="Wingdings"/>
-              </a:rPr>
-              <a:t> </a:t>
-            </a:r>
-            <a:r>
-              <a:rPr lang="de-DE" sz="1400" dirty="0" smtClean="0"/>
-              <a:t>#tags</a:t>
-            </a:r>
-            <a:endParaRPr lang="de-DE" sz="1400" dirty="0"/>
-          </a:p>
-        </p:txBody>
-      </p:sp>
-      <p:sp>
-        <p:nvSpPr>
-          <p:cNvPr id="8" name="Rectangle 2"/>
+          <p:cNvPr id="4" name="Rectangle 2"/>
           <p:cNvSpPr txBox="1">
             <a:spLocks noChangeArrowheads="1"/>
           </p:cNvSpPr>
@@ -5103,36 +4472,536 @@
           <a:p>
             <a:pPr eaLnBrk="1" hangingPunct="1"/>
             <a:r>
-              <a:rPr lang="de-DE" sz="1500" b="1" dirty="0" err="1" smtClean="0"/>
-              <a:t>Current</a:t>
-            </a:r>
-            <a:r>
-              <a:rPr lang="de-DE" sz="1500" b="1" dirty="0" smtClean="0"/>
-              <a:t> Approach</a:t>
-            </a:r>
-            <a:r>
               <a:rPr lang="de-DE" b="1" dirty="0" smtClean="0"/>
-              <a:t/>
-            </a:r>
-            <a:br>
-              <a:rPr lang="de-DE" b="1" dirty="0" smtClean="0"/>
-            </a:br>
-            <a:r>
-              <a:rPr lang="de-DE" b="1" dirty="0" smtClean="0"/>
-              <a:t>First </a:t>
-            </a:r>
-            <a:r>
-              <a:rPr lang="de-DE" b="1" dirty="0" err="1" smtClean="0"/>
-              <a:t>results</a:t>
+              <a:t>Problems</a:t>
             </a:r>
             <a:endParaRPr lang="de-DE" b="1" kern="0" dirty="0" smtClean="0"/>
+          </a:p>
+        </p:txBody>
+      </p:sp>
+      <p:sp>
+        <p:nvSpPr>
+          <p:cNvPr id="2" name="Textfeld 1"/>
+          <p:cNvSpPr txBox="1"/>
+          <p:nvPr/>
+        </p:nvSpPr>
+        <p:spPr>
+          <a:xfrm>
+            <a:off x="461963" y="1555747"/>
+            <a:ext cx="8224837" cy="1412694"/>
+          </a:xfrm>
+          <a:prstGeom prst="rect">
+            <a:avLst/>
+          </a:prstGeom>
+          <a:noFill/>
+        </p:spPr>
+        <p:txBody>
+          <a:bodyPr wrap="square" rtlCol="0">
+            <a:spAutoFit/>
+          </a:bodyPr>
+          <a:lstStyle/>
+          <a:p>
+            <a:pPr>
+              <a:lnSpc>
+                <a:spcPct val="120000"/>
+              </a:lnSpc>
+            </a:pPr>
+            <a:r>
+              <a:rPr lang="de-DE" sz="1800" b="1" dirty="0" err="1" smtClean="0"/>
+              <a:t>Preprocessing</a:t>
+            </a:r>
+            <a:r>
+              <a:rPr lang="de-DE" sz="1800" b="1" dirty="0" smtClean="0"/>
+              <a:t>:</a:t>
+            </a:r>
+            <a:endParaRPr lang="de-DE" sz="1800" dirty="0"/>
+          </a:p>
+          <a:p>
+            <a:pPr marL="742950" lvl="1" indent="-285750">
+              <a:lnSpc>
+                <a:spcPct val="120000"/>
+              </a:lnSpc>
+              <a:buFont typeface="Wingdings" charset="2"/>
+              <a:buChar char="§"/>
+            </a:pPr>
+            <a:r>
+              <a:rPr lang="de-DE" sz="1800" dirty="0" smtClean="0"/>
+              <a:t>H</a:t>
+            </a:r>
+            <a:r>
+              <a:rPr lang="de-DE" sz="1800" dirty="0" smtClean="0">
+                <a:sym typeface="Wingdings"/>
+              </a:rPr>
+              <a:t>igh </a:t>
+            </a:r>
+            <a:r>
+              <a:rPr lang="de-DE" sz="1800" dirty="0" err="1" smtClean="0">
+                <a:sym typeface="Wingdings"/>
+              </a:rPr>
+              <a:t>dimensionality</a:t>
+            </a:r>
+            <a:r>
+              <a:rPr lang="de-DE" sz="1800" dirty="0" smtClean="0">
+                <a:sym typeface="Wingdings"/>
+              </a:rPr>
+              <a:t>  </a:t>
+            </a:r>
+            <a:r>
+              <a:rPr lang="de-DE" sz="1800" dirty="0" err="1" smtClean="0">
+                <a:sym typeface="Wingdings"/>
+              </a:rPr>
+              <a:t>sparse</a:t>
+            </a:r>
+            <a:r>
+              <a:rPr lang="de-DE" sz="1800" dirty="0" smtClean="0">
+                <a:sym typeface="Wingdings"/>
+              </a:rPr>
+              <a:t> </a:t>
+            </a:r>
+            <a:r>
+              <a:rPr lang="de-DE" sz="1800" dirty="0" err="1" smtClean="0">
+                <a:sym typeface="Wingdings"/>
+              </a:rPr>
+              <a:t>matrix</a:t>
+            </a:r>
+            <a:endParaRPr lang="de-DE" sz="1800" dirty="0" smtClean="0">
+              <a:sym typeface="Wingdings"/>
+            </a:endParaRPr>
+          </a:p>
+          <a:p>
+            <a:pPr marL="742950" lvl="1" indent="-285750">
+              <a:lnSpc>
+                <a:spcPct val="120000"/>
+              </a:lnSpc>
+              <a:buFont typeface="Wingdings" charset="2"/>
+              <a:buChar char="§"/>
+            </a:pPr>
+            <a:r>
+              <a:rPr lang="de-DE" sz="1800" dirty="0" smtClean="0"/>
+              <a:t>POS-</a:t>
+            </a:r>
+            <a:r>
+              <a:rPr lang="de-DE" sz="1800" dirty="0" err="1" smtClean="0"/>
+              <a:t>tagging</a:t>
+            </a:r>
+            <a:r>
+              <a:rPr lang="de-DE" sz="1800" dirty="0" smtClean="0"/>
+              <a:t> </a:t>
+            </a:r>
+            <a:r>
+              <a:rPr lang="de-DE" sz="1800" dirty="0" err="1" smtClean="0"/>
+              <a:t>and</a:t>
+            </a:r>
+            <a:r>
+              <a:rPr lang="de-DE" sz="1800" dirty="0" smtClean="0"/>
+              <a:t> </a:t>
+            </a:r>
+            <a:r>
+              <a:rPr lang="de-DE" sz="1800" dirty="0" err="1" smtClean="0"/>
+              <a:t>lemmatization</a:t>
+            </a:r>
+            <a:r>
+              <a:rPr lang="de-DE" sz="1800" dirty="0" smtClean="0"/>
+              <a:t> not </a:t>
+            </a:r>
+            <a:r>
+              <a:rPr lang="de-DE" sz="1800" dirty="0" err="1" smtClean="0"/>
+              <a:t>working</a:t>
+            </a:r>
+            <a:r>
+              <a:rPr lang="de-DE" sz="1800" dirty="0" smtClean="0"/>
+              <a:t> </a:t>
+            </a:r>
+            <a:r>
+              <a:rPr lang="de-DE" sz="1800" dirty="0" err="1" smtClean="0"/>
+              <a:t>good</a:t>
+            </a:r>
+            <a:r>
+              <a:rPr lang="de-DE" sz="1800" dirty="0" smtClean="0"/>
+              <a:t> </a:t>
+            </a:r>
+            <a:r>
+              <a:rPr lang="de-DE" sz="1800" dirty="0" err="1" smtClean="0"/>
+              <a:t>enough</a:t>
+            </a:r>
+            <a:endParaRPr lang="de-DE" sz="1800" dirty="0" smtClean="0"/>
+          </a:p>
+          <a:p>
+            <a:pPr marL="742950" lvl="1" indent="-285750">
+              <a:lnSpc>
+                <a:spcPct val="120000"/>
+              </a:lnSpc>
+              <a:buFont typeface="Wingdings" charset="2"/>
+              <a:buChar char="§"/>
+            </a:pPr>
+            <a:r>
+              <a:rPr lang="de-DE" sz="1800" dirty="0" err="1" smtClean="0"/>
+              <a:t>Merge</a:t>
+            </a:r>
+            <a:r>
+              <a:rPr lang="de-DE" sz="1800" dirty="0" smtClean="0"/>
+              <a:t> </a:t>
+            </a:r>
+            <a:r>
+              <a:rPr lang="de-DE" sz="1800" dirty="0" err="1"/>
+              <a:t>s</a:t>
+            </a:r>
+            <a:r>
+              <a:rPr lang="de-DE" sz="1800" dirty="0" err="1" smtClean="0"/>
+              <a:t>ynonyms</a:t>
+            </a:r>
+            <a:r>
+              <a:rPr lang="de-DE" sz="1800" dirty="0" smtClean="0"/>
+              <a:t> </a:t>
+            </a:r>
+            <a:r>
+              <a:rPr lang="de-DE" sz="1800" dirty="0" err="1" smtClean="0"/>
+              <a:t>and</a:t>
+            </a:r>
+            <a:r>
+              <a:rPr lang="de-DE" sz="1800" dirty="0" smtClean="0"/>
+              <a:t> </a:t>
+            </a:r>
+            <a:r>
+              <a:rPr lang="de-DE" sz="1800" dirty="0" err="1" smtClean="0"/>
+              <a:t>similar</a:t>
+            </a:r>
+            <a:r>
+              <a:rPr lang="de-DE" sz="1800" dirty="0" smtClean="0"/>
+              <a:t> tags</a:t>
+            </a:r>
+            <a:endParaRPr lang="de-DE" sz="1800" dirty="0"/>
+          </a:p>
+        </p:txBody>
+      </p:sp>
+      <p:sp>
+        <p:nvSpPr>
+          <p:cNvPr id="6" name="Textfeld 5"/>
+          <p:cNvSpPr txBox="1"/>
+          <p:nvPr/>
+        </p:nvSpPr>
+        <p:spPr>
+          <a:xfrm>
+            <a:off x="461963" y="3312905"/>
+            <a:ext cx="8224837" cy="1080296"/>
+          </a:xfrm>
+          <a:prstGeom prst="rect">
+            <a:avLst/>
+          </a:prstGeom>
+          <a:noFill/>
+        </p:spPr>
+        <p:txBody>
+          <a:bodyPr wrap="square" rtlCol="0">
+            <a:spAutoFit/>
+          </a:bodyPr>
+          <a:lstStyle/>
+          <a:p>
+            <a:pPr>
+              <a:lnSpc>
+                <a:spcPct val="120000"/>
+              </a:lnSpc>
+            </a:pPr>
+            <a:r>
+              <a:rPr lang="de-DE" sz="1800" b="1" dirty="0" smtClean="0"/>
+              <a:t>Learning:</a:t>
+            </a:r>
+            <a:endParaRPr lang="de-DE" sz="1800" dirty="0"/>
+          </a:p>
+          <a:p>
+            <a:pPr marL="742950" lvl="1" indent="-285750">
+              <a:lnSpc>
+                <a:spcPct val="120000"/>
+              </a:lnSpc>
+              <a:buFont typeface="Wingdings" charset="2"/>
+              <a:buChar char="§"/>
+            </a:pPr>
+            <a:r>
+              <a:rPr lang="de-DE" sz="1800" dirty="0" err="1" smtClean="0"/>
+              <a:t>Choosing</a:t>
+            </a:r>
+            <a:r>
+              <a:rPr lang="de-DE" sz="1800" dirty="0" smtClean="0"/>
+              <a:t> proper </a:t>
+            </a:r>
+            <a:r>
+              <a:rPr lang="de-DE" sz="1800" dirty="0" err="1" smtClean="0"/>
+              <a:t>number</a:t>
+            </a:r>
+            <a:r>
+              <a:rPr lang="de-DE" sz="1800" dirty="0" smtClean="0"/>
+              <a:t> </a:t>
+            </a:r>
+            <a:r>
+              <a:rPr lang="de-DE" sz="1800" dirty="0" err="1" smtClean="0"/>
+              <a:t>of</a:t>
+            </a:r>
+            <a:r>
+              <a:rPr lang="de-DE" sz="1800" dirty="0" smtClean="0"/>
+              <a:t> </a:t>
+            </a:r>
+            <a:r>
+              <a:rPr lang="de-DE" sz="1800" dirty="0" err="1" smtClean="0"/>
+              <a:t>clusters</a:t>
+            </a:r>
+            <a:r>
+              <a:rPr lang="de-DE" sz="1800" dirty="0" smtClean="0"/>
+              <a:t> (</a:t>
+            </a:r>
+            <a:r>
+              <a:rPr lang="de-DE" sz="1800" i="1" dirty="0" err="1" smtClean="0"/>
+              <a:t>k</a:t>
+            </a:r>
+            <a:r>
+              <a:rPr lang="de-DE" sz="1800" dirty="0" smtClean="0"/>
+              <a:t>) </a:t>
+            </a:r>
+            <a:r>
+              <a:rPr lang="de-DE" sz="1800" dirty="0" smtClean="0">
+                <a:sym typeface="Wingdings"/>
+              </a:rPr>
+              <a:t> </a:t>
+            </a:r>
+            <a:r>
+              <a:rPr lang="de-DE" sz="1800" dirty="0" err="1" smtClean="0">
+                <a:sym typeface="Wingdings"/>
+              </a:rPr>
+              <a:t>dendrogram</a:t>
+            </a:r>
+            <a:r>
+              <a:rPr lang="de-DE" sz="1800" dirty="0" smtClean="0">
+                <a:sym typeface="Wingdings"/>
+              </a:rPr>
+              <a:t> </a:t>
+            </a:r>
+            <a:r>
+              <a:rPr lang="de-DE" sz="1800" dirty="0" err="1" smtClean="0">
+                <a:sym typeface="Wingdings"/>
+              </a:rPr>
+              <a:t>from</a:t>
+            </a:r>
+            <a:r>
+              <a:rPr lang="de-DE" sz="1800" dirty="0" smtClean="0">
+                <a:sym typeface="Wingdings"/>
+              </a:rPr>
+              <a:t> HAC</a:t>
+            </a:r>
+            <a:endParaRPr lang="de-DE" sz="1800" dirty="0" smtClean="0"/>
+          </a:p>
+          <a:p>
+            <a:pPr marL="742950" lvl="1" indent="-285750">
+              <a:lnSpc>
+                <a:spcPct val="120000"/>
+              </a:lnSpc>
+              <a:buFont typeface="Wingdings" charset="2"/>
+              <a:buChar char="§"/>
+            </a:pPr>
+            <a:r>
+              <a:rPr lang="de-DE" sz="1800" dirty="0" err="1" smtClean="0"/>
+              <a:t>Finding</a:t>
+            </a:r>
+            <a:r>
+              <a:rPr lang="de-DE" sz="1800" dirty="0" smtClean="0"/>
+              <a:t> </a:t>
+            </a:r>
+            <a:r>
+              <a:rPr lang="de-DE" sz="1800" dirty="0" err="1" smtClean="0"/>
+              <a:t>best</a:t>
+            </a:r>
+            <a:r>
+              <a:rPr lang="de-DE" sz="1800" dirty="0" smtClean="0"/>
+              <a:t> </a:t>
+            </a:r>
+            <a:r>
+              <a:rPr lang="de-DE" sz="1800" dirty="0" err="1" smtClean="0"/>
+              <a:t>fitting</a:t>
+            </a:r>
+            <a:r>
+              <a:rPr lang="de-DE" sz="1800" dirty="0" smtClean="0"/>
+              <a:t> </a:t>
+            </a:r>
+            <a:r>
+              <a:rPr lang="de-DE" sz="1800" dirty="0" err="1" smtClean="0"/>
+              <a:t>model</a:t>
+            </a:r>
+            <a:r>
+              <a:rPr lang="de-DE" sz="1800" dirty="0" smtClean="0"/>
+              <a:t> </a:t>
+            </a:r>
+            <a:r>
+              <a:rPr lang="de-DE" sz="1800" dirty="0" err="1" smtClean="0"/>
+              <a:t>and</a:t>
+            </a:r>
+            <a:r>
+              <a:rPr lang="de-DE" sz="1800" dirty="0" smtClean="0"/>
+              <a:t> #tags </a:t>
+            </a:r>
+            <a:r>
+              <a:rPr lang="de-DE" sz="1800" dirty="0" err="1" smtClean="0"/>
+              <a:t>to</a:t>
+            </a:r>
+            <a:r>
+              <a:rPr lang="de-DE" sz="1800" dirty="0" smtClean="0"/>
+              <a:t> </a:t>
+            </a:r>
+            <a:r>
+              <a:rPr lang="de-DE" sz="1800" dirty="0" err="1" smtClean="0"/>
+              <a:t>predict</a:t>
+            </a:r>
+            <a:endParaRPr lang="de-DE" sz="1800" dirty="0"/>
+          </a:p>
+        </p:txBody>
+      </p:sp>
+      <p:sp>
+        <p:nvSpPr>
+          <p:cNvPr id="7" name="Textfeld 6"/>
+          <p:cNvSpPr txBox="1"/>
+          <p:nvPr/>
+        </p:nvSpPr>
+        <p:spPr>
+          <a:xfrm>
+            <a:off x="461963" y="4742313"/>
+            <a:ext cx="8224837" cy="1080296"/>
+          </a:xfrm>
+          <a:prstGeom prst="rect">
+            <a:avLst/>
+          </a:prstGeom>
+          <a:noFill/>
+        </p:spPr>
+        <p:txBody>
+          <a:bodyPr wrap="square" rtlCol="0">
+            <a:spAutoFit/>
+          </a:bodyPr>
+          <a:lstStyle/>
+          <a:p>
+            <a:pPr>
+              <a:lnSpc>
+                <a:spcPct val="120000"/>
+              </a:lnSpc>
+            </a:pPr>
+            <a:r>
+              <a:rPr lang="de-DE" sz="1600" b="1" dirty="0" err="1" smtClean="0"/>
+              <a:t>Runtime</a:t>
+            </a:r>
+            <a:r>
+              <a:rPr lang="de-DE" sz="1600" b="1" dirty="0" smtClean="0"/>
+              <a:t> </a:t>
+            </a:r>
+            <a:r>
+              <a:rPr lang="de-DE" sz="1800" b="1" dirty="0" smtClean="0"/>
+              <a:t>&amp; </a:t>
+            </a:r>
+            <a:r>
+              <a:rPr lang="de-DE" sz="1800" b="1" dirty="0" err="1" smtClean="0"/>
+              <a:t>memory</a:t>
+            </a:r>
+            <a:r>
+              <a:rPr lang="de-DE" sz="1800" b="1" dirty="0" smtClean="0"/>
+              <a:t>:</a:t>
+            </a:r>
+            <a:endParaRPr lang="de-DE" sz="1800" dirty="0"/>
+          </a:p>
+          <a:p>
+            <a:pPr marL="742950" lvl="1" indent="-285750">
+              <a:lnSpc>
+                <a:spcPct val="120000"/>
+              </a:lnSpc>
+              <a:buFont typeface="Wingdings" charset="2"/>
+              <a:buChar char="§"/>
+            </a:pPr>
+            <a:r>
+              <a:rPr lang="de-DE" sz="1800" dirty="0" err="1" smtClean="0"/>
+              <a:t>Too</a:t>
+            </a:r>
+            <a:r>
+              <a:rPr lang="de-DE" sz="1800" dirty="0" smtClean="0"/>
+              <a:t> </a:t>
+            </a:r>
+            <a:r>
+              <a:rPr lang="de-DE" sz="1800" dirty="0" err="1" smtClean="0"/>
+              <a:t>many</a:t>
+            </a:r>
+            <a:r>
+              <a:rPr lang="de-DE" sz="1800" dirty="0" smtClean="0"/>
+              <a:t> </a:t>
+            </a:r>
+            <a:r>
+              <a:rPr lang="de-DE" sz="1800" dirty="0" err="1" smtClean="0"/>
+              <a:t>features</a:t>
+            </a:r>
+            <a:r>
+              <a:rPr lang="de-DE" sz="1800" dirty="0" smtClean="0"/>
+              <a:t> </a:t>
+            </a:r>
+            <a:r>
+              <a:rPr lang="de-DE" sz="1800" dirty="0" err="1" smtClean="0"/>
+              <a:t>for</a:t>
+            </a:r>
+            <a:r>
+              <a:rPr lang="de-DE" sz="1800" dirty="0" smtClean="0"/>
+              <a:t> </a:t>
+            </a:r>
+            <a:r>
+              <a:rPr lang="de-DE" sz="1800" dirty="0" err="1" smtClean="0"/>
+              <a:t>forward</a:t>
+            </a:r>
+            <a:r>
+              <a:rPr lang="de-DE" sz="1800" dirty="0" smtClean="0"/>
+              <a:t>/</a:t>
+            </a:r>
+            <a:r>
+              <a:rPr lang="de-DE" sz="1800" dirty="0" err="1" smtClean="0"/>
+              <a:t>backward</a:t>
+            </a:r>
+            <a:r>
+              <a:rPr lang="de-DE" sz="1800" dirty="0" smtClean="0"/>
+              <a:t> </a:t>
+            </a:r>
+            <a:r>
+              <a:rPr lang="de-DE" sz="1800" dirty="0" err="1" smtClean="0"/>
+              <a:t>selection</a:t>
+            </a:r>
+            <a:endParaRPr lang="de-DE" sz="1800" dirty="0"/>
+          </a:p>
+          <a:p>
+            <a:pPr marL="742950" lvl="1" indent="-285750">
+              <a:lnSpc>
+                <a:spcPct val="120000"/>
+              </a:lnSpc>
+              <a:buFont typeface="Wingdings" charset="2"/>
+              <a:buChar char="§"/>
+            </a:pPr>
+            <a:r>
+              <a:rPr lang="de-DE" sz="1800" dirty="0" smtClean="0"/>
+              <a:t>HAC </a:t>
+            </a:r>
+            <a:r>
+              <a:rPr lang="de-DE" sz="1600" dirty="0" err="1" smtClean="0"/>
+              <a:t>very</a:t>
+            </a:r>
+            <a:r>
+              <a:rPr lang="de-DE" sz="1600" dirty="0" smtClean="0"/>
+              <a:t> intensive </a:t>
+            </a:r>
+            <a:r>
+              <a:rPr lang="de-DE" sz="1600" dirty="0" err="1" smtClean="0"/>
+              <a:t>to</a:t>
+            </a:r>
+            <a:r>
+              <a:rPr lang="de-DE" sz="1600" dirty="0" smtClean="0"/>
+              <a:t> </a:t>
+            </a:r>
+            <a:r>
+              <a:rPr lang="de-DE" sz="1600" dirty="0" err="1" smtClean="0"/>
+              <a:t>compute</a:t>
+            </a:r>
+            <a:endParaRPr lang="de-DE" sz="1600" dirty="0"/>
           </a:p>
         </p:txBody>
       </p:sp>
     </p:spTree>
     <p:extLst>
       <p:ext uri="{BB962C8B-B14F-4D97-AF65-F5344CB8AC3E}">
-        <p14:creationId xmlns:p14="http://schemas.microsoft.com/office/powerpoint/2010/main" val="1843644244"/>
+        <p14:creationId xmlns:p14="http://schemas.microsoft.com/office/powerpoint/2010/main" val="373960713"/>
       </p:ext>
     </p:extLst>
   </p:cSld>
@@ -5355,8 +5224,20 @@
           <a:p>
             <a:pPr eaLnBrk="1" hangingPunct="1"/>
             <a:r>
+              <a:rPr lang="de-DE" b="1" dirty="0" err="1" smtClean="0"/>
+              <a:t>Expected</a:t>
+            </a:r>
+            <a:r>
               <a:rPr lang="de-DE" b="1" dirty="0" smtClean="0"/>
-              <a:t>Problems</a:t>
+              <a:t> </a:t>
+            </a:r>
+            <a:r>
+              <a:rPr lang="de-DE" b="1" dirty="0" err="1" smtClean="0"/>
+              <a:t>results</a:t>
+            </a:r>
+            <a:r>
+              <a:rPr lang="de-DE" b="1" dirty="0" smtClean="0"/>
+              <a:t> &amp; Outlook</a:t>
             </a:r>
             <a:endParaRPr lang="de-DE" b="1" kern="0" dirty="0" smtClean="0"/>
           </a:p>
@@ -5364,14 +5245,14 @@
       </p:sp>
       <p:sp>
         <p:nvSpPr>
-          <p:cNvPr id="2" name="Textfeld 1"/>
+          <p:cNvPr id="3" name="TextBox 2"/>
           <p:cNvSpPr txBox="1"/>
           <p:nvPr/>
         </p:nvSpPr>
         <p:spPr>
           <a:xfrm>
-            <a:off x="461963" y="1555747"/>
-            <a:ext cx="8224837" cy="1274195"/>
+            <a:off x="461963" y="1757214"/>
+            <a:ext cx="8544014" cy="3808735"/>
           </a:xfrm>
           <a:prstGeom prst="rect">
             <a:avLst/>
@@ -5386,771 +5267,11 @@
           <a:p>
             <a:pPr>
               <a:lnSpc>
-                <a:spcPct val="120000"/>
-              </a:lnSpc>
-            </a:pPr>
-            <a:r>
-              <a:rPr lang="de-DE" sz="1600" b="1" dirty="0" err="1" smtClean="0"/>
-              <a:t>Preprocessing</a:t>
-            </a:r>
-            <a:r>
-              <a:rPr lang="de-DE" sz="1600" b="1" dirty="0" smtClean="0"/>
-              <a:t>:</a:t>
-            </a:r>
-            <a:endParaRPr lang="de-DE" sz="1600" dirty="0"/>
-          </a:p>
-          <a:p>
-            <a:pPr marL="742950" lvl="1" indent="-285750">
-              <a:lnSpc>
-                <a:spcPct val="120000"/>
-              </a:lnSpc>
-              <a:buFont typeface="Wingdings" charset="2"/>
-              <a:buChar char="§"/>
-            </a:pPr>
-            <a:r>
-              <a:rPr lang="de-DE" sz="1600" dirty="0" smtClean="0"/>
-              <a:t>H</a:t>
-            </a:r>
-            <a:r>
-              <a:rPr lang="de-DE" sz="1600" dirty="0" smtClean="0">
-                <a:sym typeface="Wingdings"/>
-              </a:rPr>
-              <a:t>igh </a:t>
-            </a:r>
-            <a:r>
-              <a:rPr lang="de-DE" sz="1600" dirty="0" err="1" smtClean="0">
-                <a:sym typeface="Wingdings"/>
-              </a:rPr>
-              <a:t>dimensionality</a:t>
-            </a:r>
-            <a:r>
-              <a:rPr lang="de-DE" sz="1600" dirty="0" smtClean="0">
-                <a:sym typeface="Wingdings"/>
-              </a:rPr>
-              <a:t>  </a:t>
-            </a:r>
-            <a:r>
-              <a:rPr lang="de-DE" sz="1600" dirty="0" err="1" smtClean="0">
-                <a:sym typeface="Wingdings"/>
-              </a:rPr>
-              <a:t>sparse</a:t>
-            </a:r>
-            <a:r>
-              <a:rPr lang="de-DE" sz="1600" dirty="0" smtClean="0">
-                <a:sym typeface="Wingdings"/>
-              </a:rPr>
-              <a:t> </a:t>
-            </a:r>
-            <a:r>
-              <a:rPr lang="de-DE" sz="1600" dirty="0" err="1" smtClean="0">
-                <a:sym typeface="Wingdings"/>
-              </a:rPr>
-              <a:t>matrix</a:t>
-            </a:r>
-            <a:endParaRPr lang="de-DE" sz="1600" dirty="0" smtClean="0">
-              <a:sym typeface="Wingdings"/>
-            </a:endParaRPr>
-          </a:p>
-          <a:p>
-            <a:pPr marL="742950" lvl="1" indent="-285750">
-              <a:lnSpc>
-                <a:spcPct val="120000"/>
-              </a:lnSpc>
-              <a:buFont typeface="Wingdings" charset="2"/>
-              <a:buChar char="§"/>
-            </a:pPr>
-            <a:r>
-              <a:rPr lang="de-DE" sz="1600" dirty="0" smtClean="0"/>
-              <a:t>POS-</a:t>
-            </a:r>
-            <a:r>
-              <a:rPr lang="de-DE" sz="1600" dirty="0" err="1" smtClean="0"/>
-              <a:t>tagging</a:t>
-            </a:r>
-            <a:r>
-              <a:rPr lang="de-DE" sz="1600" dirty="0" smtClean="0"/>
-              <a:t> </a:t>
-            </a:r>
-            <a:r>
-              <a:rPr lang="de-DE" sz="1600" dirty="0" err="1" smtClean="0"/>
-              <a:t>and</a:t>
-            </a:r>
-            <a:r>
-              <a:rPr lang="de-DE" sz="1600" dirty="0" smtClean="0"/>
-              <a:t> </a:t>
-            </a:r>
-            <a:r>
-              <a:rPr lang="de-DE" sz="1600" dirty="0" err="1" smtClean="0"/>
-              <a:t>lemmatization</a:t>
-            </a:r>
-            <a:r>
-              <a:rPr lang="de-DE" sz="1600" dirty="0" smtClean="0"/>
-              <a:t> not </a:t>
-            </a:r>
-            <a:r>
-              <a:rPr lang="de-DE" sz="1600" dirty="0" err="1" smtClean="0"/>
-              <a:t>working</a:t>
-            </a:r>
-            <a:r>
-              <a:rPr lang="de-DE" sz="1600" dirty="0" smtClean="0"/>
-              <a:t> </a:t>
-            </a:r>
-            <a:r>
-              <a:rPr lang="de-DE" sz="1600" dirty="0" err="1" smtClean="0"/>
-              <a:t>good</a:t>
-            </a:r>
-            <a:r>
-              <a:rPr lang="de-DE" sz="1600" dirty="0" smtClean="0"/>
-              <a:t> </a:t>
-            </a:r>
-            <a:r>
-              <a:rPr lang="de-DE" sz="1600" dirty="0" err="1" smtClean="0"/>
-              <a:t>enough</a:t>
-            </a:r>
-            <a:endParaRPr lang="de-DE" sz="1600" dirty="0" smtClean="0"/>
-          </a:p>
-          <a:p>
-            <a:pPr marL="742950" lvl="1" indent="-285750">
-              <a:lnSpc>
-                <a:spcPct val="120000"/>
-              </a:lnSpc>
-              <a:buFont typeface="Wingdings" charset="2"/>
-              <a:buChar char="§"/>
-            </a:pPr>
-            <a:r>
-              <a:rPr lang="de-DE" sz="1600" dirty="0" err="1" smtClean="0"/>
-              <a:t>Merge</a:t>
-            </a:r>
-            <a:r>
-              <a:rPr lang="de-DE" sz="1600" dirty="0" smtClean="0"/>
-              <a:t> </a:t>
-            </a:r>
-            <a:r>
-              <a:rPr lang="de-DE" sz="1600" dirty="0" err="1"/>
-              <a:t>s</a:t>
-            </a:r>
-            <a:r>
-              <a:rPr lang="de-DE" sz="1600" dirty="0" err="1" smtClean="0"/>
-              <a:t>ynonyms</a:t>
-            </a:r>
-            <a:r>
-              <a:rPr lang="de-DE" sz="1600" dirty="0" smtClean="0"/>
-              <a:t> </a:t>
-            </a:r>
-            <a:r>
-              <a:rPr lang="de-DE" sz="1600" dirty="0" err="1" smtClean="0"/>
-              <a:t>and</a:t>
-            </a:r>
-            <a:r>
-              <a:rPr lang="de-DE" sz="1600" dirty="0" smtClean="0"/>
-              <a:t> </a:t>
-            </a:r>
-            <a:r>
-              <a:rPr lang="de-DE" sz="1600" dirty="0" err="1" smtClean="0"/>
-              <a:t>similar</a:t>
-            </a:r>
-            <a:r>
-              <a:rPr lang="de-DE" sz="1600" dirty="0" smtClean="0"/>
-              <a:t> tags</a:t>
-            </a:r>
-            <a:endParaRPr lang="de-DE" sz="1600" dirty="0"/>
-          </a:p>
-        </p:txBody>
-      </p:sp>
-      <p:sp>
-        <p:nvSpPr>
-          <p:cNvPr id="6" name="Textfeld 5"/>
-          <p:cNvSpPr txBox="1"/>
-          <p:nvPr/>
-        </p:nvSpPr>
-        <p:spPr>
-          <a:xfrm>
-            <a:off x="461963" y="3071605"/>
-            <a:ext cx="8224837" cy="970522"/>
-          </a:xfrm>
-          <a:prstGeom prst="rect">
-            <a:avLst/>
-          </a:prstGeom>
-          <a:noFill/>
-        </p:spPr>
-        <p:txBody>
-          <a:bodyPr wrap="square" rtlCol="0">
-            <a:spAutoFit/>
-          </a:bodyPr>
-          <a:lstStyle/>
-          <a:p>
-            <a:pPr>
-              <a:lnSpc>
-                <a:spcPct val="120000"/>
-              </a:lnSpc>
-            </a:pPr>
-            <a:r>
-              <a:rPr lang="de-DE" sz="1600" b="1" dirty="0" smtClean="0"/>
-              <a:t>Learning:</a:t>
-            </a:r>
-            <a:endParaRPr lang="de-DE" sz="1600" dirty="0"/>
-          </a:p>
-          <a:p>
-            <a:pPr marL="742950" lvl="1" indent="-285750">
-              <a:lnSpc>
-                <a:spcPct val="120000"/>
-              </a:lnSpc>
-              <a:buFont typeface="Wingdings" charset="2"/>
-              <a:buChar char="§"/>
-            </a:pPr>
-            <a:r>
-              <a:rPr lang="de-DE" sz="1600" dirty="0" err="1" smtClean="0"/>
-              <a:t>Choosing</a:t>
-            </a:r>
-            <a:r>
-              <a:rPr lang="de-DE" sz="1600" dirty="0" smtClean="0"/>
-              <a:t> proper </a:t>
-            </a:r>
-            <a:r>
-              <a:rPr lang="de-DE" sz="1600" dirty="0" err="1" smtClean="0"/>
-              <a:t>number</a:t>
-            </a:r>
-            <a:r>
-              <a:rPr lang="de-DE" sz="1600" dirty="0" smtClean="0"/>
-              <a:t> </a:t>
-            </a:r>
-            <a:r>
-              <a:rPr lang="de-DE" sz="1600" dirty="0" err="1" smtClean="0"/>
-              <a:t>of</a:t>
-            </a:r>
-            <a:r>
-              <a:rPr lang="de-DE" sz="1600" dirty="0" smtClean="0"/>
-              <a:t> </a:t>
-            </a:r>
-            <a:r>
-              <a:rPr lang="de-DE" sz="1600" dirty="0" err="1" smtClean="0"/>
-              <a:t>clusters</a:t>
-            </a:r>
-            <a:r>
-              <a:rPr lang="de-DE" sz="1600" dirty="0" smtClean="0"/>
-              <a:t> (</a:t>
-            </a:r>
-            <a:r>
-              <a:rPr lang="de-DE" sz="1600" i="1" dirty="0" err="1" smtClean="0"/>
-              <a:t>k</a:t>
-            </a:r>
-            <a:r>
-              <a:rPr lang="de-DE" sz="1600" dirty="0" smtClean="0"/>
-              <a:t>) </a:t>
-            </a:r>
-            <a:r>
-              <a:rPr lang="de-DE" sz="1600" dirty="0" smtClean="0">
-                <a:sym typeface="Wingdings"/>
-              </a:rPr>
-              <a:t> </a:t>
-            </a:r>
-            <a:r>
-              <a:rPr lang="de-DE" sz="1600" dirty="0" err="1" smtClean="0">
-                <a:sym typeface="Wingdings"/>
-              </a:rPr>
-              <a:t>dendrogram</a:t>
-            </a:r>
-            <a:r>
-              <a:rPr lang="de-DE" sz="1600" dirty="0" smtClean="0">
-                <a:sym typeface="Wingdings"/>
-              </a:rPr>
-              <a:t> </a:t>
-            </a:r>
-            <a:r>
-              <a:rPr lang="de-DE" sz="1600" dirty="0" err="1" smtClean="0">
-                <a:sym typeface="Wingdings"/>
-              </a:rPr>
-              <a:t>from</a:t>
-            </a:r>
-            <a:r>
-              <a:rPr lang="de-DE" sz="1600" dirty="0" smtClean="0">
-                <a:sym typeface="Wingdings"/>
-              </a:rPr>
-              <a:t> HAC</a:t>
-            </a:r>
-            <a:endParaRPr lang="de-DE" sz="1600" dirty="0" smtClean="0"/>
-          </a:p>
-          <a:p>
-            <a:pPr marL="742950" lvl="1" indent="-285750">
-              <a:lnSpc>
-                <a:spcPct val="120000"/>
-              </a:lnSpc>
-              <a:buFont typeface="Wingdings" charset="2"/>
-              <a:buChar char="§"/>
-            </a:pPr>
-            <a:r>
-              <a:rPr lang="de-DE" sz="1600" dirty="0" err="1" smtClean="0"/>
-              <a:t>Finding</a:t>
-            </a:r>
-            <a:r>
-              <a:rPr lang="de-DE" sz="1600" dirty="0" smtClean="0"/>
-              <a:t> </a:t>
-            </a:r>
-            <a:r>
-              <a:rPr lang="de-DE" sz="1600" dirty="0" err="1" smtClean="0"/>
-              <a:t>best</a:t>
-            </a:r>
-            <a:r>
-              <a:rPr lang="de-DE" sz="1600" dirty="0" smtClean="0"/>
-              <a:t> </a:t>
-            </a:r>
-            <a:r>
-              <a:rPr lang="de-DE" sz="1600" dirty="0" err="1" smtClean="0"/>
-              <a:t>fitting</a:t>
-            </a:r>
-            <a:r>
-              <a:rPr lang="de-DE" sz="1600" dirty="0" smtClean="0"/>
-              <a:t> </a:t>
-            </a:r>
-            <a:r>
-              <a:rPr lang="de-DE" sz="1600" dirty="0" err="1" smtClean="0"/>
-              <a:t>model</a:t>
-            </a:r>
-            <a:r>
-              <a:rPr lang="de-DE" sz="1600" dirty="0" smtClean="0"/>
-              <a:t> </a:t>
-            </a:r>
-            <a:r>
-              <a:rPr lang="de-DE" sz="1600" dirty="0" err="1" smtClean="0"/>
-              <a:t>and</a:t>
-            </a:r>
-            <a:r>
-              <a:rPr lang="de-DE" sz="1600" dirty="0" smtClean="0"/>
-              <a:t> #tags </a:t>
-            </a:r>
-            <a:r>
-              <a:rPr lang="de-DE" sz="1600" dirty="0" err="1" smtClean="0"/>
-              <a:t>to</a:t>
-            </a:r>
-            <a:r>
-              <a:rPr lang="de-DE" sz="1600" dirty="0" smtClean="0"/>
-              <a:t> </a:t>
-            </a:r>
-            <a:r>
-              <a:rPr lang="de-DE" sz="1600" dirty="0" err="1" smtClean="0"/>
-              <a:t>predict</a:t>
-            </a:r>
-            <a:endParaRPr lang="de-DE" sz="1600" dirty="0"/>
-          </a:p>
-        </p:txBody>
-      </p:sp>
-      <p:sp>
-        <p:nvSpPr>
-          <p:cNvPr id="7" name="Textfeld 6"/>
-          <p:cNvSpPr txBox="1"/>
-          <p:nvPr/>
-        </p:nvSpPr>
-        <p:spPr>
-          <a:xfrm>
-            <a:off x="461963" y="4374013"/>
-            <a:ext cx="8224837" cy="970522"/>
-          </a:xfrm>
-          <a:prstGeom prst="rect">
-            <a:avLst/>
-          </a:prstGeom>
-          <a:noFill/>
-        </p:spPr>
-        <p:txBody>
-          <a:bodyPr wrap="square" rtlCol="0">
-            <a:spAutoFit/>
-          </a:bodyPr>
-          <a:lstStyle/>
-          <a:p>
-            <a:pPr>
-              <a:lnSpc>
-                <a:spcPct val="120000"/>
-              </a:lnSpc>
-            </a:pPr>
-            <a:r>
-              <a:rPr lang="de-DE" sz="1600" b="1" dirty="0" err="1" smtClean="0"/>
-              <a:t>Runtime</a:t>
-            </a:r>
-            <a:r>
-              <a:rPr lang="de-DE" sz="1600" b="1" dirty="0" smtClean="0"/>
-              <a:t> &amp; </a:t>
-            </a:r>
-            <a:r>
-              <a:rPr lang="de-DE" sz="1600" b="1" dirty="0" err="1" smtClean="0"/>
-              <a:t>memory</a:t>
-            </a:r>
-            <a:r>
-              <a:rPr lang="de-DE" sz="1600" b="1" dirty="0" smtClean="0"/>
-              <a:t>:</a:t>
-            </a:r>
-            <a:endParaRPr lang="de-DE" sz="1600" dirty="0"/>
-          </a:p>
-          <a:p>
-            <a:pPr marL="742950" lvl="1" indent="-285750">
-              <a:lnSpc>
-                <a:spcPct val="120000"/>
-              </a:lnSpc>
-              <a:buFont typeface="Wingdings" charset="2"/>
-              <a:buChar char="§"/>
-            </a:pPr>
-            <a:r>
-              <a:rPr lang="de-DE" sz="1600" dirty="0" err="1" smtClean="0"/>
-              <a:t>Too</a:t>
-            </a:r>
-            <a:r>
-              <a:rPr lang="de-DE" sz="1600" dirty="0" smtClean="0"/>
-              <a:t> </a:t>
-            </a:r>
-            <a:r>
-              <a:rPr lang="de-DE" sz="1600" dirty="0" err="1" smtClean="0"/>
-              <a:t>many</a:t>
-            </a:r>
-            <a:r>
-              <a:rPr lang="de-DE" sz="1600" dirty="0" smtClean="0"/>
-              <a:t> </a:t>
-            </a:r>
-            <a:r>
-              <a:rPr lang="de-DE" sz="1600" dirty="0" err="1" smtClean="0"/>
-              <a:t>features</a:t>
-            </a:r>
-            <a:r>
-              <a:rPr lang="de-DE" sz="1600" dirty="0" smtClean="0"/>
-              <a:t> </a:t>
-            </a:r>
-            <a:r>
-              <a:rPr lang="de-DE" sz="1600" dirty="0" err="1" smtClean="0"/>
-              <a:t>for</a:t>
-            </a:r>
-            <a:r>
-              <a:rPr lang="de-DE" sz="1600" dirty="0" smtClean="0"/>
-              <a:t> </a:t>
-            </a:r>
-            <a:r>
-              <a:rPr lang="de-DE" sz="1600" dirty="0" err="1" smtClean="0"/>
-              <a:t>forward</a:t>
-            </a:r>
-            <a:r>
-              <a:rPr lang="de-DE" sz="1600" dirty="0" smtClean="0"/>
-              <a:t>/</a:t>
-            </a:r>
-            <a:r>
-              <a:rPr lang="de-DE" sz="1600" dirty="0" err="1" smtClean="0"/>
-              <a:t>backward</a:t>
-            </a:r>
-            <a:r>
-              <a:rPr lang="de-DE" sz="1600" dirty="0" smtClean="0"/>
-              <a:t> </a:t>
-            </a:r>
-            <a:r>
-              <a:rPr lang="de-DE" sz="1600" dirty="0" err="1" smtClean="0"/>
-              <a:t>selection</a:t>
-            </a:r>
-            <a:endParaRPr lang="de-DE" sz="1600" dirty="0"/>
-          </a:p>
-          <a:p>
-            <a:pPr marL="742950" lvl="1" indent="-285750">
-              <a:lnSpc>
-                <a:spcPct val="120000"/>
-              </a:lnSpc>
-              <a:buFont typeface="Wingdings" charset="2"/>
-              <a:buChar char="§"/>
-            </a:pPr>
-            <a:r>
-              <a:rPr lang="de-DE" sz="1600" dirty="0" smtClean="0"/>
-              <a:t>HAC </a:t>
-            </a:r>
-            <a:r>
-              <a:rPr lang="de-DE" sz="1600" dirty="0" err="1" smtClean="0"/>
-              <a:t>very</a:t>
-            </a:r>
-            <a:r>
-              <a:rPr lang="de-DE" sz="1600" dirty="0" smtClean="0"/>
-              <a:t> intensive </a:t>
-            </a:r>
-            <a:r>
-              <a:rPr lang="de-DE" sz="1600" dirty="0" err="1" smtClean="0"/>
-              <a:t>to</a:t>
-            </a:r>
-            <a:r>
-              <a:rPr lang="de-DE" sz="1600" dirty="0" smtClean="0"/>
-              <a:t> </a:t>
-            </a:r>
-            <a:r>
-              <a:rPr lang="de-DE" sz="1600" dirty="0" err="1" smtClean="0"/>
-              <a:t>compute</a:t>
-            </a:r>
-            <a:endParaRPr lang="de-DE" sz="1600" dirty="0"/>
-          </a:p>
-        </p:txBody>
-      </p:sp>
-    </p:spTree>
-    <p:extLst>
-      <p:ext uri="{BB962C8B-B14F-4D97-AF65-F5344CB8AC3E}">
-        <p14:creationId xmlns:p14="http://schemas.microsoft.com/office/powerpoint/2010/main" val="373960713"/>
-      </p:ext>
-    </p:extLst>
-  </p:cSld>
-  <p:clrMapOvr>
-    <a:masterClrMapping/>
-  </p:clrMapOvr>
-  <p:timing>
-    <p:tnLst>
-      <p:par>
-        <p:cTn xmlns:p14="http://schemas.microsoft.com/office/powerpoint/2010/main" id="1" dur="indefinite" restart="never" nodeType="tmRoot"/>
-      </p:par>
-    </p:tnLst>
-  </p:timing>
-</p:sld>
-</file>
-
-<file path=ppt/slides/slide12.xml><?xml version="1.0" encoding="utf-8"?>
-<p:sld xmlns:a="http://schemas.openxmlformats.org/drawingml/2006/main" xmlns:r="http://schemas.openxmlformats.org/officeDocument/2006/relationships" xmlns:p="http://schemas.openxmlformats.org/presentationml/2006/main">
-  <p:cSld>
-    <p:spTree>
-      <p:nvGrpSpPr>
-        <p:cNvPr id="1" name=""/>
-        <p:cNvGrpSpPr/>
-        <p:nvPr/>
-      </p:nvGrpSpPr>
-      <p:grpSpPr>
-        <a:xfrm>
-          <a:off x="0" y="0"/>
-          <a:ext cx="0" cy="0"/>
-          <a:chOff x="0" y="0"/>
-          <a:chExt cx="0" cy="0"/>
-        </a:xfrm>
-      </p:grpSpPr>
-      <p:sp>
-        <p:nvSpPr>
-          <p:cNvPr id="4" name="Rectangle 2"/>
-          <p:cNvSpPr txBox="1">
-            <a:spLocks noChangeArrowheads="1"/>
-          </p:cNvSpPr>
-          <p:nvPr/>
-        </p:nvSpPr>
-        <p:spPr bwMode="auto">
-          <a:xfrm>
-            <a:off x="461963" y="485772"/>
-            <a:ext cx="8224837" cy="1069975"/>
-          </a:xfrm>
-          <a:prstGeom prst="rect">
-            <a:avLst/>
-          </a:prstGeom>
-          <a:noFill/>
-          <a:ln>
-            <a:noFill/>
-          </a:ln>
-          <a:effectLst/>
-          <a:extLst>
-            <a:ext uri="{909E8E84-426E-40dd-AFC4-6F175D3DCCD1}">
-              <a14:hiddenFill xmlns:a14="http://schemas.microsoft.com/office/drawing/2010/main">
-                <a:solidFill>
-                  <a:schemeClr val="accent1"/>
-                </a:solidFill>
-              </a14:hiddenFill>
-            </a:ext>
-            <a:ext uri="{91240B29-F687-4f45-9708-019B960494DF}">
-              <a14:hiddenLine xmlns:a14="http://schemas.microsoft.com/office/drawing/2010/main" w="9525">
-                <a:solidFill>
-                  <a:schemeClr val="tx1"/>
-                </a:solidFill>
-                <a:miter lim="800000"/>
-                <a:headEnd/>
-                <a:tailEnd/>
-              </a14:hiddenLine>
-            </a:ext>
-            <a:ext uri="{AF507438-7753-43e0-B8FC-AC1667EBCBE1}">
-              <a14:hiddenEffects xmlns:a14="http://schemas.microsoft.com/office/drawing/2010/main">
-                <a:effectLst>
-                  <a:outerShdw dist="35921" dir="2700000" algn="ctr" rotWithShape="0">
-                    <a:schemeClr val="bg2"/>
-                  </a:outerShdw>
-                </a:effectLst>
-              </a14:hiddenEffects>
-            </a:ext>
-          </a:extLst>
-        </p:spPr>
-        <p:txBody>
-          <a:bodyPr vert="horz" wrap="square" lIns="91440" tIns="45720" rIns="91440" bIns="45720" numCol="1" anchor="ctr" anchorCtr="0" compatLnSpc="1">
-            <a:prstTxWarp prst="textNoShape">
-              <a:avLst/>
-            </a:prstTxWarp>
-          </a:bodyPr>
-          <a:lstStyle>
-            <a:lvl1pPr algn="ctr" rtl="0" eaLnBrk="0" fontAlgn="base" hangingPunct="0">
-              <a:spcBef>
-                <a:spcPct val="0"/>
-              </a:spcBef>
-              <a:spcAft>
-                <a:spcPct val="0"/>
-              </a:spcAft>
-              <a:defRPr sz="3200">
-                <a:solidFill>
-                  <a:schemeClr val="bg2"/>
-                </a:solidFill>
-                <a:latin typeface="+mj-lt"/>
-                <a:ea typeface="+mj-ea"/>
-                <a:cs typeface="+mj-cs"/>
-              </a:defRPr>
-            </a:lvl1pPr>
-            <a:lvl2pPr algn="ctr" rtl="0" eaLnBrk="0" fontAlgn="base" hangingPunct="0">
-              <a:spcBef>
-                <a:spcPct val="0"/>
-              </a:spcBef>
-              <a:spcAft>
-                <a:spcPct val="0"/>
-              </a:spcAft>
-              <a:defRPr sz="3200">
-                <a:solidFill>
-                  <a:schemeClr val="bg2"/>
-                </a:solidFill>
-                <a:latin typeface="Arial" charset="0"/>
-              </a:defRPr>
-            </a:lvl2pPr>
-            <a:lvl3pPr algn="ctr" rtl="0" eaLnBrk="0" fontAlgn="base" hangingPunct="0">
-              <a:spcBef>
-                <a:spcPct val="0"/>
-              </a:spcBef>
-              <a:spcAft>
-                <a:spcPct val="0"/>
-              </a:spcAft>
-              <a:defRPr sz="3200">
-                <a:solidFill>
-                  <a:schemeClr val="bg2"/>
-                </a:solidFill>
-                <a:latin typeface="Arial" charset="0"/>
-              </a:defRPr>
-            </a:lvl3pPr>
-            <a:lvl4pPr algn="ctr" rtl="0" eaLnBrk="0" fontAlgn="base" hangingPunct="0">
-              <a:spcBef>
-                <a:spcPct val="0"/>
-              </a:spcBef>
-              <a:spcAft>
-                <a:spcPct val="0"/>
-              </a:spcAft>
-              <a:defRPr sz="3200">
-                <a:solidFill>
-                  <a:schemeClr val="bg2"/>
-                </a:solidFill>
-                <a:latin typeface="Arial" charset="0"/>
-              </a:defRPr>
-            </a:lvl4pPr>
-            <a:lvl5pPr algn="ctr" rtl="0" eaLnBrk="0" fontAlgn="base" hangingPunct="0">
-              <a:spcBef>
-                <a:spcPct val="0"/>
-              </a:spcBef>
-              <a:spcAft>
-                <a:spcPct val="0"/>
-              </a:spcAft>
-              <a:defRPr sz="3200">
-                <a:solidFill>
-                  <a:schemeClr val="bg2"/>
-                </a:solidFill>
-                <a:latin typeface="Arial" charset="0"/>
-              </a:defRPr>
-            </a:lvl5pPr>
-            <a:lvl6pPr marL="457200" algn="ctr" rtl="0" fontAlgn="base">
-              <a:spcBef>
-                <a:spcPct val="0"/>
-              </a:spcBef>
-              <a:spcAft>
-                <a:spcPct val="0"/>
-              </a:spcAft>
-              <a:defRPr sz="3200">
-                <a:solidFill>
-                  <a:schemeClr val="bg2"/>
-                </a:solidFill>
-                <a:latin typeface="Arial" charset="0"/>
-              </a:defRPr>
-            </a:lvl6pPr>
-            <a:lvl7pPr marL="914400" algn="ctr" rtl="0" fontAlgn="base">
-              <a:spcBef>
-                <a:spcPct val="0"/>
-              </a:spcBef>
-              <a:spcAft>
-                <a:spcPct val="0"/>
-              </a:spcAft>
-              <a:defRPr sz="3200">
-                <a:solidFill>
-                  <a:schemeClr val="bg2"/>
-                </a:solidFill>
-                <a:latin typeface="Arial" charset="0"/>
-              </a:defRPr>
-            </a:lvl7pPr>
-            <a:lvl8pPr marL="1371600" algn="ctr" rtl="0" fontAlgn="base">
-              <a:spcBef>
-                <a:spcPct val="0"/>
-              </a:spcBef>
-              <a:spcAft>
-                <a:spcPct val="0"/>
-              </a:spcAft>
-              <a:defRPr sz="3200">
-                <a:solidFill>
-                  <a:schemeClr val="bg2"/>
-                </a:solidFill>
-                <a:latin typeface="Arial" charset="0"/>
-              </a:defRPr>
-            </a:lvl8pPr>
-            <a:lvl9pPr marL="1828800" algn="ctr" rtl="0" fontAlgn="base">
-              <a:spcBef>
-                <a:spcPct val="0"/>
-              </a:spcBef>
-              <a:spcAft>
-                <a:spcPct val="0"/>
-              </a:spcAft>
-              <a:defRPr sz="3200">
-                <a:solidFill>
-                  <a:schemeClr val="bg2"/>
-                </a:solidFill>
-                <a:latin typeface="Arial" charset="0"/>
-              </a:defRPr>
-            </a:lvl9pPr>
-          </a:lstStyle>
-          <a:p>
-            <a:pPr eaLnBrk="1" hangingPunct="1"/>
-            <a:r>
-              <a:rPr lang="de-DE" b="1" dirty="0" err="1" smtClean="0"/>
-              <a:t>Expected</a:t>
-            </a:r>
-            <a:r>
-              <a:rPr lang="de-DE" b="1" dirty="0" smtClean="0"/>
-              <a:t> </a:t>
-            </a:r>
-            <a:r>
-              <a:rPr lang="de-DE" b="1" dirty="0" err="1" smtClean="0"/>
-              <a:t>results</a:t>
-            </a:r>
-            <a:r>
-              <a:rPr lang="de-DE" b="1" dirty="0" smtClean="0"/>
-              <a:t> &amp; Outlook</a:t>
-            </a:r>
-            <a:endParaRPr lang="de-DE" b="1" kern="0" dirty="0" smtClean="0"/>
-          </a:p>
-        </p:txBody>
-      </p:sp>
-      <p:sp>
-        <p:nvSpPr>
-          <p:cNvPr id="3" name="TextBox 2"/>
-          <p:cNvSpPr txBox="1"/>
-          <p:nvPr/>
-        </p:nvSpPr>
-        <p:spPr>
-          <a:xfrm>
-            <a:off x="461963" y="1757214"/>
-            <a:ext cx="8544014" cy="3395802"/>
-          </a:xfrm>
-          <a:prstGeom prst="rect">
-            <a:avLst/>
-          </a:prstGeom>
-          <a:noFill/>
-        </p:spPr>
-        <p:txBody>
-          <a:bodyPr wrap="square" rtlCol="0">
-            <a:spAutoFit/>
-          </a:bodyPr>
-          <a:lstStyle/>
-          <a:p>
-            <a:pPr>
-              <a:lnSpc>
                 <a:spcPct val="150000"/>
               </a:lnSpc>
             </a:pPr>
             <a:r>
-              <a:rPr lang="en-US" sz="1600" b="1" dirty="0" smtClean="0"/>
+              <a:rPr lang="en-US" sz="1800" b="1" dirty="0" smtClean="0"/>
               <a:t>Expected results:</a:t>
             </a:r>
           </a:p>
@@ -6163,7 +5284,7 @@
               <a:buChar char="§"/>
             </a:pPr>
             <a:r>
-              <a:rPr lang="en-US" sz="1600" dirty="0" smtClean="0"/>
+              <a:rPr lang="en-US" sz="1800" dirty="0" smtClean="0"/>
               <a:t>F1 not ideal but tags are reasonable</a:t>
             </a:r>
           </a:p>
@@ -6176,7 +5297,7 @@
               <a:buChar char="§"/>
             </a:pPr>
             <a:r>
-              <a:rPr lang="en-US" sz="1600" dirty="0" smtClean="0"/>
+              <a:rPr lang="en-US" sz="1800" dirty="0" smtClean="0"/>
               <a:t>Precision decreases by the number of suggested tags</a:t>
             </a:r>
           </a:p>
@@ -6189,7 +5310,7 @@
               <a:buChar char="§"/>
             </a:pPr>
             <a:r>
-              <a:rPr lang="en-US" sz="1600" dirty="0" smtClean="0"/>
+              <a:rPr lang="en-US" sz="1800" dirty="0" smtClean="0"/>
               <a:t>Recall increases by the number of suggested tags</a:t>
             </a:r>
           </a:p>
@@ -6201,7 +5322,7 @@
               <a:buFont typeface="Wingdings" charset="2"/>
               <a:buChar char="§"/>
             </a:pPr>
-            <a:endParaRPr lang="en-US" sz="1600" dirty="0" smtClean="0"/>
+            <a:endParaRPr lang="en-US" sz="1800" dirty="0" smtClean="0"/>
           </a:p>
           <a:p>
             <a:pPr>
@@ -6210,7 +5331,7 @@
               </a:lnSpc>
             </a:pPr>
             <a:r>
-              <a:rPr lang="en-US" sz="1600" b="1" dirty="0" smtClean="0"/>
+              <a:rPr lang="en-US" sz="1800" b="1" dirty="0" smtClean="0"/>
               <a:t>Outlook:</a:t>
             </a:r>
           </a:p>
@@ -6223,7 +5344,7 @@
               <a:buChar char="§"/>
             </a:pPr>
             <a:r>
-              <a:rPr lang="en-US" sz="1600" dirty="0" smtClean="0"/>
+              <a:rPr lang="en-US" sz="1800" dirty="0" smtClean="0"/>
               <a:t>Improve preprocessing</a:t>
             </a:r>
           </a:p>
@@ -6236,19 +5357,19 @@
               <a:buChar char="§"/>
             </a:pPr>
             <a:r>
-              <a:rPr lang="en-US" sz="1600" dirty="0" smtClean="0"/>
+              <a:rPr lang="en-US" sz="1800" dirty="0" smtClean="0"/>
               <a:t>Use different (more independent) features for Na</a:t>
             </a:r>
             <a:r>
-              <a:rPr lang="de-DE" sz="1600" dirty="0" err="1" smtClean="0"/>
+              <a:rPr lang="de-DE" sz="1800" dirty="0" err="1" smtClean="0"/>
               <a:t>ï</a:t>
             </a:r>
             <a:r>
-              <a:rPr lang="en-US" sz="1600" dirty="0" err="1" smtClean="0"/>
+              <a:rPr lang="en-US" sz="1800" dirty="0" err="1" smtClean="0"/>
               <a:t>ves</a:t>
             </a:r>
             <a:r>
-              <a:rPr lang="en-US" sz="1600" dirty="0" smtClean="0"/>
+              <a:rPr lang="en-US" sz="1800" dirty="0" smtClean="0"/>
               <a:t> Bayes</a:t>
             </a:r>
           </a:p>
@@ -6261,7 +5382,7 @@
               <a:buChar char="§"/>
             </a:pPr>
             <a:r>
-              <a:rPr lang="en-US" sz="1600" dirty="0" smtClean="0"/>
+              <a:rPr lang="en-US" sz="1800" dirty="0" smtClean="0"/>
               <a:t>Evaluation</a:t>
             </a:r>
           </a:p>
@@ -6287,7 +5408,7 @@
 </p:sld>
 </file>
 
-<file path=ppt/slides/slide13.xml><?xml version="1.0" encoding="utf-8"?>
+<file path=ppt/slides/slide12.xml><?xml version="1.0" encoding="utf-8"?>
 <p:sld xmlns:a="http://schemas.openxmlformats.org/drawingml/2006/main" xmlns:r="http://schemas.openxmlformats.org/officeDocument/2006/relationships" xmlns:p="http://schemas.openxmlformats.org/presentationml/2006/main">
   <p:cSld>
     <p:spTree>
@@ -7594,6 +6715,13 @@
             <a:br>
               <a:rPr lang="de-DE" sz="1800" dirty="0" smtClean="0"/>
             </a:br>
+            <a:r>
+              <a:rPr lang="de-DE" sz="1800" dirty="0" smtClean="0"/>
+              <a:t/>
+            </a:r>
+            <a:br>
+              <a:rPr lang="de-DE" sz="1800" dirty="0" smtClean="0"/>
+            </a:br>
             <a:endParaRPr lang="de-DE" sz="1800" dirty="0" smtClean="0"/>
           </a:p>
           <a:p>
@@ -8201,8 +7329,8 @@
         </p:nvSpPr>
         <p:spPr>
           <a:xfrm>
-            <a:off x="4585340" y="2634949"/>
-            <a:ext cx="4029483" cy="677621"/>
+            <a:off x="4585340" y="2749249"/>
+            <a:ext cx="4418960" cy="483722"/>
           </a:xfrm>
           <a:prstGeom prst="rect">
             <a:avLst/>
@@ -8238,23 +7366,25 @@
               <a:rPr lang="de-DE" sz="1400" i="1" dirty="0" err="1" smtClean="0"/>
               <a:t>threshold</a:t>
             </a:r>
-            <a:endParaRPr lang="de-DE" sz="1400" i="1" dirty="0"/>
-          </a:p>
-          <a:p>
-            <a:pPr marL="457200" indent="-285750">
-              <a:lnSpc>
-                <a:spcPct val="90000"/>
-              </a:lnSpc>
-              <a:buFont typeface="Wingdings" charset="2"/>
-              <a:buChar char="§"/>
-            </a:pPr>
+            <a:r>
+              <a:rPr lang="de-DE" sz="1400" i="1" dirty="0"/>
+              <a:t> </a:t>
+            </a:r>
+            <a:r>
+              <a:rPr lang="de-DE" sz="1400" i="1" dirty="0" err="1" smtClean="0"/>
+              <a:t>and</a:t>
+            </a:r>
             <a:r>
               <a:rPr lang="de-DE" sz="1400" i="1" dirty="0" smtClean="0"/>
               <a:t> </a:t>
             </a:r>
             <a:r>
+              <a:rPr lang="de-DE" sz="1400" i="1" dirty="0" err="1"/>
+              <a:t>n</a:t>
+            </a:r>
+            <a:r>
               <a:rPr lang="de-DE" sz="1400" i="1" dirty="0" err="1" smtClean="0"/>
-              <a:t>No</a:t>
+              <a:t>o</a:t>
             </a:r>
             <a:r>
               <a:rPr lang="de-DE" sz="1400" i="1" dirty="0" smtClean="0"/>
@@ -10092,7 +9222,7 @@
                   <a:t> </a:t>
                 </a:r>
                 <a14:m>
-                  <m:oMath xmlns="" xmlns:m="http://schemas.openxmlformats.org/officeDocument/2006/math">
+                  <m:oMath xmlns:m="http://schemas.openxmlformats.org/officeDocument/2006/math" xmlns="">
                     <m:r>
                       <a:rPr lang="de-DE" sz="1600" i="1" dirty="0">
                         <a:latin typeface="Cambria Math" charset="0"/>
@@ -10108,7 +9238,7 @@
                   <a:t> Tags: </a:t>
                 </a:r>
                 <a14:m>
-                  <m:oMath xmlns="" xmlns:m="http://schemas.openxmlformats.org/officeDocument/2006/math">
+                  <m:oMath xmlns:m="http://schemas.openxmlformats.org/officeDocument/2006/math" xmlns="">
                     <m:r>
                       <a:rPr lang="de-DE" sz="1600" i="1" dirty="0">
                         <a:latin typeface="Cambria Math" charset="0"/>
@@ -10623,8 +9753,8 @@
         </p:nvSpPr>
         <p:spPr>
           <a:xfrm>
-            <a:off x="491740" y="1555747"/>
-            <a:ext cx="8266668" cy="5016758"/>
+            <a:off x="491740" y="1695447"/>
+            <a:ext cx="8266668" cy="4228850"/>
           </a:xfrm>
           <a:prstGeom prst="rect">
             <a:avLst/>
@@ -10637,6 +9767,11 @@
           </a:bodyPr>
           <a:lstStyle/>
           <a:p>
+            <a:pPr>
+              <a:lnSpc>
+                <a:spcPct val="120000"/>
+              </a:lnSpc>
+            </a:pPr>
             <a:r>
               <a:rPr lang="de-DE" sz="1600" b="1" dirty="0" smtClean="0"/>
               <a:t>First </a:t>
@@ -10663,8 +9798,123 @@
             </a:r>
             <a:r>
               <a:rPr lang="en-US" sz="1600" dirty="0" smtClean="0"/>
-              <a:t> (full data set):</a:t>
-            </a:r>
+              <a:t> (full data set)</a:t>
+            </a:r>
+            <a:r>
+              <a:rPr lang="en-US" sz="1600" dirty="0" smtClean="0"/>
+              <a:t>:</a:t>
+            </a:r>
+            <a:endParaRPr lang="en-US" sz="1600" dirty="0" smtClean="0"/>
+          </a:p>
+          <a:p>
+            <a:pPr marL="285750" indent="-285750">
+              <a:lnSpc>
+                <a:spcPct val="120000"/>
+              </a:lnSpc>
+              <a:buFont typeface="Wingdings" charset="2"/>
+              <a:buChar char="§"/>
+            </a:pPr>
+            <a:r>
+              <a:rPr lang="en-US" sz="1600" dirty="0" smtClean="0"/>
+              <a:t>sufficient results, but still enough space left for improvements (e.g. improve preprocessing, feature selection, weight important </a:t>
+            </a:r>
+            <a:r>
+              <a:rPr lang="en-US" sz="1600" dirty="0" smtClean="0"/>
+              <a:t>features, </a:t>
+            </a:r>
+            <a:r>
+              <a:rPr lang="is-IS" sz="1600" dirty="0" smtClean="0"/>
+              <a:t>…</a:t>
+            </a:r>
+            <a:r>
+              <a:rPr lang="en-US" sz="1600" dirty="0" smtClean="0"/>
+              <a:t>)</a:t>
+            </a:r>
+          </a:p>
+          <a:p>
+            <a:endParaRPr lang="de-DE" sz="1600" dirty="0" smtClean="0"/>
+          </a:p>
+          <a:p>
+            <a:r>
+              <a:rPr lang="de-DE" sz="1600" dirty="0" err="1" smtClean="0"/>
+              <a:t>Compare</a:t>
+            </a:r>
+            <a:r>
+              <a:rPr lang="de-DE" sz="1600" dirty="0" smtClean="0"/>
+              <a:t> </a:t>
+            </a:r>
+            <a:r>
+              <a:rPr lang="de-DE" sz="1600" dirty="0" err="1" smtClean="0"/>
+              <a:t>performance</a:t>
+            </a:r>
+            <a:r>
+              <a:rPr lang="de-DE" sz="1600" dirty="0" smtClean="0"/>
+              <a:t> </a:t>
+            </a:r>
+            <a:r>
+              <a:rPr lang="de-DE" sz="1600" dirty="0" err="1" smtClean="0"/>
+              <a:t>of</a:t>
+            </a:r>
+            <a:r>
+              <a:rPr lang="de-DE" sz="1600" dirty="0" smtClean="0"/>
+              <a:t> Na</a:t>
+            </a:r>
+            <a:r>
+              <a:rPr lang="en-US" sz="1600" dirty="0" err="1"/>
+              <a:t>ï</a:t>
+            </a:r>
+            <a:r>
+              <a:rPr lang="de-DE" sz="1600" dirty="0" err="1" smtClean="0"/>
+              <a:t>ve</a:t>
+            </a:r>
+            <a:r>
+              <a:rPr lang="de-DE" sz="1600" dirty="0" smtClean="0"/>
+              <a:t> </a:t>
+            </a:r>
+            <a:r>
+              <a:rPr lang="de-DE" sz="1600" dirty="0" err="1" smtClean="0"/>
+              <a:t>Bayes</a:t>
+            </a:r>
+            <a:r>
+              <a:rPr lang="de-DE" sz="1600" dirty="0" smtClean="0"/>
+              <a:t> </a:t>
+            </a:r>
+            <a:r>
+              <a:rPr lang="de-DE" sz="1600" dirty="0" err="1" smtClean="0"/>
+              <a:t>with</a:t>
+            </a:r>
+            <a:r>
+              <a:rPr lang="de-DE" sz="1600" dirty="0" smtClean="0"/>
+              <a:t> </a:t>
+            </a:r>
+            <a:r>
+              <a:rPr lang="de-DE" sz="1600" dirty="0" err="1" smtClean="0"/>
+              <a:t>other</a:t>
+            </a:r>
+            <a:r>
+              <a:rPr lang="de-DE" sz="1600" dirty="0" smtClean="0"/>
+              <a:t> </a:t>
+            </a:r>
+            <a:r>
+              <a:rPr lang="de-DE" sz="1600" dirty="0" err="1" smtClean="0"/>
+              <a:t>supervised</a:t>
+            </a:r>
+            <a:r>
+              <a:rPr lang="de-DE" sz="1600" dirty="0" smtClean="0"/>
+              <a:t> </a:t>
+            </a:r>
+            <a:r>
+              <a:rPr lang="de-DE" sz="1600" dirty="0" err="1" smtClean="0"/>
+              <a:t>models</a:t>
+            </a:r>
+            <a:r>
+              <a:rPr lang="de-DE" sz="1600" dirty="0" smtClean="0"/>
+              <a:t>:</a:t>
+            </a:r>
+            <a:br>
+              <a:rPr lang="de-DE" sz="1600" dirty="0" smtClean="0"/>
+            </a:br>
+            <a:endParaRPr lang="de-DE" sz="1600" i="1" dirty="0" smtClean="0"/>
           </a:p>
           <a:p>
             <a:pPr marL="285750" indent="-285750">
@@ -10672,312 +9922,168 @@
               <a:buChar char="§"/>
             </a:pPr>
             <a:r>
-              <a:rPr lang="en-US" sz="1600" dirty="0" smtClean="0"/>
-              <a:t>sufficient results, but still enough space left for improvements (e.g. improve preprocessing, feature selection, weight important features (user up/down-votes), </a:t>
-            </a:r>
-            <a:r>
-              <a:rPr lang="is-IS" sz="1600" dirty="0" smtClean="0"/>
-              <a:t>…</a:t>
-            </a:r>
-            <a:r>
-              <a:rPr lang="en-US" sz="1600" dirty="0" smtClean="0"/>
-              <a:t>)</a:t>
-            </a:r>
-          </a:p>
-          <a:p>
-            <a:endParaRPr lang="de-DE" sz="1600" dirty="0" smtClean="0"/>
-          </a:p>
-          <a:p>
-            <a:r>
-              <a:rPr lang="de-DE" sz="1600" dirty="0" err="1" smtClean="0"/>
-              <a:t>Compare</a:t>
-            </a:r>
-            <a:r>
-              <a:rPr lang="de-DE" sz="1600" dirty="0" smtClean="0"/>
-              <a:t> </a:t>
-            </a:r>
-            <a:r>
-              <a:rPr lang="de-DE" sz="1600" dirty="0" err="1" smtClean="0"/>
-              <a:t>performance</a:t>
-            </a:r>
-            <a:r>
-              <a:rPr lang="de-DE" sz="1600" dirty="0" smtClean="0"/>
-              <a:t> </a:t>
-            </a:r>
-            <a:r>
-              <a:rPr lang="de-DE" sz="1600" dirty="0" err="1" smtClean="0"/>
-              <a:t>of</a:t>
-            </a:r>
-            <a:r>
-              <a:rPr lang="de-DE" sz="1600" dirty="0" smtClean="0"/>
-              <a:t> Na</a:t>
-            </a:r>
-            <a:r>
-              <a:rPr lang="en-US" sz="1600" dirty="0" err="1"/>
-              <a:t>ï</a:t>
-            </a:r>
-            <a:r>
-              <a:rPr lang="de-DE" sz="1600" dirty="0" err="1" smtClean="0"/>
-              <a:t>ve</a:t>
-            </a:r>
-            <a:r>
-              <a:rPr lang="de-DE" sz="1600" dirty="0" smtClean="0"/>
-              <a:t> </a:t>
-            </a:r>
-            <a:r>
-              <a:rPr lang="de-DE" sz="1600" dirty="0" err="1" smtClean="0"/>
-              <a:t>Bayes</a:t>
-            </a:r>
-            <a:r>
-              <a:rPr lang="de-DE" sz="1600" dirty="0" smtClean="0"/>
-              <a:t> </a:t>
-            </a:r>
-            <a:r>
-              <a:rPr lang="de-DE" sz="1600" dirty="0" err="1" smtClean="0"/>
-              <a:t>with</a:t>
-            </a:r>
-            <a:r>
-              <a:rPr lang="de-DE" sz="1600" dirty="0" smtClean="0"/>
-              <a:t> </a:t>
-            </a:r>
-            <a:r>
-              <a:rPr lang="de-DE" sz="1600" dirty="0" err="1" smtClean="0"/>
-              <a:t>other</a:t>
-            </a:r>
-            <a:r>
-              <a:rPr lang="de-DE" sz="1600" dirty="0" smtClean="0"/>
-              <a:t> </a:t>
-            </a:r>
-            <a:r>
-              <a:rPr lang="de-DE" sz="1600" dirty="0" err="1" smtClean="0"/>
-              <a:t>supervised</a:t>
-            </a:r>
-            <a:r>
-              <a:rPr lang="de-DE" sz="1600" dirty="0" smtClean="0"/>
-              <a:t> </a:t>
-            </a:r>
-            <a:r>
-              <a:rPr lang="de-DE" sz="1600" dirty="0" err="1" smtClean="0"/>
-              <a:t>models</a:t>
-            </a:r>
-            <a:r>
-              <a:rPr lang="de-DE" sz="1600" dirty="0" smtClean="0"/>
-              <a:t>:</a:t>
-            </a:r>
-            <a:endParaRPr lang="de-DE" sz="1600" i="1" dirty="0" smtClean="0"/>
-          </a:p>
-          <a:p>
-            <a:pPr marL="285750" indent="-285750">
+              <a:rPr lang="en-US" sz="1600" b="1" dirty="0"/>
+              <a:t>k-Nearest </a:t>
+            </a:r>
+            <a:r>
+              <a:rPr lang="en-US" sz="1600" b="1" dirty="0" smtClean="0"/>
+              <a:t>Neighbors:</a:t>
+            </a:r>
+          </a:p>
+          <a:p>
+            <a:pPr marL="742950" lvl="1" indent="-285750">
+              <a:lnSpc>
+                <a:spcPct val="120000"/>
+              </a:lnSpc>
               <a:buFont typeface="Wingdings" charset="2"/>
               <a:buChar char="§"/>
             </a:pPr>
             <a:r>
-              <a:rPr lang="en-US" sz="1600" b="1" dirty="0"/>
-              <a:t>k-Nearest </a:t>
-            </a:r>
-            <a:r>
-              <a:rPr lang="en-US" sz="1600" b="1" dirty="0" smtClean="0"/>
-              <a:t>Neighbors:</a:t>
+              <a:rPr lang="de-DE" sz="1600" dirty="0" err="1" smtClean="0"/>
+              <a:t>suggest</a:t>
+            </a:r>
+            <a:r>
+              <a:rPr lang="de-DE" sz="1600" dirty="0" smtClean="0"/>
+              <a:t> h </a:t>
+            </a:r>
+            <a:r>
+              <a:rPr lang="de-DE" sz="1600" dirty="0" err="1" smtClean="0"/>
+              <a:t>most</a:t>
+            </a:r>
+            <a:r>
+              <a:rPr lang="de-DE" sz="1600" dirty="0" smtClean="0"/>
+              <a:t> probable tags</a:t>
             </a:r>
           </a:p>
           <a:p>
             <a:pPr marL="742950" lvl="1" indent="-285750">
+              <a:lnSpc>
+                <a:spcPct val="120000"/>
+              </a:lnSpc>
               <a:buFont typeface="Wingdings" charset="2"/>
               <a:buChar char="§"/>
             </a:pPr>
             <a:r>
               <a:rPr lang="de-DE" sz="1600" dirty="0" err="1" smtClean="0"/>
-              <a:t>suggest</a:t>
+              <a:t>probability</a:t>
             </a:r>
             <a:r>
               <a:rPr lang="de-DE" sz="1600" dirty="0" smtClean="0"/>
-              <a:t> h </a:t>
+              <a:t> </a:t>
             </a:r>
             <a:r>
               <a:rPr lang="de-DE" sz="1600" dirty="0" err="1" smtClean="0"/>
-              <a:t>most</a:t>
+              <a:t>depends</a:t>
             </a:r>
             <a:r>
               <a:rPr lang="de-DE" sz="1600" dirty="0" smtClean="0"/>
-              <a:t> probable tags</a:t>
-            </a:r>
-          </a:p>
-          <a:p>
-            <a:pPr marL="742950" lvl="1" indent="-285750">
+              <a:t> on:</a:t>
+            </a:r>
+          </a:p>
+          <a:p>
+            <a:pPr marL="1200150" lvl="2" indent="-285750">
+              <a:lnSpc>
+                <a:spcPct val="120000"/>
+              </a:lnSpc>
               <a:buFont typeface="Wingdings" charset="2"/>
               <a:buChar char="§"/>
             </a:pPr>
             <a:r>
-              <a:rPr lang="de-DE" sz="1600" dirty="0" err="1" smtClean="0"/>
-              <a:t>probability</a:t>
-            </a:r>
-            <a:r>
-              <a:rPr lang="de-DE" sz="1600" dirty="0" smtClean="0"/>
-              <a:t> </a:t>
-            </a:r>
-            <a:r>
-              <a:rPr lang="de-DE" sz="1600" dirty="0" err="1" smtClean="0"/>
-              <a:t>depends</a:t>
-            </a:r>
-            <a:r>
-              <a:rPr lang="de-DE" sz="1600" dirty="0" smtClean="0"/>
-              <a:t> on:</a:t>
-            </a:r>
+              <a:rPr lang="en-US" sz="1600" dirty="0"/>
+              <a:t>number of neighbors that </a:t>
+            </a:r>
+            <a:r>
+              <a:rPr lang="en-US" sz="1600" dirty="0" smtClean="0"/>
+              <a:t>contain these suggested tags</a:t>
+            </a:r>
+            <a:endParaRPr lang="de-DE" sz="1600" dirty="0" smtClean="0"/>
           </a:p>
           <a:p>
             <a:pPr marL="1200150" lvl="2" indent="-285750">
+              <a:lnSpc>
+                <a:spcPct val="120000"/>
+              </a:lnSpc>
               <a:buFont typeface="Wingdings" charset="2"/>
               <a:buChar char="§"/>
             </a:pPr>
             <a:r>
-              <a:rPr lang="en-US" sz="1600" dirty="0"/>
-              <a:t>number of neighbors that </a:t>
-            </a:r>
-            <a:r>
-              <a:rPr lang="en-US" sz="1600" dirty="0" smtClean="0"/>
-              <a:t>contain these suggested tags</a:t>
-            </a:r>
-            <a:endParaRPr lang="de-DE" sz="1600" dirty="0" smtClean="0"/>
-          </a:p>
-          <a:p>
-            <a:pPr marL="1200150" lvl="2" indent="-285750">
+              <a:rPr lang="de-DE" sz="1600" dirty="0" err="1" smtClean="0"/>
+              <a:t>distance</a:t>
+            </a:r>
+            <a:r>
+              <a:rPr lang="de-DE" sz="1600" dirty="0" smtClean="0"/>
+              <a:t> </a:t>
+            </a:r>
+            <a:r>
+              <a:rPr lang="de-DE" sz="1600" dirty="0" err="1" smtClean="0"/>
+              <a:t>to</a:t>
+            </a:r>
+            <a:r>
+              <a:rPr lang="de-DE" sz="1600" dirty="0" smtClean="0"/>
+              <a:t> </a:t>
+            </a:r>
+            <a:r>
+              <a:rPr lang="de-DE" sz="1600" dirty="0" err="1" smtClean="0"/>
+              <a:t>these</a:t>
+            </a:r>
+            <a:r>
+              <a:rPr lang="de-DE" sz="1600" dirty="0" smtClean="0"/>
+              <a:t> </a:t>
+            </a:r>
+            <a:r>
+              <a:rPr lang="de-DE" sz="1600" dirty="0" err="1" smtClean="0"/>
+              <a:t>neighboring</a:t>
+            </a:r>
+            <a:r>
+              <a:rPr lang="de-DE" sz="1600" dirty="0" smtClean="0"/>
+              <a:t> </a:t>
+            </a:r>
+            <a:r>
+              <a:rPr lang="de-DE" sz="1600" dirty="0" err="1" smtClean="0"/>
+              <a:t>documents</a:t>
+            </a:r>
+            <a:r>
+              <a:rPr lang="de-DE" sz="1600" dirty="0" smtClean="0"/>
+              <a:t>/</a:t>
+            </a:r>
+            <a:r>
+              <a:rPr lang="de-DE" sz="1600" dirty="0" err="1" smtClean="0"/>
+              <a:t>posts</a:t>
+            </a:r>
+            <a:endParaRPr lang="en-US" sz="1600" dirty="0"/>
+          </a:p>
+          <a:p>
+            <a:endParaRPr lang="de-DE" sz="1600" i="1" dirty="0" smtClean="0"/>
+          </a:p>
+          <a:p>
+            <a:pPr marL="285750" indent="-285750">
+              <a:lnSpc>
+                <a:spcPct val="120000"/>
+              </a:lnSpc>
               <a:buFont typeface="Wingdings" charset="2"/>
               <a:buChar char="§"/>
             </a:pPr>
             <a:r>
-              <a:rPr lang="de-DE" sz="1600" dirty="0" err="1" smtClean="0"/>
-              <a:t>distance</a:t>
-            </a:r>
-            <a:r>
-              <a:rPr lang="de-DE" sz="1600" dirty="0" smtClean="0"/>
-              <a:t> </a:t>
-            </a:r>
-            <a:r>
-              <a:rPr lang="de-DE" sz="1600" dirty="0" err="1" smtClean="0"/>
-              <a:t>to</a:t>
-            </a:r>
-            <a:r>
-              <a:rPr lang="de-DE" sz="1600" dirty="0" smtClean="0"/>
-              <a:t> </a:t>
-            </a:r>
-            <a:r>
-              <a:rPr lang="de-DE" sz="1600" dirty="0" err="1" smtClean="0"/>
-              <a:t>these</a:t>
-            </a:r>
-            <a:r>
-              <a:rPr lang="de-DE" sz="1600" dirty="0" smtClean="0"/>
-              <a:t> </a:t>
-            </a:r>
-            <a:r>
-              <a:rPr lang="de-DE" sz="1600" dirty="0" err="1" smtClean="0"/>
-              <a:t>neighboring</a:t>
-            </a:r>
-            <a:r>
-              <a:rPr lang="de-DE" sz="1600" dirty="0" smtClean="0"/>
-              <a:t> </a:t>
-            </a:r>
-            <a:r>
-              <a:rPr lang="de-DE" sz="1600" dirty="0" err="1" smtClean="0"/>
-              <a:t>documents</a:t>
-            </a:r>
-            <a:r>
-              <a:rPr lang="de-DE" sz="1600" dirty="0" smtClean="0"/>
-              <a:t>/</a:t>
-            </a:r>
-            <a:r>
-              <a:rPr lang="de-DE" sz="1600" dirty="0" err="1" smtClean="0"/>
-              <a:t>posts</a:t>
-            </a:r>
-            <a:endParaRPr lang="en-US" sz="1600" dirty="0"/>
-          </a:p>
-          <a:p>
-            <a:endParaRPr lang="de-DE" sz="1600" i="1" dirty="0" smtClean="0"/>
-          </a:p>
-          <a:p>
-            <a:pPr marL="285750" indent="-285750">
+              <a:rPr lang="en-US" sz="1600" b="1" dirty="0" smtClean="0"/>
+              <a:t>Linear SVM:</a:t>
+            </a:r>
+          </a:p>
+          <a:p>
+            <a:pPr marL="492125" lvl="1" indent="-196850">
+              <a:lnSpc>
+                <a:spcPct val="120000"/>
+              </a:lnSpc>
               <a:buFont typeface="Wingdings" charset="2"/>
               <a:buChar char="§"/>
             </a:pPr>
             <a:r>
-              <a:rPr lang="en-US" sz="1600" b="1" dirty="0" smtClean="0"/>
-              <a:t>Linear SVM:</a:t>
-            </a:r>
-          </a:p>
-          <a:p>
-            <a:pPr marL="492125" lvl="1" indent="-196850">
-              <a:buFont typeface="Wingdings" charset="2"/>
-              <a:buChar char="§"/>
-            </a:pPr>
-            <a:r>
               <a:rPr lang="en-US" sz="1600" dirty="0" smtClean="0"/>
-              <a:t>Use only a few features that represent the entire post </a:t>
-            </a:r>
-            <a:r>
-              <a:rPr lang="en-US" sz="1600" dirty="0" smtClean="0">
-                <a:sym typeface="Wingdings"/>
-              </a:rPr>
-              <a:t> feature transformation</a:t>
+              <a:t>Use only a few features that represent the entire </a:t>
             </a:r>
             <a:r>
               <a:rPr lang="en-US" sz="1600" dirty="0" smtClean="0"/>
-              <a:t>, e.g.</a:t>
-            </a:r>
-          </a:p>
-          <a:p>
-            <a:pPr marL="949325" lvl="2" indent="-196850">
-              <a:buFont typeface="Wingdings" charset="2"/>
-              <a:buChar char="§"/>
-            </a:pPr>
-            <a:r>
-              <a:rPr lang="en-US" sz="1600" dirty="0" smtClean="0"/>
-              <a:t>tag occurs in title/body (true/false)</a:t>
-            </a:r>
-          </a:p>
-          <a:p>
-            <a:pPr marL="949325" lvl="2" indent="-196850">
-              <a:buFont typeface="Wingdings" charset="2"/>
-              <a:buChar char="§"/>
-            </a:pPr>
-            <a:r>
-              <a:rPr lang="en-US" sz="1600" dirty="0" smtClean="0"/>
-              <a:t>for each word and each tag in this post (scalar value):</a:t>
-            </a:r>
-          </a:p>
-          <a:p>
-            <a:pPr marL="1406525" lvl="3" indent="-196850">
-              <a:buFont typeface="Wingdings" charset="2"/>
-              <a:buChar char="§"/>
-            </a:pPr>
-            <a:r>
-              <a:rPr lang="en-US" sz="1600" dirty="0" smtClean="0"/>
-              <a:t>compute product of probabilities that tag &amp; word occur both in same post</a:t>
-            </a:r>
-          </a:p>
-          <a:p>
-            <a:pPr marL="1406525" lvl="3" indent="-196850">
-              <a:buFont typeface="Wingdings" charset="2"/>
-              <a:buChar char="§"/>
-            </a:pPr>
-            <a:r>
-              <a:rPr lang="en-US" sz="1600" dirty="0" smtClean="0"/>
-              <a:t>danger: use logarithm to avoid underflow!</a:t>
-            </a:r>
-          </a:p>
-          <a:p>
-            <a:pPr marL="1863725" lvl="4" indent="-196850">
-              <a:buFont typeface="Wingdings" charset="2"/>
-              <a:buChar char="§"/>
-            </a:pPr>
-            <a:r>
-              <a:rPr lang="en-US" sz="1600" dirty="0" smtClean="0"/>
-              <a:t>log of product replaced by sum of logs!</a:t>
-            </a:r>
-          </a:p>
-          <a:p>
-            <a:pPr marL="800100" lvl="1" indent="-342900">
-              <a:buFont typeface="Wingdings" charset="2"/>
-              <a:buChar char="§"/>
-            </a:pPr>
+              <a:t>post</a:t>
+            </a:r>
             <a:endParaRPr lang="en-US" sz="1600" dirty="0"/>
           </a:p>
           <a:p>
@@ -11233,10 +10339,6 @@
               <a:rPr lang="de-DE" b="1" dirty="0" err="1" smtClean="0"/>
               <a:t>Unsupervised</a:t>
             </a:r>
-            <a:r>
-              <a:rPr lang="de-DE" b="1" dirty="0" smtClean="0"/>
-              <a:t> (I)</a:t>
-            </a:r>
             <a:endParaRPr lang="de-DE" b="1" kern="0" dirty="0" smtClean="0"/>
           </a:p>
         </p:txBody>
@@ -11250,7 +10352,7 @@
         <p:spPr>
           <a:xfrm>
             <a:off x="733490" y="1751793"/>
-            <a:ext cx="7805654" cy="4247317"/>
+            <a:ext cx="7805654" cy="4579717"/>
           </a:xfrm>
           <a:prstGeom prst="rect">
             <a:avLst/>
@@ -11264,6 +10366,9 @@
           <a:lstStyle/>
           <a:p>
             <a:pPr marL="285750" indent="-285750">
+              <a:lnSpc>
+                <a:spcPct val="120000"/>
+              </a:lnSpc>
               <a:buFont typeface="Wingdings" charset="2"/>
               <a:buChar char="§"/>
             </a:pPr>
@@ -11274,6 +10379,9 @@
           </a:p>
           <a:p>
             <a:pPr marL="742950" lvl="1" indent="-285750">
+              <a:lnSpc>
+                <a:spcPct val="120000"/>
+              </a:lnSpc>
               <a:buFont typeface="Wingdings" charset="2"/>
               <a:buChar char="§"/>
             </a:pPr>
@@ -11337,6 +10445,9 @@
           </a:p>
           <a:p>
             <a:pPr marL="742950" lvl="1" indent="-285750">
+              <a:lnSpc>
+                <a:spcPct val="120000"/>
+              </a:lnSpc>
               <a:buFont typeface="Wingdings" charset="2"/>
               <a:buChar char="§"/>
             </a:pPr>
@@ -11432,6 +10543,9 @@
           </a:p>
           <a:p>
             <a:pPr marL="285750" indent="-285750">
+              <a:lnSpc>
+                <a:spcPct val="120000"/>
+              </a:lnSpc>
               <a:buFont typeface="Wingdings" charset="2"/>
               <a:buChar char="§"/>
             </a:pPr>
@@ -11447,268 +10561,270 @@
               <a:rPr lang="de-DE" sz="1800" b="1" dirty="0" err="1" smtClean="0"/>
               <a:t>clustering</a:t>
             </a:r>
+            <a:r>
+              <a:rPr lang="de-DE" sz="1800" b="1" dirty="0"/>
+              <a:t>:</a:t>
+            </a:r>
             <a:endParaRPr lang="de-DE" sz="1800" b="1" dirty="0" smtClean="0"/>
           </a:p>
           <a:p>
             <a:pPr marL="742950" lvl="1" indent="-285750">
+              <a:lnSpc>
+                <a:spcPct val="120000"/>
+              </a:lnSpc>
               <a:buFont typeface="Wingdings" charset="2"/>
               <a:buChar char="§"/>
             </a:pPr>
             <a:r>
-              <a:rPr lang="de-DE" sz="1800" dirty="0" err="1"/>
-              <a:t>Init</a:t>
-            </a:r>
-            <a:r>
-              <a:rPr lang="de-DE" sz="1800" dirty="0"/>
-              <a:t> </a:t>
-            </a:r>
-            <a:r>
-              <a:rPr lang="de-DE" sz="1800" i="1" dirty="0" err="1"/>
+              <a:rPr lang="de-DE" sz="1800" u="sng" dirty="0" err="1" smtClean="0"/>
+              <a:t>Number</a:t>
+            </a:r>
+            <a:r>
+              <a:rPr lang="de-DE" sz="1800" u="sng" dirty="0" smtClean="0"/>
+              <a:t> </a:t>
+            </a:r>
+            <a:r>
+              <a:rPr lang="de-DE" sz="1800" u="sng" dirty="0" err="1" smtClean="0"/>
+              <a:t>of</a:t>
+            </a:r>
+            <a:r>
+              <a:rPr lang="de-DE" sz="1800" u="sng" dirty="0" smtClean="0"/>
+              <a:t> </a:t>
+            </a:r>
+            <a:r>
+              <a:rPr lang="de-DE" sz="1800" u="sng" dirty="0" err="1" smtClean="0"/>
+              <a:t>clusters</a:t>
+            </a:r>
+            <a:r>
+              <a:rPr lang="de-DE" sz="1800" u="sng" dirty="0" smtClean="0"/>
+              <a:t> (</a:t>
+            </a:r>
+            <a:r>
+              <a:rPr lang="de-DE" sz="1800" u="sng" dirty="0" err="1" smtClean="0"/>
               <a:t>k</a:t>
             </a:r>
             <a:r>
-              <a:rPr lang="de-DE" sz="1800" dirty="0"/>
-              <a:t> </a:t>
-            </a:r>
-            <a:r>
-              <a:rPr lang="de-DE" sz="1800" dirty="0" err="1" smtClean="0"/>
-              <a:t>centroids</a:t>
-            </a:r>
-            <a:endParaRPr lang="de-DE" sz="1800" dirty="0" smtClean="0"/>
+              <a:rPr lang="de-DE" sz="1800" u="sng" dirty="0" smtClean="0"/>
+              <a:t>)</a:t>
+            </a:r>
+            <a:r>
+              <a:rPr lang="de-DE" sz="1800" dirty="0" smtClean="0"/>
+              <a:t>: #tags</a:t>
+            </a:r>
           </a:p>
           <a:p>
             <a:pPr marL="742950" lvl="1" indent="-285750">
+              <a:lnSpc>
+                <a:spcPct val="120000"/>
+              </a:lnSpc>
               <a:buFont typeface="Wingdings" charset="2"/>
               <a:buChar char="§"/>
             </a:pPr>
             <a:r>
-              <a:rPr lang="de-DE" sz="1800" dirty="0" err="1" smtClean="0"/>
-              <a:t>Assign</a:t>
-            </a:r>
-            <a:r>
-              <a:rPr lang="de-DE" sz="1800" dirty="0" smtClean="0"/>
-              <a:t> </a:t>
-            </a:r>
-            <a:r>
-              <a:rPr lang="de-DE" sz="1800" dirty="0" err="1" smtClean="0"/>
-              <a:t>each</a:t>
-            </a:r>
-            <a:r>
-              <a:rPr lang="de-DE" sz="1800" dirty="0" smtClean="0"/>
-              <a:t> </a:t>
-            </a:r>
-            <a:r>
-              <a:rPr lang="de-DE" sz="1800" dirty="0" err="1" smtClean="0"/>
-              <a:t>post</a:t>
-            </a:r>
-            <a:r>
-              <a:rPr lang="de-DE" sz="1800" dirty="0" smtClean="0"/>
-              <a:t> </a:t>
-            </a:r>
-            <a:r>
-              <a:rPr lang="de-DE" sz="1800" dirty="0" err="1" smtClean="0"/>
-              <a:t>to</a:t>
-            </a:r>
-            <a:r>
-              <a:rPr lang="de-DE" sz="1800" dirty="0" smtClean="0"/>
-              <a:t> </a:t>
-            </a:r>
-            <a:r>
-              <a:rPr lang="de-DE" sz="1800" dirty="0" err="1" smtClean="0"/>
-              <a:t>closest</a:t>
-            </a:r>
-            <a:r>
-              <a:rPr lang="de-DE" sz="1800" dirty="0" smtClean="0"/>
-              <a:t> </a:t>
-            </a:r>
-            <a:r>
-              <a:rPr lang="de-DE" sz="1800" dirty="0" err="1" smtClean="0"/>
-              <a:t>centroid</a:t>
+              <a:rPr lang="de-DE" sz="1800" u="sng" dirty="0" err="1" smtClean="0"/>
+              <a:t>Initialization</a:t>
+            </a:r>
+            <a:r>
+              <a:rPr lang="de-DE" sz="1800" dirty="0" smtClean="0"/>
+              <a:t>: </a:t>
+            </a:r>
+            <a:r>
+              <a:rPr lang="de-DE" sz="1800" i="1" dirty="0" err="1" smtClean="0"/>
+              <a:t>k</a:t>
+            </a:r>
+            <a:r>
+              <a:rPr lang="de-DE" sz="1800" i="1" dirty="0" err="1"/>
+              <a:t>-means</a:t>
+            </a:r>
+            <a:r>
+              <a:rPr lang="de-DE" sz="1800" i="1" dirty="0"/>
+              <a:t>++</a:t>
+            </a:r>
+            <a:r>
+              <a:rPr lang="de-DE" sz="1800" dirty="0"/>
+              <a:t> </a:t>
             </a:r>
             <a:endParaRPr lang="de-DE" sz="1800" dirty="0" smtClean="0"/>
           </a:p>
           <a:p>
             <a:pPr marL="742950" lvl="1" indent="-285750">
+              <a:lnSpc>
+                <a:spcPct val="120000"/>
+              </a:lnSpc>
               <a:buFont typeface="Wingdings" charset="2"/>
               <a:buChar char="§"/>
             </a:pPr>
             <a:r>
-              <a:rPr lang="de-DE" sz="1800" dirty="0" smtClean="0"/>
-              <a:t>Update </a:t>
-            </a:r>
-            <a:r>
-              <a:rPr lang="de-DE" sz="1800" dirty="0" err="1" smtClean="0"/>
-              <a:t>centroids</a:t>
-            </a:r>
-            <a:r>
-              <a:rPr lang="de-DE" sz="1800" dirty="0" smtClean="0"/>
-              <a:t> </a:t>
-            </a:r>
-            <a:r>
-              <a:rPr lang="de-DE" sz="1800" dirty="0" err="1" smtClean="0"/>
-              <a:t>and</a:t>
-            </a:r>
-            <a:r>
-              <a:rPr lang="de-DE" sz="1800" dirty="0" smtClean="0"/>
-              <a:t> </a:t>
-            </a:r>
-            <a:r>
-              <a:rPr lang="de-DE" sz="1800" dirty="0" err="1"/>
-              <a:t>r</a:t>
-            </a:r>
-            <a:r>
-              <a:rPr lang="de-DE" sz="1800" dirty="0" err="1" smtClean="0"/>
-              <a:t>epeat</a:t>
-            </a:r>
-            <a:r>
-              <a:rPr lang="de-DE" sz="1800" dirty="0" smtClean="0"/>
-              <a:t> </a:t>
-            </a:r>
-            <a:r>
-              <a:rPr lang="de-DE" sz="1800" dirty="0" err="1" smtClean="0"/>
-              <a:t>until</a:t>
-            </a:r>
-            <a:r>
-              <a:rPr lang="de-DE" sz="1800" dirty="0" smtClean="0"/>
-              <a:t> </a:t>
-            </a:r>
-            <a:r>
-              <a:rPr lang="de-DE" sz="1800" dirty="0" err="1" smtClean="0"/>
-              <a:t>convergence</a:t>
-            </a:r>
-            <a:endParaRPr lang="de-DE" sz="1800" dirty="0" smtClean="0"/>
-          </a:p>
-          <a:p>
-            <a:pPr marL="742950" lvl="1" indent="-285750">
-              <a:buFont typeface="Arial"/>
-              <a:buChar char="•"/>
-            </a:pPr>
-            <a:endParaRPr lang="de-DE" sz="1800" dirty="0" smtClean="0"/>
+              <a:rPr lang="de-DE" sz="1800" u="sng" dirty="0" err="1" smtClean="0"/>
+              <a:t>Distance</a:t>
+            </a:r>
+            <a:r>
+              <a:rPr lang="de-DE" sz="1800" dirty="0" smtClean="0"/>
+              <a:t>: </a:t>
+            </a:r>
+            <a:r>
+              <a:rPr lang="de-DE" sz="1800" i="1" dirty="0" err="1" smtClean="0"/>
+              <a:t>Euclidean</a:t>
+            </a:r>
+            <a:endParaRPr lang="de-DE" sz="1800" i="1" dirty="0" smtClean="0"/>
+          </a:p>
+          <a:p>
+            <a:pPr lvl="1"/>
+            <a:endParaRPr lang="de-DE" sz="1800" i="1" dirty="0" smtClean="0"/>
           </a:p>
           <a:p>
             <a:pPr marL="285750" indent="-285750">
+              <a:lnSpc>
+                <a:spcPct val="120000"/>
+              </a:lnSpc>
               <a:buFont typeface="Wingdings" charset="2"/>
               <a:buChar char="§"/>
             </a:pPr>
             <a:r>
+              <a:rPr lang="de-DE" sz="1800" b="1" dirty="0" err="1"/>
+              <a:t>Hierarchical</a:t>
+            </a:r>
+            <a:r>
+              <a:rPr lang="de-DE" sz="1800" b="1" dirty="0"/>
+              <a:t> </a:t>
+            </a:r>
+            <a:r>
+              <a:rPr lang="de-DE" sz="1800" b="1" dirty="0" err="1"/>
+              <a:t>Agglomerative</a:t>
+            </a:r>
+            <a:r>
+              <a:rPr lang="de-DE" sz="1800" b="1" dirty="0"/>
+              <a:t> </a:t>
+            </a:r>
+            <a:r>
               <a:rPr lang="de-DE" sz="1800" b="1" dirty="0" smtClean="0"/>
-              <a:t>Implementation </a:t>
-            </a:r>
-            <a:r>
-              <a:rPr lang="de-DE" sz="1800" b="1" dirty="0" err="1" smtClean="0"/>
-              <a:t>and</a:t>
-            </a:r>
-            <a:r>
-              <a:rPr lang="de-DE" sz="1800" b="1" dirty="0" smtClean="0"/>
-              <a:t> Parameters</a:t>
-            </a:r>
-            <a:r>
-              <a:rPr lang="de-DE" sz="1800" dirty="0" smtClean="0"/>
-              <a:t>:</a:t>
-            </a:r>
+              <a:t>Clustering:</a:t>
+            </a:r>
+            <a:endParaRPr lang="de-DE" sz="1800" b="1" dirty="0"/>
           </a:p>
           <a:p>
             <a:pPr marL="742950" lvl="1" indent="-285750">
+              <a:lnSpc>
+                <a:spcPct val="120000"/>
+              </a:lnSpc>
               <a:buFont typeface="Wingdings" charset="2"/>
               <a:buChar char="§"/>
             </a:pPr>
             <a:r>
               <a:rPr lang="de-DE" sz="1800" u="sng" dirty="0" err="1" smtClean="0"/>
-              <a:t>Number</a:t>
-            </a:r>
-            <a:r>
-              <a:rPr lang="de-DE" sz="1800" u="sng" dirty="0" smtClean="0"/>
-              <a:t> </a:t>
-            </a:r>
-            <a:r>
-              <a:rPr lang="de-DE" sz="1800" u="sng" dirty="0" err="1" smtClean="0"/>
-              <a:t>of</a:t>
-            </a:r>
-            <a:r>
-              <a:rPr lang="de-DE" sz="1800" u="sng" dirty="0" smtClean="0"/>
-              <a:t> </a:t>
-            </a:r>
-            <a:r>
-              <a:rPr lang="de-DE" sz="1800" u="sng" dirty="0" err="1" smtClean="0"/>
-              <a:t>clusters</a:t>
-            </a:r>
-            <a:r>
-              <a:rPr lang="de-DE" sz="1800" u="sng" dirty="0" smtClean="0"/>
-              <a:t> (</a:t>
-            </a:r>
-            <a:r>
-              <a:rPr lang="de-DE" sz="1800" u="sng" dirty="0" err="1" smtClean="0"/>
-              <a:t>k</a:t>
-            </a:r>
-            <a:r>
-              <a:rPr lang="de-DE" sz="1800" u="sng" dirty="0" smtClean="0"/>
+              <a:t>Linkage</a:t>
+            </a:r>
+            <a:r>
+              <a:rPr lang="de-DE" sz="1800" dirty="0" smtClean="0"/>
+              <a:t>: </a:t>
+            </a:r>
+            <a:r>
+              <a:rPr lang="de-DE" sz="1800" i="1" dirty="0"/>
+              <a:t>Ward </a:t>
+            </a:r>
+            <a:r>
+              <a:rPr lang="de-DE" sz="1800" i="1" dirty="0" err="1"/>
+              <a:t>criterion</a:t>
+            </a:r>
+            <a:r>
+              <a:rPr lang="de-DE" sz="1800" i="1" dirty="0"/>
+              <a:t> </a:t>
+            </a:r>
+            <a:r>
+              <a:rPr lang="de-DE" sz="1800" dirty="0"/>
+              <a:t>(</a:t>
+            </a:r>
+            <a:r>
+              <a:rPr lang="de-DE" sz="1800" dirty="0" err="1"/>
+              <a:t>minimum</a:t>
+            </a:r>
+            <a:r>
+              <a:rPr lang="de-DE" sz="1800" dirty="0"/>
+              <a:t> </a:t>
+            </a:r>
+            <a:r>
+              <a:rPr lang="de-DE" sz="1800" dirty="0" err="1"/>
+              <a:t>variance</a:t>
+            </a:r>
+            <a:r>
+              <a:rPr lang="de-DE" sz="1800" dirty="0"/>
               <a:t>)</a:t>
             </a:r>
-            <a:r>
-              <a:rPr lang="de-DE" sz="1800" dirty="0" smtClean="0"/>
-              <a:t>: #tags</a:t>
-            </a:r>
           </a:p>
           <a:p>
             <a:pPr marL="742950" lvl="1" indent="-285750">
+              <a:lnSpc>
+                <a:spcPct val="120000"/>
+              </a:lnSpc>
               <a:buFont typeface="Wingdings" charset="2"/>
               <a:buChar char="§"/>
             </a:pPr>
             <a:r>
-              <a:rPr lang="de-DE" sz="1800" u="sng" dirty="0" err="1" smtClean="0"/>
-              <a:t>Initialization</a:t>
-            </a:r>
-            <a:r>
-              <a:rPr lang="de-DE" sz="1800" dirty="0" smtClean="0"/>
+              <a:rPr lang="de-DE" sz="1800" u="sng" dirty="0" err="1"/>
+              <a:t>Distance</a:t>
+            </a:r>
+            <a:r>
+              <a:rPr lang="de-DE" sz="1800" dirty="0"/>
               <a:t>: </a:t>
             </a:r>
             <a:r>
-              <a:rPr lang="de-DE" sz="1800" i="1" dirty="0" err="1" smtClean="0"/>
-              <a:t>k</a:t>
-            </a:r>
-            <a:r>
               <a:rPr lang="de-DE" sz="1800" i="1" dirty="0" err="1"/>
-              <a:t>-means</a:t>
-            </a:r>
-            <a:r>
-              <a:rPr lang="de-DE" sz="1800" i="1" dirty="0"/>
-              <a:t>++</a:t>
-            </a:r>
-            <a:r>
-              <a:rPr lang="de-DE" sz="1800" dirty="0"/>
-              <a:t> </a:t>
-            </a:r>
-            <a:endParaRPr lang="de-DE" sz="1800" dirty="0" smtClean="0"/>
+              <a:t>Euclidean</a:t>
+            </a:r>
+            <a:endParaRPr lang="de-DE" sz="1800" i="1" dirty="0"/>
           </a:p>
           <a:p>
             <a:pPr marL="742950" lvl="1" indent="-285750">
+              <a:lnSpc>
+                <a:spcPct val="120000"/>
+              </a:lnSpc>
               <a:buFont typeface="Wingdings" charset="2"/>
               <a:buChar char="§"/>
             </a:pPr>
             <a:r>
-              <a:rPr lang="de-DE" sz="1800" u="sng" dirty="0" err="1" smtClean="0"/>
-              <a:t>Distance</a:t>
-            </a:r>
-            <a:r>
-              <a:rPr lang="de-DE" sz="1800" dirty="0" smtClean="0"/>
+              <a:rPr lang="de-DE" sz="1800" u="sng" dirty="0" err="1"/>
+              <a:t>Stop</a:t>
+            </a:r>
+            <a:r>
+              <a:rPr lang="de-DE" sz="1800" u="sng" dirty="0"/>
+              <a:t> </a:t>
+            </a:r>
+            <a:r>
+              <a:rPr lang="de-DE" sz="1800" u="sng" dirty="0" err="1"/>
+              <a:t>criterion</a:t>
+            </a:r>
+            <a:r>
+              <a:rPr lang="de-DE" sz="1800" dirty="0"/>
               <a:t>: </a:t>
             </a:r>
             <a:r>
-              <a:rPr lang="de-DE" sz="1800" dirty="0" err="1" smtClean="0"/>
-              <a:t>Euclidean</a:t>
-            </a:r>
-            <a:r>
-              <a:rPr lang="de-DE" sz="1800" dirty="0" smtClean="0"/>
-              <a:t> </a:t>
-            </a:r>
-            <a:r>
-              <a:rPr lang="de-DE" sz="1800" dirty="0" err="1" smtClean="0"/>
-              <a:t>distance</a:t>
-            </a:r>
-            <a:endParaRPr lang="de-DE" sz="1800" dirty="0" smtClean="0"/>
-          </a:p>
-          <a:p>
-            <a:pPr lvl="1"/>
+              <a:rPr lang="de-DE" sz="1800" dirty="0" err="1"/>
+              <a:t>number</a:t>
+            </a:r>
+            <a:r>
+              <a:rPr lang="de-DE" sz="1800" dirty="0"/>
+              <a:t> </a:t>
+            </a:r>
+            <a:r>
+              <a:rPr lang="de-DE" sz="1800" dirty="0" err="1"/>
+              <a:t>of</a:t>
+            </a:r>
+            <a:r>
+              <a:rPr lang="de-DE" sz="1800" dirty="0"/>
+              <a:t> </a:t>
+            </a:r>
+            <a:r>
+              <a:rPr lang="de-DE" sz="1800" dirty="0" err="1"/>
+              <a:t>clusters</a:t>
+            </a:r>
+            <a:r>
+              <a:rPr lang="de-DE" sz="1800" dirty="0"/>
+              <a:t> (#tags</a:t>
+            </a:r>
+            <a:r>
+              <a:rPr lang="de-DE" sz="1800" dirty="0" smtClean="0"/>
+              <a:t>)</a:t>
+            </a:r>
             <a:endParaRPr lang="de-DE" sz="1800" i="1" dirty="0" smtClean="0"/>
           </a:p>
           <a:p>
@@ -11730,13 +10846,13 @@
         </p:nvPicPr>
         <p:blipFill rotWithShape="1">
           <a:blip r:embed="rId3"/>
-          <a:srcRect l="10743" t="16037" r="4694" b="10784"/>
+          <a:srcRect l="3978" t="16887" r="11459" b="14093"/>
           <a:stretch/>
         </p:blipFill>
         <p:spPr>
           <a:xfrm>
-            <a:off x="5765800" y="4051300"/>
-            <a:ext cx="3175000" cy="2184400"/>
+            <a:off x="5948344" y="3111500"/>
+            <a:ext cx="2857500" cy="1854200"/>
           </a:xfrm>
           <a:prstGeom prst="rect">
             <a:avLst/>
@@ -11969,660 +11085,6 @@
           <a:p>
             <a:pPr eaLnBrk="1" hangingPunct="1"/>
             <a:r>
-              <a:rPr lang="de-DE" sz="1500" b="1" dirty="0" err="1" smtClean="0"/>
-              <a:t>Current</a:t>
-            </a:r>
-            <a:r>
-              <a:rPr lang="de-DE" sz="1500" b="1" dirty="0" smtClean="0"/>
-              <a:t> Approach</a:t>
-            </a:r>
-            <a:r>
-              <a:rPr lang="de-DE" b="1" dirty="0" smtClean="0"/>
-              <a:t/>
-            </a:r>
-            <a:br>
-              <a:rPr lang="de-DE" b="1" dirty="0" smtClean="0"/>
-            </a:br>
-            <a:r>
-              <a:rPr lang="de-DE" b="1" dirty="0" err="1" smtClean="0"/>
-              <a:t>Unsupervised</a:t>
-            </a:r>
-            <a:r>
-              <a:rPr lang="de-DE" b="1" dirty="0" smtClean="0"/>
-              <a:t> (II)</a:t>
-            </a:r>
-            <a:endParaRPr lang="de-DE" b="1" kern="0" dirty="0" smtClean="0"/>
-          </a:p>
-        </p:txBody>
-      </p:sp>
-      <p:sp>
-        <p:nvSpPr>
-          <p:cNvPr id="5" name="Textfeld 4"/>
-          <p:cNvSpPr txBox="1"/>
-          <p:nvPr/>
-        </p:nvSpPr>
-        <p:spPr>
-          <a:xfrm>
-            <a:off x="733490" y="2068006"/>
-            <a:ext cx="7805654" cy="3684086"/>
-          </a:xfrm>
-          <a:prstGeom prst="rect">
-            <a:avLst/>
-          </a:prstGeom>
-          <a:noFill/>
-        </p:spPr>
-        <p:txBody>
-          <a:bodyPr wrap="square" rtlCol="0">
-            <a:spAutoFit/>
-          </a:bodyPr>
-          <a:lstStyle/>
-          <a:p>
-            <a:pPr marL="285750" indent="-285750">
-              <a:buFont typeface="Wingdings" charset="2"/>
-              <a:buChar char="§"/>
-            </a:pPr>
-            <a:r>
-              <a:rPr lang="de-DE" sz="1800" b="1" dirty="0" err="1" smtClean="0"/>
-              <a:t>Hierarchical</a:t>
-            </a:r>
-            <a:r>
-              <a:rPr lang="de-DE" sz="1800" b="1" dirty="0" smtClean="0"/>
-              <a:t> </a:t>
-            </a:r>
-            <a:r>
-              <a:rPr lang="de-DE" sz="1800" b="1" dirty="0" err="1"/>
-              <a:t>Agglomerative</a:t>
-            </a:r>
-            <a:r>
-              <a:rPr lang="de-DE" sz="1800" b="1" dirty="0"/>
-              <a:t> Clustering (HAC</a:t>
-            </a:r>
-            <a:r>
-              <a:rPr lang="de-DE" sz="1800" b="1" dirty="0" smtClean="0"/>
-              <a:t>)</a:t>
-            </a:r>
-            <a:br>
-              <a:rPr lang="de-DE" sz="1800" b="1" dirty="0" smtClean="0"/>
-            </a:br>
-            <a:endParaRPr lang="de-DE" sz="1800" b="1" dirty="0"/>
-          </a:p>
-          <a:p>
-            <a:pPr marL="742950" lvl="1" indent="-285750">
-              <a:lnSpc>
-                <a:spcPct val="120000"/>
-              </a:lnSpc>
-              <a:buFont typeface="Wingdings" charset="2"/>
-              <a:buChar char="§"/>
-            </a:pPr>
-            <a:r>
-              <a:rPr lang="de-DE" sz="1800" dirty="0" smtClean="0"/>
-              <a:t>Start </a:t>
-            </a:r>
-            <a:r>
-              <a:rPr lang="de-DE" sz="1800" dirty="0" err="1" smtClean="0"/>
-              <a:t>with</a:t>
-            </a:r>
-            <a:r>
-              <a:rPr lang="de-DE" sz="1800" dirty="0" smtClean="0"/>
-              <a:t> </a:t>
-            </a:r>
-            <a:r>
-              <a:rPr lang="de-DE" sz="1800" dirty="0" err="1" smtClean="0"/>
-              <a:t>each</a:t>
-            </a:r>
-            <a:r>
-              <a:rPr lang="de-DE" sz="1800" dirty="0" smtClean="0"/>
-              <a:t> </a:t>
-            </a:r>
-            <a:r>
-              <a:rPr lang="de-DE" sz="1800" dirty="0" err="1" smtClean="0"/>
-              <a:t>post</a:t>
-            </a:r>
-            <a:r>
-              <a:rPr lang="de-DE" sz="1800" dirty="0" smtClean="0"/>
-              <a:t> </a:t>
-            </a:r>
-            <a:r>
-              <a:rPr lang="de-DE" sz="1800" dirty="0" err="1" smtClean="0"/>
-              <a:t>as</a:t>
-            </a:r>
-            <a:r>
-              <a:rPr lang="de-DE" sz="1800" dirty="0" smtClean="0"/>
-              <a:t> </a:t>
-            </a:r>
-            <a:r>
-              <a:rPr lang="de-DE" sz="1800" dirty="0" err="1" smtClean="0"/>
-              <a:t>single</a:t>
-            </a:r>
-            <a:r>
-              <a:rPr lang="de-DE" sz="1800" dirty="0" smtClean="0"/>
-              <a:t> </a:t>
-            </a:r>
-            <a:r>
-              <a:rPr lang="de-DE" sz="1800" dirty="0" err="1" smtClean="0"/>
-              <a:t>cluster</a:t>
-            </a:r>
-            <a:endParaRPr lang="de-DE" sz="1800" dirty="0" smtClean="0"/>
-          </a:p>
-          <a:p>
-            <a:pPr marL="742950" lvl="1" indent="-285750">
-              <a:lnSpc>
-                <a:spcPct val="120000"/>
-              </a:lnSpc>
-              <a:buFont typeface="Wingdings" charset="2"/>
-              <a:buChar char="§"/>
-            </a:pPr>
-            <a:r>
-              <a:rPr lang="de-DE" sz="1800" dirty="0" err="1" smtClean="0"/>
-              <a:t>Merge</a:t>
-            </a:r>
-            <a:r>
-              <a:rPr lang="de-DE" sz="1800" dirty="0" smtClean="0"/>
-              <a:t> pair </a:t>
-            </a:r>
-            <a:r>
-              <a:rPr lang="de-DE" sz="1800" dirty="0" err="1" smtClean="0"/>
-              <a:t>of</a:t>
-            </a:r>
-            <a:r>
-              <a:rPr lang="de-DE" sz="1800" dirty="0" smtClean="0"/>
-              <a:t> </a:t>
-            </a:r>
-            <a:r>
-              <a:rPr lang="de-DE" sz="1800" dirty="0" err="1" smtClean="0"/>
-              <a:t>clusters</a:t>
-            </a:r>
-            <a:r>
-              <a:rPr lang="de-DE" sz="1800" dirty="0" smtClean="0"/>
-              <a:t> </a:t>
-            </a:r>
-            <a:r>
-              <a:rPr lang="de-DE" sz="1800" dirty="0" err="1" smtClean="0"/>
-              <a:t>with</a:t>
-            </a:r>
-            <a:r>
-              <a:rPr lang="de-DE" sz="1800" dirty="0" smtClean="0"/>
-              <a:t> </a:t>
-            </a:r>
-            <a:r>
-              <a:rPr lang="de-DE" sz="1800" dirty="0" err="1" smtClean="0"/>
-              <a:t>lowest</a:t>
-            </a:r>
-            <a:r>
-              <a:rPr lang="de-DE" sz="1800" dirty="0" smtClean="0"/>
-              <a:t> </a:t>
-            </a:r>
-            <a:r>
-              <a:rPr lang="de-DE" sz="1800" dirty="0" err="1" smtClean="0"/>
-              <a:t>distance</a:t>
-            </a:r>
-            <a:endParaRPr lang="de-DE" sz="1800" dirty="0" smtClean="0"/>
-          </a:p>
-          <a:p>
-            <a:pPr marL="742950" lvl="1" indent="-285750">
-              <a:lnSpc>
-                <a:spcPct val="120000"/>
-              </a:lnSpc>
-              <a:buFont typeface="Wingdings" charset="2"/>
-              <a:buChar char="§"/>
-            </a:pPr>
-            <a:r>
-              <a:rPr lang="de-DE" sz="1800" dirty="0"/>
-              <a:t>Update </a:t>
-            </a:r>
-            <a:r>
-              <a:rPr lang="de-DE" sz="1800" dirty="0" err="1"/>
-              <a:t>distance</a:t>
-            </a:r>
-            <a:r>
-              <a:rPr lang="de-DE" sz="1800" dirty="0"/>
-              <a:t> </a:t>
-            </a:r>
-            <a:r>
-              <a:rPr lang="de-DE" sz="1800" dirty="0" err="1" smtClean="0"/>
-              <a:t>matrix</a:t>
-            </a:r>
-            <a:r>
-              <a:rPr lang="de-DE" sz="1800" dirty="0"/>
-              <a:t> </a:t>
-            </a:r>
-            <a:r>
-              <a:rPr lang="de-DE" sz="1800" dirty="0" err="1" smtClean="0"/>
-              <a:t>and</a:t>
-            </a:r>
-            <a:r>
-              <a:rPr lang="de-DE" sz="1800" dirty="0" smtClean="0"/>
-              <a:t> </a:t>
-            </a:r>
-            <a:r>
-              <a:rPr lang="de-DE" sz="1800" dirty="0" err="1" smtClean="0"/>
-              <a:t>repeat</a:t>
-            </a:r>
-            <a:r>
-              <a:rPr lang="de-DE" sz="1800" dirty="0" smtClean="0"/>
-              <a:t> </a:t>
-            </a:r>
-            <a:r>
-              <a:rPr lang="de-DE" sz="1800" dirty="0" err="1" smtClean="0"/>
-              <a:t>until</a:t>
-            </a:r>
-            <a:r>
-              <a:rPr lang="de-DE" sz="1800" dirty="0" smtClean="0"/>
-              <a:t> </a:t>
-            </a:r>
-            <a:r>
-              <a:rPr lang="de-DE" sz="1800" dirty="0" err="1" smtClean="0"/>
-              <a:t>stop</a:t>
-            </a:r>
-            <a:r>
-              <a:rPr lang="de-DE" sz="1800" dirty="0" smtClean="0"/>
-              <a:t> </a:t>
-            </a:r>
-            <a:r>
-              <a:rPr lang="de-DE" sz="1800" dirty="0" err="1" smtClean="0"/>
-              <a:t>criterion</a:t>
-            </a:r>
-            <a:endParaRPr lang="de-DE" sz="1800" dirty="0" smtClean="0"/>
-          </a:p>
-          <a:p>
-            <a:pPr lvl="1"/>
-            <a:endParaRPr lang="de-DE" sz="1800" dirty="0" smtClean="0"/>
-          </a:p>
-          <a:p>
-            <a:pPr marL="742950" lvl="1" indent="-285750">
-              <a:buFont typeface="Arial"/>
-              <a:buChar char="•"/>
-            </a:pPr>
-            <a:endParaRPr lang="de-DE" sz="1800" dirty="0" smtClean="0"/>
-          </a:p>
-          <a:p>
-            <a:pPr marL="285750" indent="-285750">
-              <a:buFont typeface="Wingdings" charset="2"/>
-              <a:buChar char="§"/>
-            </a:pPr>
-            <a:r>
-              <a:rPr lang="de-DE" sz="1800" b="1" dirty="0" smtClean="0"/>
-              <a:t>Implementation </a:t>
-            </a:r>
-            <a:r>
-              <a:rPr lang="de-DE" sz="1800" b="1" dirty="0" err="1" smtClean="0"/>
-              <a:t>and</a:t>
-            </a:r>
-            <a:r>
-              <a:rPr lang="de-DE" sz="1800" b="1" dirty="0" smtClean="0"/>
-              <a:t> Parameters</a:t>
-            </a:r>
-            <a:r>
-              <a:rPr lang="de-DE" sz="1800" dirty="0" smtClean="0"/>
-              <a:t>:</a:t>
-            </a:r>
-            <a:br>
-              <a:rPr lang="de-DE" sz="1800" dirty="0" smtClean="0"/>
-            </a:br>
-            <a:endParaRPr lang="de-DE" sz="1800" dirty="0" smtClean="0"/>
-          </a:p>
-          <a:p>
-            <a:pPr marL="742950" lvl="1" indent="-285750">
-              <a:buFont typeface="Wingdings" charset="2"/>
-              <a:buChar char="§"/>
-            </a:pPr>
-            <a:r>
-              <a:rPr lang="de-DE" sz="1800" u="sng" dirty="0" err="1" smtClean="0"/>
-              <a:t>Linkage</a:t>
-            </a:r>
-            <a:r>
-              <a:rPr lang="de-DE" sz="1800" dirty="0" smtClean="0"/>
-              <a:t> (</a:t>
-            </a:r>
-            <a:r>
-              <a:rPr lang="de-DE" sz="1800" dirty="0" err="1" smtClean="0"/>
-              <a:t>distance</a:t>
-            </a:r>
-            <a:r>
-              <a:rPr lang="de-DE" sz="1800" dirty="0" smtClean="0"/>
-              <a:t> </a:t>
-            </a:r>
-            <a:r>
-              <a:rPr lang="de-DE" sz="1800" dirty="0" err="1" smtClean="0"/>
-              <a:t>measure</a:t>
-            </a:r>
-            <a:r>
-              <a:rPr lang="de-DE" sz="1800" dirty="0" smtClean="0"/>
-              <a:t>): </a:t>
-            </a:r>
-            <a:r>
-              <a:rPr lang="de-DE" sz="1800" i="1" dirty="0" smtClean="0"/>
-              <a:t>Ward </a:t>
-            </a:r>
-            <a:r>
-              <a:rPr lang="de-DE" sz="1800" i="1" dirty="0" err="1" smtClean="0"/>
-              <a:t>criterion</a:t>
-            </a:r>
-            <a:r>
-              <a:rPr lang="de-DE" sz="1800" i="1" dirty="0" smtClean="0"/>
-              <a:t> </a:t>
-            </a:r>
-            <a:r>
-              <a:rPr lang="de-DE" sz="1800" dirty="0" smtClean="0"/>
-              <a:t>(</a:t>
-            </a:r>
-            <a:r>
-              <a:rPr lang="de-DE" sz="1800" dirty="0" err="1" smtClean="0"/>
-              <a:t>minimum</a:t>
-            </a:r>
-            <a:r>
-              <a:rPr lang="de-DE" sz="1800" dirty="0" smtClean="0"/>
-              <a:t> </a:t>
-            </a:r>
-            <a:r>
-              <a:rPr lang="de-DE" sz="1800" dirty="0" err="1" smtClean="0"/>
-              <a:t>variance</a:t>
-            </a:r>
-            <a:r>
-              <a:rPr lang="de-DE" sz="1800" dirty="0" smtClean="0"/>
-              <a:t>)</a:t>
-            </a:r>
-          </a:p>
-          <a:p>
-            <a:pPr marL="742950" lvl="1" indent="-285750">
-              <a:lnSpc>
-                <a:spcPct val="120000"/>
-              </a:lnSpc>
-              <a:buFont typeface="Wingdings" charset="2"/>
-              <a:buChar char="§"/>
-            </a:pPr>
-            <a:r>
-              <a:rPr lang="de-DE" sz="1800" u="sng" dirty="0" err="1" smtClean="0"/>
-              <a:t>Distance</a:t>
-            </a:r>
-            <a:r>
-              <a:rPr lang="de-DE" sz="1800" dirty="0" smtClean="0"/>
-              <a:t>: </a:t>
-            </a:r>
-            <a:r>
-              <a:rPr lang="de-DE" sz="1800" i="1" dirty="0" err="1" smtClean="0"/>
-              <a:t>Euclidean</a:t>
-            </a:r>
-            <a:endParaRPr lang="de-DE" sz="1800" i="1" dirty="0" smtClean="0"/>
-          </a:p>
-          <a:p>
-            <a:pPr marL="742950" lvl="1" indent="-285750">
-              <a:lnSpc>
-                <a:spcPct val="120000"/>
-              </a:lnSpc>
-              <a:buFont typeface="Wingdings" charset="2"/>
-              <a:buChar char="§"/>
-            </a:pPr>
-            <a:r>
-              <a:rPr lang="de-DE" sz="1800" u="sng" dirty="0" err="1" smtClean="0"/>
-              <a:t>Stop</a:t>
-            </a:r>
-            <a:r>
-              <a:rPr lang="de-DE" sz="1800" u="sng" dirty="0" smtClean="0"/>
-              <a:t> </a:t>
-            </a:r>
-            <a:r>
-              <a:rPr lang="de-DE" sz="1800" u="sng" dirty="0" err="1" smtClean="0"/>
-              <a:t>criterion</a:t>
-            </a:r>
-            <a:r>
-              <a:rPr lang="de-DE" sz="1800" dirty="0" smtClean="0"/>
-              <a:t>: </a:t>
-            </a:r>
-            <a:r>
-              <a:rPr lang="de-DE" sz="1800" dirty="0" err="1" smtClean="0"/>
-              <a:t>number</a:t>
-            </a:r>
-            <a:r>
-              <a:rPr lang="de-DE" sz="1800" dirty="0" smtClean="0"/>
-              <a:t> </a:t>
-            </a:r>
-            <a:r>
-              <a:rPr lang="de-DE" sz="1800" dirty="0" err="1" smtClean="0"/>
-              <a:t>of</a:t>
-            </a:r>
-            <a:r>
-              <a:rPr lang="de-DE" sz="1800" dirty="0" smtClean="0"/>
-              <a:t> </a:t>
-            </a:r>
-            <a:r>
-              <a:rPr lang="de-DE" sz="1800" dirty="0" err="1" smtClean="0"/>
-              <a:t>clusters</a:t>
-            </a:r>
-            <a:r>
-              <a:rPr lang="de-DE" sz="1800" dirty="0" smtClean="0"/>
-              <a:t> (~ #tags)</a:t>
-            </a:r>
-            <a:endParaRPr lang="de-DE" sz="1800" dirty="0"/>
-          </a:p>
-        </p:txBody>
-      </p:sp>
-    </p:spTree>
-    <p:extLst>
-      <p:ext uri="{BB962C8B-B14F-4D97-AF65-F5344CB8AC3E}">
-        <p14:creationId xmlns:p14="http://schemas.microsoft.com/office/powerpoint/2010/main" val="3725130415"/>
-      </p:ext>
-    </p:extLst>
-  </p:cSld>
-  <p:clrMapOvr>
-    <a:masterClrMapping/>
-  </p:clrMapOvr>
-  <p:timing>
-    <p:tnLst>
-      <p:par>
-        <p:cTn xmlns:p14="http://schemas.microsoft.com/office/powerpoint/2010/main" id="1" dur="indefinite" restart="never" nodeType="tmRoot"/>
-      </p:par>
-    </p:tnLst>
-  </p:timing>
-</p:sld>
-</file>
-
-<file path=ppt/slides/slide9.xml><?xml version="1.0" encoding="utf-8"?>
-<p:sld xmlns:a="http://schemas.openxmlformats.org/drawingml/2006/main" xmlns:r="http://schemas.openxmlformats.org/officeDocument/2006/relationships" xmlns:p="http://schemas.openxmlformats.org/presentationml/2006/main">
-  <p:cSld>
-    <p:spTree>
-      <p:nvGrpSpPr>
-        <p:cNvPr id="1" name=""/>
-        <p:cNvGrpSpPr/>
-        <p:nvPr/>
-      </p:nvGrpSpPr>
-      <p:grpSpPr>
-        <a:xfrm>
-          <a:off x="0" y="0"/>
-          <a:ext cx="0" cy="0"/>
-          <a:chOff x="0" y="0"/>
-          <a:chExt cx="0" cy="0"/>
-        </a:xfrm>
-      </p:grpSpPr>
-      <p:sp>
-        <p:nvSpPr>
-          <p:cNvPr id="8" name="Rectangle 2"/>
-          <p:cNvSpPr txBox="1">
-            <a:spLocks noChangeArrowheads="1"/>
-          </p:cNvSpPr>
-          <p:nvPr/>
-        </p:nvSpPr>
-        <p:spPr bwMode="auto">
-          <a:xfrm>
-            <a:off x="461963" y="485772"/>
-            <a:ext cx="8224837" cy="1069975"/>
-          </a:xfrm>
-          <a:prstGeom prst="rect">
-            <a:avLst/>
-          </a:prstGeom>
-          <a:noFill/>
-          <a:ln>
-            <a:noFill/>
-          </a:ln>
-          <a:effectLst/>
-          <a:extLst>
-            <a:ext uri="{909E8E84-426E-40dd-AFC4-6F175D3DCCD1}">
-              <a14:hiddenFill xmlns:a14="http://schemas.microsoft.com/office/drawing/2010/main">
-                <a:solidFill>
-                  <a:schemeClr val="accent1"/>
-                </a:solidFill>
-              </a14:hiddenFill>
-            </a:ext>
-            <a:ext uri="{91240B29-F687-4f45-9708-019B960494DF}">
-              <a14:hiddenLine xmlns:a14="http://schemas.microsoft.com/office/drawing/2010/main" w="9525">
-                <a:solidFill>
-                  <a:schemeClr val="tx1"/>
-                </a:solidFill>
-                <a:miter lim="800000"/>
-                <a:headEnd/>
-                <a:tailEnd/>
-              </a14:hiddenLine>
-            </a:ext>
-            <a:ext uri="{AF507438-7753-43e0-B8FC-AC1667EBCBE1}">
-              <a14:hiddenEffects xmlns:a14="http://schemas.microsoft.com/office/drawing/2010/main">
-                <a:effectLst>
-                  <a:outerShdw dist="35921" dir="2700000" algn="ctr" rotWithShape="0">
-                    <a:schemeClr val="bg2"/>
-                  </a:outerShdw>
-                </a:effectLst>
-              </a14:hiddenEffects>
-            </a:ext>
-          </a:extLst>
-        </p:spPr>
-        <p:txBody>
-          <a:bodyPr vert="horz" wrap="square" lIns="91440" tIns="45720" rIns="91440" bIns="45720" numCol="1" anchor="ctr" anchorCtr="0" compatLnSpc="1">
-            <a:prstTxWarp prst="textNoShape">
-              <a:avLst/>
-            </a:prstTxWarp>
-          </a:bodyPr>
-          <a:lstStyle>
-            <a:lvl1pPr algn="ctr" rtl="0" eaLnBrk="0" fontAlgn="base" hangingPunct="0">
-              <a:spcBef>
-                <a:spcPct val="0"/>
-              </a:spcBef>
-              <a:spcAft>
-                <a:spcPct val="0"/>
-              </a:spcAft>
-              <a:defRPr sz="3200">
-                <a:solidFill>
-                  <a:schemeClr val="bg2"/>
-                </a:solidFill>
-                <a:latin typeface="+mj-lt"/>
-                <a:ea typeface="+mj-ea"/>
-                <a:cs typeface="+mj-cs"/>
-              </a:defRPr>
-            </a:lvl1pPr>
-            <a:lvl2pPr algn="ctr" rtl="0" eaLnBrk="0" fontAlgn="base" hangingPunct="0">
-              <a:spcBef>
-                <a:spcPct val="0"/>
-              </a:spcBef>
-              <a:spcAft>
-                <a:spcPct val="0"/>
-              </a:spcAft>
-              <a:defRPr sz="3200">
-                <a:solidFill>
-                  <a:schemeClr val="bg2"/>
-                </a:solidFill>
-                <a:latin typeface="Arial" charset="0"/>
-              </a:defRPr>
-            </a:lvl2pPr>
-            <a:lvl3pPr algn="ctr" rtl="0" eaLnBrk="0" fontAlgn="base" hangingPunct="0">
-              <a:spcBef>
-                <a:spcPct val="0"/>
-              </a:spcBef>
-              <a:spcAft>
-                <a:spcPct val="0"/>
-              </a:spcAft>
-              <a:defRPr sz="3200">
-                <a:solidFill>
-                  <a:schemeClr val="bg2"/>
-                </a:solidFill>
-                <a:latin typeface="Arial" charset="0"/>
-              </a:defRPr>
-            </a:lvl3pPr>
-            <a:lvl4pPr algn="ctr" rtl="0" eaLnBrk="0" fontAlgn="base" hangingPunct="0">
-              <a:spcBef>
-                <a:spcPct val="0"/>
-              </a:spcBef>
-              <a:spcAft>
-                <a:spcPct val="0"/>
-              </a:spcAft>
-              <a:defRPr sz="3200">
-                <a:solidFill>
-                  <a:schemeClr val="bg2"/>
-                </a:solidFill>
-                <a:latin typeface="Arial" charset="0"/>
-              </a:defRPr>
-            </a:lvl4pPr>
-            <a:lvl5pPr algn="ctr" rtl="0" eaLnBrk="0" fontAlgn="base" hangingPunct="0">
-              <a:spcBef>
-                <a:spcPct val="0"/>
-              </a:spcBef>
-              <a:spcAft>
-                <a:spcPct val="0"/>
-              </a:spcAft>
-              <a:defRPr sz="3200">
-                <a:solidFill>
-                  <a:schemeClr val="bg2"/>
-                </a:solidFill>
-                <a:latin typeface="Arial" charset="0"/>
-              </a:defRPr>
-            </a:lvl5pPr>
-            <a:lvl6pPr marL="457200" algn="ctr" rtl="0" fontAlgn="base">
-              <a:spcBef>
-                <a:spcPct val="0"/>
-              </a:spcBef>
-              <a:spcAft>
-                <a:spcPct val="0"/>
-              </a:spcAft>
-              <a:defRPr sz="3200">
-                <a:solidFill>
-                  <a:schemeClr val="bg2"/>
-                </a:solidFill>
-                <a:latin typeface="Arial" charset="0"/>
-              </a:defRPr>
-            </a:lvl6pPr>
-            <a:lvl7pPr marL="914400" algn="ctr" rtl="0" fontAlgn="base">
-              <a:spcBef>
-                <a:spcPct val="0"/>
-              </a:spcBef>
-              <a:spcAft>
-                <a:spcPct val="0"/>
-              </a:spcAft>
-              <a:defRPr sz="3200">
-                <a:solidFill>
-                  <a:schemeClr val="bg2"/>
-                </a:solidFill>
-                <a:latin typeface="Arial" charset="0"/>
-              </a:defRPr>
-            </a:lvl7pPr>
-            <a:lvl8pPr marL="1371600" algn="ctr" rtl="0" fontAlgn="base">
-              <a:spcBef>
-                <a:spcPct val="0"/>
-              </a:spcBef>
-              <a:spcAft>
-                <a:spcPct val="0"/>
-              </a:spcAft>
-              <a:defRPr sz="3200">
-                <a:solidFill>
-                  <a:schemeClr val="bg2"/>
-                </a:solidFill>
-                <a:latin typeface="Arial" charset="0"/>
-              </a:defRPr>
-            </a:lvl8pPr>
-            <a:lvl9pPr marL="1828800" algn="ctr" rtl="0" fontAlgn="base">
-              <a:spcBef>
-                <a:spcPct val="0"/>
-              </a:spcBef>
-              <a:spcAft>
-                <a:spcPct val="0"/>
-              </a:spcAft>
-              <a:defRPr sz="3200">
-                <a:solidFill>
-                  <a:schemeClr val="bg2"/>
-                </a:solidFill>
-                <a:latin typeface="Arial" charset="0"/>
-              </a:defRPr>
-            </a:lvl9pPr>
-          </a:lstStyle>
-          <a:p>
-            <a:pPr eaLnBrk="1" hangingPunct="1"/>
-            <a:r>
               <a:rPr lang="de-DE" b="1" dirty="0" smtClean="0"/>
               <a:t>Evaluation</a:t>
             </a:r>
@@ -12919,7 +11381,7 @@
           <a:graphicData uri="http://schemas.openxmlformats.org/presentationml/2006/ole">
             <mc:AlternateContent xmlns:mc="http://schemas.openxmlformats.org/markup-compatibility/2006">
               <mc:Choice xmlns:v="urn:schemas-microsoft-com:vml" Requires="v">
-                <p:oleObj spid="_x0000_s1342" name="Formel" r:id="rId4" imgW="2806700" imgH="609600" progId="Equation.3">
+                <p:oleObj spid="_x0000_s1399" name="Formel" r:id="rId4" imgW="2806700" imgH="609600" progId="Equation.3">
                   <p:embed/>
                 </p:oleObj>
               </mc:Choice>
@@ -12976,7 +11438,7 @@
           <a:graphicData uri="http://schemas.openxmlformats.org/presentationml/2006/ole">
             <mc:AlternateContent xmlns:mc="http://schemas.openxmlformats.org/markup-compatibility/2006">
               <mc:Choice xmlns:v="urn:schemas-microsoft-com:vml" Requires="v">
-                <p:oleObj spid="_x0000_s1343" name="Formel" r:id="rId6" imgW="2667000" imgH="609600" progId="Equation.3">
+                <p:oleObj spid="_x0000_s1400" name="Formel" r:id="rId6" imgW="2667000" imgH="609600" progId="Equation.3">
                   <p:embed/>
                 </p:oleObj>
               </mc:Choice>
@@ -13121,6 +11583,671 @@
     <p:extLst>
       <p:ext uri="{BB962C8B-B14F-4D97-AF65-F5344CB8AC3E}">
         <p14:creationId xmlns:p14="http://schemas.microsoft.com/office/powerpoint/2010/main" val="921231124"/>
+      </p:ext>
+    </p:extLst>
+  </p:cSld>
+  <p:clrMapOvr>
+    <a:masterClrMapping/>
+  </p:clrMapOvr>
+  <p:timing>
+    <p:tnLst>
+      <p:par>
+        <p:cTn xmlns:p14="http://schemas.microsoft.com/office/powerpoint/2010/main" id="1" dur="indefinite" restart="never" nodeType="tmRoot"/>
+      </p:par>
+    </p:tnLst>
+  </p:timing>
+</p:sld>
+</file>
+
+<file path=ppt/slides/slide9.xml><?xml version="1.0" encoding="utf-8"?>
+<p:sld xmlns:a="http://schemas.openxmlformats.org/drawingml/2006/main" xmlns:r="http://schemas.openxmlformats.org/officeDocument/2006/relationships" xmlns:p="http://schemas.openxmlformats.org/presentationml/2006/main">
+  <p:cSld>
+    <p:spTree>
+      <p:nvGrpSpPr>
+        <p:cNvPr id="1" name=""/>
+        <p:cNvGrpSpPr/>
+        <p:nvPr/>
+      </p:nvGrpSpPr>
+      <p:grpSpPr>
+        <a:xfrm>
+          <a:off x="0" y="0"/>
+          <a:ext cx="0" cy="0"/>
+          <a:chOff x="0" y="0"/>
+          <a:chExt cx="0" cy="0"/>
+        </a:xfrm>
+      </p:grpSpPr>
+      <p:graphicFrame>
+        <p:nvGraphicFramePr>
+          <p:cNvPr id="2" name="Tabelle 1"/>
+          <p:cNvGraphicFramePr>
+            <a:graphicFrameLocks noGrp="1"/>
+          </p:cNvGraphicFramePr>
+          <p:nvPr>
+            <p:extLst>
+              <p:ext uri="{D42A27DB-BD31-4B8C-83A1-F6EECF244321}">
+                <p14:modId xmlns:p14="http://schemas.microsoft.com/office/powerpoint/2010/main" val="2676765233"/>
+              </p:ext>
+            </p:extLst>
+          </p:nvPr>
+        </p:nvGraphicFramePr>
+        <p:xfrm>
+          <a:off x="812405" y="1933414"/>
+          <a:ext cx="7759581" cy="2115358"/>
+        </p:xfrm>
+        <a:graphic>
+          <a:graphicData uri="http://schemas.openxmlformats.org/drawingml/2006/table">
+            <a:tbl>
+              <a:tblPr firstRow="1" bandRow="1">
+                <a:tableStyleId>{5C22544A-7EE6-4342-B048-85BDC9FD1C3A}</a:tableStyleId>
+              </a:tblPr>
+              <a:tblGrid>
+                <a:gridCol w="2586527"/>
+                <a:gridCol w="2586527"/>
+                <a:gridCol w="2586527"/>
+              </a:tblGrid>
+              <a:tr h="523387">
+                <a:tc>
+                  <a:txBody>
+                    <a:bodyPr/>
+                    <a:lstStyle/>
+                    <a:p>
+                      <a:r>
+                        <a:rPr lang="de-DE" dirty="0" smtClean="0"/>
+                        <a:t>Model</a:t>
+                      </a:r>
+                      <a:endParaRPr lang="de-DE" dirty="0"/>
+                    </a:p>
+                  </a:txBody>
+                  <a:tcPr>
+                    <a:solidFill>
+                      <a:schemeClr val="accent5">
+                        <a:lumMod val="90000"/>
+                      </a:schemeClr>
+                    </a:solidFill>
+                  </a:tcPr>
+                </a:tc>
+                <a:tc>
+                  <a:txBody>
+                    <a:bodyPr/>
+                    <a:lstStyle/>
+                    <a:p>
+                      <a:pPr algn="ctr"/>
+                      <a:r>
+                        <a:rPr lang="de-DE" dirty="0" smtClean="0"/>
+                        <a:t>Precision</a:t>
+                      </a:r>
+                      <a:endParaRPr lang="de-DE" dirty="0"/>
+                    </a:p>
+                  </a:txBody>
+                  <a:tcPr/>
+                </a:tc>
+                <a:tc>
+                  <a:txBody>
+                    <a:bodyPr/>
+                    <a:lstStyle/>
+                    <a:p>
+                      <a:pPr algn="ctr"/>
+                      <a:r>
+                        <a:rPr lang="de-DE" dirty="0" smtClean="0"/>
+                        <a:t>Recall</a:t>
+                      </a:r>
+                      <a:endParaRPr lang="de-DE" dirty="0"/>
+                    </a:p>
+                  </a:txBody>
+                  <a:tcPr/>
+                </a:tc>
+              </a:tr>
+              <a:tr h="530657">
+                <a:tc>
+                  <a:txBody>
+                    <a:bodyPr/>
+                    <a:lstStyle/>
+                    <a:p>
+                      <a:pPr algn="l"/>
+                      <a:r>
+                        <a:rPr lang="de-DE" dirty="0" err="1" smtClean="0"/>
+                        <a:t>MultinomialNB</a:t>
+                      </a:r>
+                      <a:endParaRPr lang="de-DE" dirty="0"/>
+                    </a:p>
+                  </a:txBody>
+                  <a:tcPr anchor="ctr"/>
+                </a:tc>
+                <a:tc>
+                  <a:txBody>
+                    <a:bodyPr/>
+                    <a:lstStyle/>
+                    <a:p>
+                      <a:pPr algn="ctr"/>
+                      <a:r>
+                        <a:rPr lang="is-IS" dirty="0" smtClean="0"/>
+                        <a:t>0.332</a:t>
+                      </a:r>
+                      <a:endParaRPr lang="de-DE" dirty="0"/>
+                    </a:p>
+                  </a:txBody>
+                  <a:tcPr anchor="ctr"/>
+                </a:tc>
+                <a:tc>
+                  <a:txBody>
+                    <a:bodyPr/>
+                    <a:lstStyle/>
+                    <a:p>
+                      <a:pPr algn="ctr"/>
+                      <a:r>
+                        <a:rPr lang="nb-NO" dirty="0" smtClean="0"/>
+                        <a:t>0.285</a:t>
+                      </a:r>
+                      <a:endParaRPr lang="de-DE" dirty="0"/>
+                    </a:p>
+                  </a:txBody>
+                  <a:tcPr anchor="ctr"/>
+                </a:tc>
+              </a:tr>
+              <a:tr h="530657">
+                <a:tc>
+                  <a:txBody>
+                    <a:bodyPr/>
+                    <a:lstStyle/>
+                    <a:p>
+                      <a:pPr algn="l"/>
+                      <a:r>
+                        <a:rPr lang="de-DE" dirty="0" err="1" smtClean="0"/>
+                        <a:t>k-Means</a:t>
+                      </a:r>
+                      <a:r>
+                        <a:rPr lang="de-DE" dirty="0" smtClean="0"/>
+                        <a:t> </a:t>
+                      </a:r>
+                      <a:r>
+                        <a:rPr lang="de-DE" baseline="30000" dirty="0" smtClean="0"/>
+                        <a:t>1)</a:t>
+                      </a:r>
+                      <a:endParaRPr lang="de-DE" baseline="30000" dirty="0"/>
+                    </a:p>
+                  </a:txBody>
+                  <a:tcPr anchor="ctr"/>
+                </a:tc>
+                <a:tc>
+                  <a:txBody>
+                    <a:bodyPr/>
+                    <a:lstStyle/>
+                    <a:p>
+                      <a:pPr algn="ctr"/>
+                      <a:r>
+                        <a:rPr lang="de-DE" dirty="0" smtClean="0"/>
+                        <a:t>0.298</a:t>
+                      </a:r>
+                      <a:endParaRPr lang="de-DE" dirty="0"/>
+                    </a:p>
+                  </a:txBody>
+                  <a:tcPr anchor="ctr"/>
+                </a:tc>
+                <a:tc>
+                  <a:txBody>
+                    <a:bodyPr/>
+                    <a:lstStyle/>
+                    <a:p>
+                      <a:pPr algn="ctr"/>
+                      <a:r>
+                        <a:rPr lang="de-DE" dirty="0" smtClean="0"/>
+                        <a:t>0.262</a:t>
+                      </a:r>
+                      <a:endParaRPr lang="de-DE" dirty="0"/>
+                    </a:p>
+                  </a:txBody>
+                  <a:tcPr anchor="ctr"/>
+                </a:tc>
+              </a:tr>
+              <a:tr h="530657">
+                <a:tc>
+                  <a:txBody>
+                    <a:bodyPr/>
+                    <a:lstStyle/>
+                    <a:p>
+                      <a:pPr algn="l"/>
+                      <a:r>
+                        <a:rPr lang="de-DE" dirty="0" smtClean="0"/>
+                        <a:t>HAC </a:t>
+                      </a:r>
+                      <a:r>
+                        <a:rPr lang="de-DE" baseline="30000" dirty="0" smtClean="0"/>
+                        <a:t>2)</a:t>
+                      </a:r>
+                      <a:endParaRPr lang="de-DE" baseline="30000" dirty="0"/>
+                    </a:p>
+                  </a:txBody>
+                  <a:tcPr anchor="ctr"/>
+                </a:tc>
+                <a:tc>
+                  <a:txBody>
+                    <a:bodyPr/>
+                    <a:lstStyle/>
+                    <a:p>
+                      <a:pPr algn="ctr"/>
+                      <a:r>
+                        <a:rPr lang="de-DE" dirty="0" smtClean="0"/>
+                        <a:t>0.281</a:t>
+                      </a:r>
+                      <a:endParaRPr lang="de-DE" dirty="0"/>
+                    </a:p>
+                  </a:txBody>
+                  <a:tcPr anchor="ctr"/>
+                </a:tc>
+                <a:tc>
+                  <a:txBody>
+                    <a:bodyPr/>
+                    <a:lstStyle/>
+                    <a:p>
+                      <a:pPr algn="ctr"/>
+                      <a:r>
+                        <a:rPr lang="de-DE" dirty="0" smtClean="0"/>
+                        <a:t>0.255</a:t>
+                      </a:r>
+                      <a:endParaRPr lang="de-DE" dirty="0"/>
+                    </a:p>
+                  </a:txBody>
+                  <a:tcPr anchor="ctr"/>
+                </a:tc>
+              </a:tr>
+            </a:tbl>
+          </a:graphicData>
+        </a:graphic>
+      </p:graphicFrame>
+      <p:sp>
+        <p:nvSpPr>
+          <p:cNvPr id="5" name="Textfeld 4"/>
+          <p:cNvSpPr txBox="1"/>
+          <p:nvPr/>
+        </p:nvSpPr>
+        <p:spPr>
+          <a:xfrm>
+            <a:off x="812405" y="4675100"/>
+            <a:ext cx="7759581" cy="860748"/>
+          </a:xfrm>
+          <a:prstGeom prst="rect">
+            <a:avLst/>
+          </a:prstGeom>
+          <a:noFill/>
+        </p:spPr>
+        <p:txBody>
+          <a:bodyPr wrap="square" rtlCol="0">
+            <a:spAutoFit/>
+          </a:bodyPr>
+          <a:lstStyle/>
+          <a:p>
+            <a:pPr>
+              <a:lnSpc>
+                <a:spcPct val="120000"/>
+              </a:lnSpc>
+            </a:pPr>
+            <a:r>
+              <a:rPr lang="de-DE" sz="1400" dirty="0" smtClean="0"/>
+              <a:t>All </a:t>
+            </a:r>
+            <a:r>
+              <a:rPr lang="de-DE" sz="1400" dirty="0" err="1" smtClean="0"/>
+              <a:t>results</a:t>
+            </a:r>
+            <a:r>
+              <a:rPr lang="de-DE" sz="1400" dirty="0" smtClean="0"/>
+              <a:t> </a:t>
+            </a:r>
+            <a:r>
+              <a:rPr lang="de-DE" sz="1400" dirty="0" err="1" smtClean="0"/>
+              <a:t>are</a:t>
+            </a:r>
+            <a:r>
+              <a:rPr lang="de-DE" sz="1400" dirty="0" smtClean="0"/>
+              <a:t> </a:t>
+            </a:r>
+            <a:r>
+              <a:rPr lang="de-DE" sz="1400" dirty="0" err="1" smtClean="0"/>
+              <a:t>based</a:t>
+            </a:r>
+            <a:r>
+              <a:rPr lang="de-DE" sz="1400" dirty="0" smtClean="0"/>
+              <a:t> on </a:t>
+            </a:r>
+            <a:r>
+              <a:rPr lang="de-DE" sz="1400" u="sng" dirty="0" err="1" smtClean="0"/>
+              <a:t>two</a:t>
+            </a:r>
+            <a:r>
+              <a:rPr lang="de-DE" sz="1400" u="sng" dirty="0" smtClean="0"/>
+              <a:t> </a:t>
+            </a:r>
+            <a:r>
+              <a:rPr lang="de-DE" sz="1400" u="sng" dirty="0" err="1" smtClean="0"/>
+              <a:t>predicted</a:t>
+            </a:r>
+            <a:r>
+              <a:rPr lang="de-DE" sz="1400" u="sng" dirty="0" smtClean="0"/>
+              <a:t> tags</a:t>
+            </a:r>
+            <a:r>
+              <a:rPr lang="de-DE" sz="1400" dirty="0" smtClean="0"/>
+              <a:t> (</a:t>
+            </a:r>
+            <a:r>
+              <a:rPr lang="de-DE" sz="1400" dirty="0" err="1" smtClean="0"/>
+              <a:t>average</a:t>
+            </a:r>
+            <a:r>
+              <a:rPr lang="de-DE" sz="1400" dirty="0" smtClean="0"/>
+              <a:t> tag </a:t>
+            </a:r>
+            <a:r>
+              <a:rPr lang="de-DE" sz="1400" dirty="0" err="1" smtClean="0"/>
+              <a:t>assignment</a:t>
+            </a:r>
+            <a:r>
+              <a:rPr lang="de-DE" sz="1400" dirty="0" smtClean="0"/>
+              <a:t> = 2.68)</a:t>
+            </a:r>
+          </a:p>
+          <a:p>
+            <a:pPr>
+              <a:lnSpc>
+                <a:spcPct val="120000"/>
+              </a:lnSpc>
+            </a:pPr>
+            <a:r>
+              <a:rPr lang="de-DE" sz="1400" baseline="30000" dirty="0" smtClean="0"/>
+              <a:t>1) </a:t>
+            </a:r>
+            <a:r>
+              <a:rPr lang="de-DE" sz="1400" dirty="0" err="1" smtClean="0"/>
+              <a:t>Number</a:t>
+            </a:r>
+            <a:r>
+              <a:rPr lang="de-DE" sz="1400" dirty="0" smtClean="0"/>
+              <a:t> </a:t>
+            </a:r>
+            <a:r>
+              <a:rPr lang="de-DE" sz="1400" dirty="0" err="1" smtClean="0"/>
+              <a:t>of</a:t>
+            </a:r>
+            <a:r>
+              <a:rPr lang="de-DE" sz="1400" dirty="0" smtClean="0"/>
+              <a:t> </a:t>
+            </a:r>
+            <a:r>
+              <a:rPr lang="de-DE" sz="1400" dirty="0" err="1" smtClean="0"/>
+              <a:t>clusters</a:t>
+            </a:r>
+            <a:r>
+              <a:rPr lang="de-DE" sz="1400" dirty="0" smtClean="0"/>
+              <a:t> = #tags  </a:t>
+            </a:r>
+          </a:p>
+          <a:p>
+            <a:pPr>
+              <a:lnSpc>
+                <a:spcPct val="120000"/>
+              </a:lnSpc>
+            </a:pPr>
+            <a:r>
+              <a:rPr lang="de-DE" sz="1400" baseline="30000" dirty="0" smtClean="0"/>
+              <a:t>2) </a:t>
+            </a:r>
+            <a:r>
+              <a:rPr lang="de-DE" sz="1400" dirty="0" err="1" smtClean="0"/>
+              <a:t>Stop</a:t>
+            </a:r>
+            <a:r>
+              <a:rPr lang="de-DE" sz="1400" dirty="0" smtClean="0"/>
+              <a:t> </a:t>
+            </a:r>
+            <a:r>
+              <a:rPr lang="de-DE" sz="1400" dirty="0" err="1" smtClean="0"/>
+              <a:t>criterion</a:t>
+            </a:r>
+            <a:r>
+              <a:rPr lang="de-DE" sz="1400" dirty="0" smtClean="0"/>
+              <a:t> = #</a:t>
+            </a:r>
+            <a:r>
+              <a:rPr lang="de-DE" sz="1400" dirty="0" err="1" smtClean="0"/>
+              <a:t>clusters</a:t>
+            </a:r>
+            <a:r>
+              <a:rPr lang="de-DE" sz="1400" dirty="0" smtClean="0"/>
+              <a:t> </a:t>
+            </a:r>
+            <a:r>
+              <a:rPr lang="de-DE" sz="1400" dirty="0" smtClean="0">
+                <a:sym typeface="Wingdings"/>
+              </a:rPr>
+              <a:t> </a:t>
+            </a:r>
+            <a:r>
+              <a:rPr lang="de-DE" sz="1400" dirty="0" smtClean="0"/>
+              <a:t>#tags</a:t>
+            </a:r>
+            <a:endParaRPr lang="de-DE" sz="1400" dirty="0"/>
+          </a:p>
+        </p:txBody>
+      </p:sp>
+      <p:sp>
+        <p:nvSpPr>
+          <p:cNvPr id="8" name="Rectangle 2"/>
+          <p:cNvSpPr txBox="1">
+            <a:spLocks noChangeArrowheads="1"/>
+          </p:cNvSpPr>
+          <p:nvPr/>
+        </p:nvSpPr>
+        <p:spPr bwMode="auto">
+          <a:xfrm>
+            <a:off x="461963" y="485772"/>
+            <a:ext cx="8224837" cy="1069975"/>
+          </a:xfrm>
+          <a:prstGeom prst="rect">
+            <a:avLst/>
+          </a:prstGeom>
+          <a:noFill/>
+          <a:ln>
+            <a:noFill/>
+          </a:ln>
+          <a:effectLst/>
+          <a:extLst>
+            <a:ext uri="{909E8E84-426E-40dd-AFC4-6F175D3DCCD1}">
+              <a14:hiddenFill xmlns:a14="http://schemas.microsoft.com/office/drawing/2010/main">
+                <a:solidFill>
+                  <a:schemeClr val="accent1"/>
+                </a:solidFill>
+              </a14:hiddenFill>
+            </a:ext>
+            <a:ext uri="{91240B29-F687-4f45-9708-019B960494DF}">
+              <a14:hiddenLine xmlns:a14="http://schemas.microsoft.com/office/drawing/2010/main" w="9525">
+                <a:solidFill>
+                  <a:schemeClr val="tx1"/>
+                </a:solidFill>
+                <a:miter lim="800000"/>
+                <a:headEnd/>
+                <a:tailEnd/>
+              </a14:hiddenLine>
+            </a:ext>
+            <a:ext uri="{AF507438-7753-43e0-B8FC-AC1667EBCBE1}">
+              <a14:hiddenEffects xmlns:a14="http://schemas.microsoft.com/office/drawing/2010/main">
+                <a:effectLst>
+                  <a:outerShdw dist="35921" dir="2700000" algn="ctr" rotWithShape="0">
+                    <a:schemeClr val="bg2"/>
+                  </a:outerShdw>
+                </a:effectLst>
+              </a14:hiddenEffects>
+            </a:ext>
+          </a:extLst>
+        </p:spPr>
+        <p:txBody>
+          <a:bodyPr vert="horz" wrap="square" lIns="91440" tIns="45720" rIns="91440" bIns="45720" numCol="1" anchor="ctr" anchorCtr="0" compatLnSpc="1">
+            <a:prstTxWarp prst="textNoShape">
+              <a:avLst/>
+            </a:prstTxWarp>
+          </a:bodyPr>
+          <a:lstStyle>
+            <a:lvl1pPr algn="ctr" rtl="0" eaLnBrk="0" fontAlgn="base" hangingPunct="0">
+              <a:spcBef>
+                <a:spcPct val="0"/>
+              </a:spcBef>
+              <a:spcAft>
+                <a:spcPct val="0"/>
+              </a:spcAft>
+              <a:defRPr sz="3200">
+                <a:solidFill>
+                  <a:schemeClr val="bg2"/>
+                </a:solidFill>
+                <a:latin typeface="+mj-lt"/>
+                <a:ea typeface="+mj-ea"/>
+                <a:cs typeface="+mj-cs"/>
+              </a:defRPr>
+            </a:lvl1pPr>
+            <a:lvl2pPr algn="ctr" rtl="0" eaLnBrk="0" fontAlgn="base" hangingPunct="0">
+              <a:spcBef>
+                <a:spcPct val="0"/>
+              </a:spcBef>
+              <a:spcAft>
+                <a:spcPct val="0"/>
+              </a:spcAft>
+              <a:defRPr sz="3200">
+                <a:solidFill>
+                  <a:schemeClr val="bg2"/>
+                </a:solidFill>
+                <a:latin typeface="Arial" charset="0"/>
+              </a:defRPr>
+            </a:lvl2pPr>
+            <a:lvl3pPr algn="ctr" rtl="0" eaLnBrk="0" fontAlgn="base" hangingPunct="0">
+              <a:spcBef>
+                <a:spcPct val="0"/>
+              </a:spcBef>
+              <a:spcAft>
+                <a:spcPct val="0"/>
+              </a:spcAft>
+              <a:defRPr sz="3200">
+                <a:solidFill>
+                  <a:schemeClr val="bg2"/>
+                </a:solidFill>
+                <a:latin typeface="Arial" charset="0"/>
+              </a:defRPr>
+            </a:lvl3pPr>
+            <a:lvl4pPr algn="ctr" rtl="0" eaLnBrk="0" fontAlgn="base" hangingPunct="0">
+              <a:spcBef>
+                <a:spcPct val="0"/>
+              </a:spcBef>
+              <a:spcAft>
+                <a:spcPct val="0"/>
+              </a:spcAft>
+              <a:defRPr sz="3200">
+                <a:solidFill>
+                  <a:schemeClr val="bg2"/>
+                </a:solidFill>
+                <a:latin typeface="Arial" charset="0"/>
+              </a:defRPr>
+            </a:lvl4pPr>
+            <a:lvl5pPr algn="ctr" rtl="0" eaLnBrk="0" fontAlgn="base" hangingPunct="0">
+              <a:spcBef>
+                <a:spcPct val="0"/>
+              </a:spcBef>
+              <a:spcAft>
+                <a:spcPct val="0"/>
+              </a:spcAft>
+              <a:defRPr sz="3200">
+                <a:solidFill>
+                  <a:schemeClr val="bg2"/>
+                </a:solidFill>
+                <a:latin typeface="Arial" charset="0"/>
+              </a:defRPr>
+            </a:lvl5pPr>
+            <a:lvl6pPr marL="457200" algn="ctr" rtl="0" fontAlgn="base">
+              <a:spcBef>
+                <a:spcPct val="0"/>
+              </a:spcBef>
+              <a:spcAft>
+                <a:spcPct val="0"/>
+              </a:spcAft>
+              <a:defRPr sz="3200">
+                <a:solidFill>
+                  <a:schemeClr val="bg2"/>
+                </a:solidFill>
+                <a:latin typeface="Arial" charset="0"/>
+              </a:defRPr>
+            </a:lvl6pPr>
+            <a:lvl7pPr marL="914400" algn="ctr" rtl="0" fontAlgn="base">
+              <a:spcBef>
+                <a:spcPct val="0"/>
+              </a:spcBef>
+              <a:spcAft>
+                <a:spcPct val="0"/>
+              </a:spcAft>
+              <a:defRPr sz="3200">
+                <a:solidFill>
+                  <a:schemeClr val="bg2"/>
+                </a:solidFill>
+                <a:latin typeface="Arial" charset="0"/>
+              </a:defRPr>
+            </a:lvl7pPr>
+            <a:lvl8pPr marL="1371600" algn="ctr" rtl="0" fontAlgn="base">
+              <a:spcBef>
+                <a:spcPct val="0"/>
+              </a:spcBef>
+              <a:spcAft>
+                <a:spcPct val="0"/>
+              </a:spcAft>
+              <a:defRPr sz="3200">
+                <a:solidFill>
+                  <a:schemeClr val="bg2"/>
+                </a:solidFill>
+                <a:latin typeface="Arial" charset="0"/>
+              </a:defRPr>
+            </a:lvl8pPr>
+            <a:lvl9pPr marL="1828800" algn="ctr" rtl="0" fontAlgn="base">
+              <a:spcBef>
+                <a:spcPct val="0"/>
+              </a:spcBef>
+              <a:spcAft>
+                <a:spcPct val="0"/>
+              </a:spcAft>
+              <a:defRPr sz="3200">
+                <a:solidFill>
+                  <a:schemeClr val="bg2"/>
+                </a:solidFill>
+                <a:latin typeface="Arial" charset="0"/>
+              </a:defRPr>
+            </a:lvl9pPr>
+          </a:lstStyle>
+          <a:p>
+            <a:pPr eaLnBrk="1" hangingPunct="1"/>
+            <a:r>
+              <a:rPr lang="de-DE" sz="1500" b="1" dirty="0" err="1" smtClean="0"/>
+              <a:t>Current</a:t>
+            </a:r>
+            <a:r>
+              <a:rPr lang="de-DE" sz="1500" b="1" dirty="0" smtClean="0"/>
+              <a:t> Approach</a:t>
+            </a:r>
+            <a:r>
+              <a:rPr lang="de-DE" b="1" dirty="0" smtClean="0"/>
+              <a:t/>
+            </a:r>
+            <a:br>
+              <a:rPr lang="de-DE" b="1" dirty="0" smtClean="0"/>
+            </a:br>
+            <a:r>
+              <a:rPr lang="de-DE" b="1" dirty="0" smtClean="0"/>
+              <a:t>First </a:t>
+            </a:r>
+            <a:r>
+              <a:rPr lang="de-DE" b="1" dirty="0" err="1" smtClean="0"/>
+              <a:t>results</a:t>
+            </a:r>
+            <a:endParaRPr lang="de-DE" b="1" kern="0" dirty="0" smtClean="0"/>
+          </a:p>
+        </p:txBody>
+      </p:sp>
+    </p:spTree>
+    <p:extLst>
+      <p:ext uri="{BB962C8B-B14F-4D97-AF65-F5344CB8AC3E}">
+        <p14:creationId xmlns:p14="http://schemas.microsoft.com/office/powerpoint/2010/main" val="1843644244"/>
       </p:ext>
     </p:extLst>
   </p:cSld>

</xml_diff>

<commit_message>
Exported presentation to PDF
</commit_message>
<xml_diff>
--- a/presentation/interim/Presentation.pptx
+++ b/presentation/interim/Presentation.pptx
@@ -153,7 +153,7 @@
   </p:defaultTextStyle>
   <p:extLst>
     <p:ext uri="{EFAFB233-063F-42B5-8137-9DF3F51BA10A}">
-      <p15:sldGuideLst xmlns:p15="http://schemas.microsoft.com/office/powerpoint/2012/main" xmlns="">
+      <p15:sldGuideLst xmlns="" xmlns:p15="http://schemas.microsoft.com/office/powerpoint/2012/main">
         <p15:guide id="1" orient="horz" pos="3498">
           <p15:clr>
             <a:srgbClr val="A4A3A4"/>
@@ -167,7 +167,7 @@
       </p15:sldGuideLst>
     </p:ext>
     <p:ext uri="{2D200454-40CA-4A62-9FC3-DE9A4176ACB9}">
-      <p15:notesGuideLst xmlns:p15="http://schemas.microsoft.com/office/powerpoint/2012/main" xmlns="">
+      <p15:notesGuideLst xmlns="" xmlns:p15="http://schemas.microsoft.com/office/powerpoint/2012/main">
         <p15:guide id="1" orient="horz" pos="3224">
           <p15:clr>
             <a:srgbClr val="A4A3A4"/>
@@ -7196,7 +7196,7 @@
         </p:nvSpPr>
         <p:spPr>
           <a:xfrm>
-            <a:off x="4580132" y="1752620"/>
+            <a:off x="4580132" y="1816120"/>
             <a:ext cx="3922006" cy="867930"/>
           </a:xfrm>
           <a:prstGeom prst="rect">
@@ -9222,7 +9222,7 @@
                   <a:t> </a:t>
                 </a:r>
                 <a14:m>
-                  <m:oMath xmlns:m="http://schemas.openxmlformats.org/officeDocument/2006/math" xmlns="">
+                  <m:oMath xmlns="" xmlns:m="http://schemas.openxmlformats.org/officeDocument/2006/math">
                     <m:r>
                       <a:rPr lang="de-DE" sz="1600" i="1" dirty="0">
                         <a:latin typeface="Cambria Math" charset="0"/>
@@ -9238,7 +9238,7 @@
                   <a:t> Tags: </a:t>
                 </a:r>
                 <a14:m>
-                  <m:oMath xmlns:m="http://schemas.openxmlformats.org/officeDocument/2006/math" xmlns="">
+                  <m:oMath xmlns="" xmlns:m="http://schemas.openxmlformats.org/officeDocument/2006/math">
                     <m:r>
                       <a:rPr lang="de-DE" sz="1600" i="1" dirty="0">
                         <a:latin typeface="Cambria Math" charset="0"/>
@@ -9798,13 +9798,8 @@
             </a:r>
             <a:r>
               <a:rPr lang="en-US" sz="1600" dirty="0" smtClean="0"/>
-              <a:t> (full data set)</a:t>
-            </a:r>
-            <a:r>
-              <a:rPr lang="en-US" sz="1600" dirty="0" smtClean="0"/>
-              <a:t>:</a:t>
-            </a:r>
-            <a:endParaRPr lang="en-US" sz="1600" dirty="0" smtClean="0"/>
+              <a:t> (full data set):</a:t>
+            </a:r>
           </a:p>
           <a:p>
             <a:pPr marL="285750" indent="-285750">
@@ -9816,11 +9811,7 @@
             </a:pPr>
             <a:r>
               <a:rPr lang="en-US" sz="1600" dirty="0" smtClean="0"/>
-              <a:t>sufficient results, but still enough space left for improvements (e.g. improve preprocessing, feature selection, weight important </a:t>
-            </a:r>
-            <a:r>
-              <a:rPr lang="en-US" sz="1600" dirty="0" smtClean="0"/>
-              <a:t>features, </a:t>
+              <a:t>sufficient results, but still enough space left for improvements (e.g. improve preprocessing, feature selection, weight important features, </a:t>
             </a:r>
             <a:r>
               <a:rPr lang="is-IS" sz="1600" dirty="0" smtClean="0"/>
@@ -10078,11 +10069,7 @@
             </a:pPr>
             <a:r>
               <a:rPr lang="en-US" sz="1600" dirty="0" smtClean="0"/>
-              <a:t>Use only a few features that represent the entire </a:t>
-            </a:r>
-            <a:r>
-              <a:rPr lang="en-US" sz="1600" dirty="0" smtClean="0"/>
-              <a:t>post</a:t>
+              <a:t>Use only a few features that represent the entire post</a:t>
             </a:r>
             <a:endParaRPr lang="en-US" sz="1600" dirty="0"/>
           </a:p>
@@ -11381,7 +11368,7 @@
           <a:graphicData uri="http://schemas.openxmlformats.org/presentationml/2006/ole">
             <mc:AlternateContent xmlns:mc="http://schemas.openxmlformats.org/markup-compatibility/2006">
               <mc:Choice xmlns:v="urn:schemas-microsoft-com:vml" Requires="v">
-                <p:oleObj spid="_x0000_s1399" name="Formel" r:id="rId4" imgW="2806700" imgH="609600" progId="Equation.3">
+                <p:oleObj spid="_x0000_s1402" name="Formel" r:id="rId4" imgW="2806700" imgH="609600" progId="Equation.3">
                   <p:embed/>
                 </p:oleObj>
               </mc:Choice>
@@ -11438,7 +11425,7 @@
           <a:graphicData uri="http://schemas.openxmlformats.org/presentationml/2006/ole">
             <mc:AlternateContent xmlns:mc="http://schemas.openxmlformats.org/markup-compatibility/2006">
               <mc:Choice xmlns:v="urn:schemas-microsoft-com:vml" Requires="v">
-                <p:oleObj spid="_x0000_s1400" name="Formel" r:id="rId6" imgW="2667000" imgH="609600" progId="Equation.3">
+                <p:oleObj spid="_x0000_s1403" name="Formel" r:id="rId6" imgW="2667000" imgH="609600" progId="Equation.3">
                   <p:embed/>
                 </p:oleObj>
               </mc:Choice>

</xml_diff>